<commit_message>
typo prpostn_algebra.pptx, CF to CNF in PS_equisatisfiable_3CNF
</commit_message>
<xml_diff>
--- a/spring18/slidesS18/prpostn_algebra.pptx
+++ b/spring18/slidesS18/prpostn_algebra.pptx
@@ -9237,7 +9237,7 @@
           <a:graphicData uri="http://schemas.openxmlformats.org/presentationml/2006/ole">
             <mc:AlternateContent xmlns:mc="http://schemas.openxmlformats.org/markup-compatibility/2006">
               <mc:Choice xmlns:v="urn:schemas-microsoft-com:vml" Requires="v">
-                <p:oleObj spid="_x0000_s439357" name="Equation" r:id="rId4" imgW="2146300" imgH="228600" progId="Equation.DSMT4">
+                <p:oleObj spid="_x0000_s439361" name="Equation" r:id="rId4" imgW="2146300" imgH="228600" progId="Equation.DSMT4">
                   <p:embed/>
                 </p:oleObj>
               </mc:Choice>
@@ -9460,7 +9460,7 @@
           <a:graphicData uri="http://schemas.openxmlformats.org/presentationml/2006/ole">
             <mc:AlternateContent xmlns:mc="http://schemas.openxmlformats.org/markup-compatibility/2006">
               <mc:Choice xmlns:v="urn:schemas-microsoft-com:vml" Requires="v">
-                <p:oleObj spid="_x0000_s434292" name="Equation" r:id="rId4" imgW="2146300" imgH="228600" progId="Equation.DSMT4">
+                <p:oleObj spid="_x0000_s434299" name="Equation" r:id="rId4" imgW="2146300" imgH="228600" progId="Equation.DSMT4">
                   <p:embed/>
                 </p:oleObj>
               </mc:Choice>
@@ -9517,7 +9517,7 @@
           <a:graphicData uri="http://schemas.openxmlformats.org/presentationml/2006/ole">
             <mc:AlternateContent xmlns:mc="http://schemas.openxmlformats.org/markup-compatibility/2006">
               <mc:Choice xmlns:v="urn:schemas-microsoft-com:vml" Requires="v">
-                <p:oleObj spid="_x0000_s434293" name="Equation" r:id="rId6" imgW="2514600" imgH="228600" progId="Equation.DSMT4">
+                <p:oleObj spid="_x0000_s434300" name="Equation" r:id="rId6" imgW="2514600" imgH="228600" progId="Equation.DSMT4">
                   <p:embed/>
                 </p:oleObj>
               </mc:Choice>
@@ -9684,7 +9684,7 @@
           <a:graphicData uri="http://schemas.openxmlformats.org/presentationml/2006/ole">
             <mc:AlternateContent xmlns:mc="http://schemas.openxmlformats.org/markup-compatibility/2006">
               <mc:Choice xmlns:v="urn:schemas-microsoft-com:vml" Requires="v">
-                <p:oleObj spid="_x0000_s436315" name="Equation" r:id="rId4" imgW="2514600" imgH="228600" progId="Equation.DSMT4">
+                <p:oleObj spid="_x0000_s436319" name="Equation" r:id="rId4" imgW="2514600" imgH="228600" progId="Equation.DSMT4">
                   <p:embed/>
                 </p:oleObj>
               </mc:Choice>
@@ -9905,7 +9905,7 @@
           <a:graphicData uri="http://schemas.openxmlformats.org/presentationml/2006/ole">
             <mc:AlternateContent xmlns:mc="http://schemas.openxmlformats.org/markup-compatibility/2006">
               <mc:Choice xmlns:v="urn:schemas-microsoft-com:vml" Requires="v">
-                <p:oleObj spid="_x0000_s437385" name="Equation" r:id="rId4" imgW="2514600" imgH="228600" progId="Equation.DSMT4">
+                <p:oleObj spid="_x0000_s437392" name="Equation" r:id="rId4" imgW="2514600" imgH="228600" progId="Equation.DSMT4">
                   <p:embed/>
                 </p:oleObj>
               </mc:Choice>
@@ -9962,7 +9962,7 @@
           <a:graphicData uri="http://schemas.openxmlformats.org/presentationml/2006/ole">
             <mc:AlternateContent xmlns:mc="http://schemas.openxmlformats.org/markup-compatibility/2006">
               <mc:Choice xmlns:v="urn:schemas-microsoft-com:vml" Requires="v">
-                <p:oleObj spid="_x0000_s437386" name="Equation" r:id="rId6" imgW="1866900" imgH="228600" progId="Equation.DSMT4">
+                <p:oleObj spid="_x0000_s437393" name="Equation" r:id="rId6" imgW="1866900" imgH="228600" progId="Equation.DSMT4">
                   <p:embed/>
                 </p:oleObj>
               </mc:Choice>
@@ -10129,7 +10129,7 @@
           <a:graphicData uri="http://schemas.openxmlformats.org/presentationml/2006/ole">
             <mc:AlternateContent xmlns:mc="http://schemas.openxmlformats.org/markup-compatibility/2006">
               <mc:Choice xmlns:v="urn:schemas-microsoft-com:vml" Requires="v">
-                <p:oleObj spid="_x0000_s479311" name="Equation" r:id="rId4" imgW="1866900" imgH="228600" progId="Equation.DSMT4">
+                <p:oleObj spid="_x0000_s479315" name="Equation" r:id="rId4" imgW="1866900" imgH="228600" progId="Equation.DSMT4">
                   <p:embed/>
                 </p:oleObj>
               </mc:Choice>
@@ -10352,7 +10352,7 @@
           <a:graphicData uri="http://schemas.openxmlformats.org/presentationml/2006/ole">
             <mc:AlternateContent xmlns:mc="http://schemas.openxmlformats.org/markup-compatibility/2006">
               <mc:Choice xmlns:v="urn:schemas-microsoft-com:vml" Requires="v">
-                <p:oleObj spid="_x0000_s440485" name="Equation" r:id="rId4" imgW="1866900" imgH="228600" progId="Equation.DSMT4">
+                <p:oleObj spid="_x0000_s440492" name="Equation" r:id="rId4" imgW="1866900" imgH="228600" progId="Equation.DSMT4">
                   <p:embed/>
                 </p:oleObj>
               </mc:Choice>
@@ -10409,7 +10409,7 @@
           <a:graphicData uri="http://schemas.openxmlformats.org/presentationml/2006/ole">
             <mc:AlternateContent xmlns:mc="http://schemas.openxmlformats.org/markup-compatibility/2006">
               <mc:Choice xmlns:v="urn:schemas-microsoft-com:vml" Requires="v">
-                <p:oleObj spid="_x0000_s440486" name="Equation" r:id="rId6" imgW="1689100" imgH="254000" progId="Equation.DSMT4">
+                <p:oleObj spid="_x0000_s440493" name="Equation" r:id="rId6" imgW="1689100" imgH="254000" progId="Equation.DSMT4">
                   <p:embed/>
                 </p:oleObj>
               </mc:Choice>
@@ -10751,7 +10751,7 @@
           <a:graphicData uri="http://schemas.openxmlformats.org/presentationml/2006/ole">
             <mc:AlternateContent xmlns:mc="http://schemas.openxmlformats.org/markup-compatibility/2006">
               <mc:Choice xmlns:v="urn:schemas-microsoft-com:vml" Requires="v">
-                <p:oleObj spid="_x0000_s573451" name="Equation" r:id="rId4" imgW="1511300" imgH="254000" progId="Equation.DSMT4">
+                <p:oleObj spid="_x0000_s573455" name="Equation" r:id="rId4" imgW="1511300" imgH="254000" progId="Equation.DSMT4">
                   <p:embed/>
                 </p:oleObj>
               </mc:Choice>
@@ -11003,7 +11003,7 @@
           <a:graphicData uri="http://schemas.openxmlformats.org/presentationml/2006/ole">
             <mc:AlternateContent xmlns:mc="http://schemas.openxmlformats.org/markup-compatibility/2006">
               <mc:Choice xmlns:v="urn:schemas-microsoft-com:vml" Requires="v">
-                <p:oleObj spid="_x0000_s571402" name="Equation" r:id="rId4" imgW="1866900" imgH="457200" progId="Equation.DSMT4">
+                <p:oleObj spid="_x0000_s571406" name="Equation" r:id="rId4" imgW="1866900" imgH="457200" progId="Equation.DSMT4">
                   <p:embed/>
                 </p:oleObj>
               </mc:Choice>
@@ -11287,7 +11287,7 @@
           <a:graphicData uri="http://schemas.openxmlformats.org/presentationml/2006/ole">
             <mc:AlternateContent xmlns:mc="http://schemas.openxmlformats.org/markup-compatibility/2006">
               <mc:Choice xmlns:v="urn:schemas-microsoft-com:vml" Requires="v">
-                <p:oleObj spid="_x0000_s572426" name="Equation" r:id="rId4" imgW="1790700" imgH="457200" progId="Equation.DSMT4">
+                <p:oleObj spid="_x0000_s572430" name="Equation" r:id="rId4" imgW="1790700" imgH="457200" progId="Equation.DSMT4">
                   <p:embed/>
                 </p:oleObj>
               </mc:Choice>
@@ -11753,7 +11753,7 @@
           <a:graphicData uri="http://schemas.openxmlformats.org/presentationml/2006/ole">
             <mc:AlternateContent xmlns:mc="http://schemas.openxmlformats.org/markup-compatibility/2006">
               <mc:Choice xmlns:v="urn:schemas-microsoft-com:vml" Requires="v">
-                <p:oleObj spid="_x0000_s433296" name="Equation" r:id="rId4" imgW="1511300" imgH="254000" progId="Equation.DSMT4">
+                <p:oleObj spid="_x0000_s433300" name="Equation" r:id="rId4" imgW="1511300" imgH="254000" progId="Equation.DSMT4">
                   <p:embed/>
                 </p:oleObj>
               </mc:Choice>
@@ -12159,7 +12159,7 @@
           <a:graphicData uri="http://schemas.openxmlformats.org/presentationml/2006/ole">
             <mc:AlternateContent xmlns:mc="http://schemas.openxmlformats.org/markup-compatibility/2006">
               <mc:Choice xmlns:v="urn:schemas-microsoft-com:vml" Requires="v">
-                <p:oleObj spid="_x0000_s441534" name="Equation" r:id="rId4" imgW="1371600" imgH="482600" progId="Equation.DSMT4">
+                <p:oleObj spid="_x0000_s441541" name="Equation" r:id="rId4" imgW="1371600" imgH="482600" progId="Equation.DSMT4">
                   <p:embed/>
                 </p:oleObj>
               </mc:Choice>
@@ -12277,7 +12277,7 @@
           <a:graphicData uri="http://schemas.openxmlformats.org/presentationml/2006/ole">
             <mc:AlternateContent xmlns:mc="http://schemas.openxmlformats.org/markup-compatibility/2006">
               <mc:Choice xmlns:v="urn:schemas-microsoft-com:vml" Requires="v">
-                <p:oleObj spid="_x0000_s441535" name="Equation" r:id="rId6" imgW="1511300" imgH="254000" progId="Equation.DSMT4">
+                <p:oleObj spid="_x0000_s441542" name="Equation" r:id="rId6" imgW="1511300" imgH="254000" progId="Equation.DSMT4">
                   <p:embed/>
                 </p:oleObj>
               </mc:Choice>
@@ -12383,7 +12383,7 @@
           <a:graphicData uri="http://schemas.openxmlformats.org/presentationml/2006/ole">
             <mc:AlternateContent xmlns:mc="http://schemas.openxmlformats.org/markup-compatibility/2006">
               <mc:Choice xmlns:v="urn:schemas-microsoft-com:vml" Requires="v">
-                <p:oleObj spid="_x0000_s603144" name="Equation" r:id="rId4" imgW="1371600" imgH="482600" progId="Equation.DSMT4">
+                <p:oleObj spid="_x0000_s603148" name="Equation" r:id="rId4" imgW="1371600" imgH="482600" progId="Equation.DSMT4">
                   <p:embed/>
                 </p:oleObj>
               </mc:Choice>
@@ -12489,13 +12489,13 @@
   <p:clrMapOvr>
     <a:masterClrMapping/>
   </p:clrMapOvr>
-  <mc:AlternateContent xmlns:mc="http://schemas.openxmlformats.org/markup-compatibility/2006">
-    <mc:Choice xmlns:p14="http://schemas.microsoft.com/office/powerpoint/2010/main" Requires="p14">
+  <mc:AlternateContent xmlns:mc="http://schemas.openxmlformats.org/markup-compatibility/2006" xmlns:p14="http://schemas.microsoft.com/office/powerpoint/2010/main">
+    <mc:Choice Requires="p14">
       <p:transition spd="slow" p14:dur="800" advClick="0">
         <p:fade/>
       </p:transition>
     </mc:Choice>
-    <mc:Fallback>
+    <mc:Fallback xmlns="">
       <p:transition xmlns:p14="http://schemas.microsoft.com/office/powerpoint/2010/main" spd="slow" advClick="0">
         <p:fade/>
       </p:transition>
@@ -12550,7 +12550,7 @@
           <a:graphicData uri="http://schemas.openxmlformats.org/presentationml/2006/ole">
             <mc:AlternateContent xmlns:mc="http://schemas.openxmlformats.org/markup-compatibility/2006">
               <mc:Choice xmlns:v="urn:schemas-microsoft-com:vml" Requires="v">
-                <p:oleObj spid="_x0000_s502828" name="Equation" r:id="rId4" imgW="1371600" imgH="482600" progId="Equation.DSMT4">
+                <p:oleObj spid="_x0000_s502832" name="Equation" r:id="rId4" imgW="1371600" imgH="482600" progId="Equation.DSMT4">
                   <p:embed/>
                 </p:oleObj>
               </mc:Choice>
@@ -12656,11 +12656,11 @@
   <p:clrMapOvr>
     <a:masterClrMapping/>
   </p:clrMapOvr>
-  <mc:AlternateContent xmlns:mc="http://schemas.openxmlformats.org/markup-compatibility/2006">
-    <mc:Choice xmlns:p14="http://schemas.microsoft.com/office/powerpoint/2010/main" Requires="p14">
+  <mc:AlternateContent xmlns:mc="http://schemas.openxmlformats.org/markup-compatibility/2006" xmlns:p14="http://schemas.microsoft.com/office/powerpoint/2010/main">
+    <mc:Choice Requires="p14">
       <p:transition p14:dur="0" advClick="0"/>
     </mc:Choice>
-    <mc:Fallback>
+    <mc:Fallback xmlns="">
       <p:transition xmlns:p14="http://schemas.microsoft.com/office/powerpoint/2010/main" advClick="0"/>
     </mc:Fallback>
   </mc:AlternateContent>
@@ -12713,7 +12713,7 @@
           <a:graphicData uri="http://schemas.openxmlformats.org/presentationml/2006/ole">
             <mc:AlternateContent xmlns:mc="http://schemas.openxmlformats.org/markup-compatibility/2006">
               <mc:Choice xmlns:v="urn:schemas-microsoft-com:vml" Requires="v">
-                <p:oleObj spid="_x0000_s444517" name="Equation" r:id="rId4" imgW="1371600" imgH="482600" progId="Equation.DSMT4">
+                <p:oleObj spid="_x0000_s444524" name="Equation" r:id="rId4" imgW="1371600" imgH="482600" progId="Equation.DSMT4">
                   <p:embed/>
                 </p:oleObj>
               </mc:Choice>
@@ -12855,7 +12855,7 @@
             <a:graphicData uri="http://schemas.openxmlformats.org/presentationml/2006/ole">
               <mc:AlternateContent xmlns:mc="http://schemas.openxmlformats.org/markup-compatibility/2006">
                 <mc:Choice xmlns:v="urn:schemas-microsoft-com:vml" Requires="v">
-                  <p:oleObj spid="_x0000_s444518" name="Equation" r:id="rId6" imgW="139700" imgH="215900" progId="Equation.DSMT4">
+                  <p:oleObj spid="_x0000_s444525" name="Equation" r:id="rId6" imgW="139700" imgH="215900" progId="Equation.DSMT4">
                     <p:embed/>
                   </p:oleObj>
                 </mc:Choice>
@@ -12990,7 +12990,7 @@
           <a:graphicData uri="http://schemas.openxmlformats.org/presentationml/2006/ole">
             <mc:AlternateContent xmlns:mc="http://schemas.openxmlformats.org/markup-compatibility/2006">
               <mc:Choice xmlns:v="urn:schemas-microsoft-com:vml" Requires="v">
-                <p:oleObj spid="_x0000_s442477" name="Equation" r:id="rId4" imgW="1371600" imgH="482600" progId="Equation.DSMT4">
+                <p:oleObj spid="_x0000_s442484" name="Equation" r:id="rId4" imgW="1371600" imgH="482600" progId="Equation.DSMT4">
                   <p:embed/>
                 </p:oleObj>
               </mc:Choice>
@@ -13047,7 +13047,7 @@
           <a:graphicData uri="http://schemas.openxmlformats.org/presentationml/2006/ole">
             <mc:AlternateContent xmlns:mc="http://schemas.openxmlformats.org/markup-compatibility/2006">
               <mc:Choice xmlns:v="urn:schemas-microsoft-com:vml" Requires="v">
-                <p:oleObj spid="_x0000_s442478" name="Equation" r:id="rId6" imgW="1803400" imgH="482600" progId="Equation.DSMT4">
+                <p:oleObj spid="_x0000_s442485" name="Equation" r:id="rId6" imgW="1803400" imgH="482600" progId="Equation.DSMT4">
                   <p:embed/>
                 </p:oleObj>
               </mc:Choice>
@@ -13214,7 +13214,7 @@
           <a:graphicData uri="http://schemas.openxmlformats.org/presentationml/2006/ole">
             <mc:AlternateContent xmlns:mc="http://schemas.openxmlformats.org/markup-compatibility/2006">
               <mc:Choice xmlns:v="urn:schemas-microsoft-com:vml" Requires="v">
-                <p:oleObj spid="_x0000_s446589" name="Equation" r:id="rId4" imgW="1803400" imgH="482600" progId="Equation.DSMT4">
+                <p:oleObj spid="_x0000_s446596" name="Equation" r:id="rId4" imgW="1803400" imgH="482600" progId="Equation.DSMT4">
                   <p:embed/>
                 </p:oleObj>
               </mc:Choice>
@@ -13356,7 +13356,7 @@
             <a:graphicData uri="http://schemas.openxmlformats.org/presentationml/2006/ole">
               <mc:AlternateContent xmlns:mc="http://schemas.openxmlformats.org/markup-compatibility/2006">
                 <mc:Choice xmlns:v="urn:schemas-microsoft-com:vml" Requires="v">
-                  <p:oleObj spid="_x0000_s446590" name="Equation" r:id="rId6" imgW="177800" imgH="241300" progId="Equation.DSMT4">
+                  <p:oleObj spid="_x0000_s446597" name="Equation" r:id="rId6" imgW="177800" imgH="241300" progId="Equation.DSMT4">
                     <p:embed/>
                   </p:oleObj>
                 </mc:Choice>
@@ -13482,7 +13482,7 @@
           <a:graphicData uri="http://schemas.openxmlformats.org/presentationml/2006/ole">
             <mc:AlternateContent xmlns:mc="http://schemas.openxmlformats.org/markup-compatibility/2006">
               <mc:Choice xmlns:v="urn:schemas-microsoft-com:vml" Requires="v">
-                <p:oleObj spid="_x0000_s445573" name="Equation" r:id="rId4" imgW="1854200" imgH="482600" progId="Equation.DSMT4">
+                <p:oleObj spid="_x0000_s445580" name="Equation" r:id="rId4" imgW="1854200" imgH="482600" progId="Equation.DSMT4">
                   <p:embed/>
                 </p:oleObj>
               </mc:Choice>
@@ -13539,7 +13539,7 @@
           <a:graphicData uri="http://schemas.openxmlformats.org/presentationml/2006/ole">
             <mc:AlternateContent xmlns:mc="http://schemas.openxmlformats.org/markup-compatibility/2006">
               <mc:Choice xmlns:v="urn:schemas-microsoft-com:vml" Requires="v">
-                <p:oleObj spid="_x0000_s445574" name="Equation" r:id="rId6" imgW="1803400" imgH="482600" progId="Equation.DSMT4">
+                <p:oleObj spid="_x0000_s445581" name="Equation" r:id="rId6" imgW="1803400" imgH="482600" progId="Equation.DSMT4">
                   <p:embed/>
                 </p:oleObj>
               </mc:Choice>
@@ -13697,7 +13697,7 @@
           <a:graphicData uri="http://schemas.openxmlformats.org/presentationml/2006/ole">
             <mc:AlternateContent xmlns:mc="http://schemas.openxmlformats.org/markup-compatibility/2006">
               <mc:Choice xmlns:v="urn:schemas-microsoft-com:vml" Requires="v">
-                <p:oleObj spid="_x0000_s480335" name="Equation" r:id="rId4" imgW="1854200" imgH="482600" progId="Equation.DSMT4">
+                <p:oleObj spid="_x0000_s480339" name="Equation" r:id="rId4" imgW="1854200" imgH="482600" progId="Equation.DSMT4">
                   <p:embed/>
                 </p:oleObj>
               </mc:Choice>
@@ -14156,7 +14156,7 @@
           <a:graphicData uri="http://schemas.openxmlformats.org/presentationml/2006/ole">
             <mc:AlternateContent xmlns:mc="http://schemas.openxmlformats.org/markup-compatibility/2006">
               <mc:Choice xmlns:v="urn:schemas-microsoft-com:vml" Requires="v">
-                <p:oleObj spid="_x0000_s425164" name="Equation" r:id="rId4" imgW="1511300" imgH="254000" progId="Equation.DSMT4">
+                <p:oleObj spid="_x0000_s425177" name="Equation" r:id="rId4" imgW="1511300" imgH="254000" progId="Equation.DSMT4">
                   <p:embed/>
                 </p:oleObj>
               </mc:Choice>
@@ -14213,7 +14213,7 @@
           <a:graphicData uri="http://schemas.openxmlformats.org/presentationml/2006/ole">
             <mc:AlternateContent xmlns:mc="http://schemas.openxmlformats.org/markup-compatibility/2006">
               <mc:Choice xmlns:v="urn:schemas-microsoft-com:vml" Requires="v">
-                <p:oleObj spid="_x0000_s425165" name="Equation" r:id="rId6" imgW="1524000" imgH="254000" progId="Equation.DSMT4">
+                <p:oleObj spid="_x0000_s425178" name="Equation" r:id="rId6" imgW="1524000" imgH="254000" progId="Equation.DSMT4">
                   <p:embed/>
                 </p:oleObj>
               </mc:Choice>
@@ -14270,7 +14270,7 @@
           <a:graphicData uri="http://schemas.openxmlformats.org/presentationml/2006/ole">
             <mc:AlternateContent xmlns:mc="http://schemas.openxmlformats.org/markup-compatibility/2006">
               <mc:Choice xmlns:v="urn:schemas-microsoft-com:vml" Requires="v">
-                <p:oleObj spid="_x0000_s425166" name="Equation" r:id="rId8" imgW="1181100" imgH="228600" progId="Equation.DSMT4">
+                <p:oleObj spid="_x0000_s425179" name="Equation" r:id="rId8" imgW="1181100" imgH="228600" progId="Equation.DSMT4">
                   <p:embed/>
                 </p:oleObj>
               </mc:Choice>
@@ -14327,7 +14327,7 @@
           <a:graphicData uri="http://schemas.openxmlformats.org/presentationml/2006/ole">
             <mc:AlternateContent xmlns:mc="http://schemas.openxmlformats.org/markup-compatibility/2006">
               <mc:Choice xmlns:v="urn:schemas-microsoft-com:vml" Requires="v">
-                <p:oleObj spid="_x0000_s425167" name="Equation" r:id="rId10" imgW="1168400" imgH="228600" progId="Equation.DSMT4">
+                <p:oleObj spid="_x0000_s425180" name="Equation" r:id="rId10" imgW="1168400" imgH="228600" progId="Equation.DSMT4">
                   <p:embed/>
                 </p:oleObj>
               </mc:Choice>
@@ -14718,7 +14718,7 @@
           <a:graphicData uri="http://schemas.openxmlformats.org/presentationml/2006/ole">
             <mc:AlternateContent xmlns:mc="http://schemas.openxmlformats.org/markup-compatibility/2006">
               <mc:Choice xmlns:v="urn:schemas-microsoft-com:vml" Requires="v">
-                <p:oleObj spid="_x0000_s554033" name="Equation" r:id="rId4" imgW="1181100" imgH="228600" progId="Equation.DSMT4">
+                <p:oleObj spid="_x0000_s554046" name="Equation" r:id="rId4" imgW="1181100" imgH="228600" progId="Equation.DSMT4">
                   <p:embed/>
                 </p:oleObj>
               </mc:Choice>
@@ -14775,7 +14775,7 @@
           <a:graphicData uri="http://schemas.openxmlformats.org/presentationml/2006/ole">
             <mc:AlternateContent xmlns:mc="http://schemas.openxmlformats.org/markup-compatibility/2006">
               <mc:Choice xmlns:v="urn:schemas-microsoft-com:vml" Requires="v">
-                <p:oleObj spid="_x0000_s554034" name="Equation" r:id="rId6" imgW="1168400" imgH="228600" progId="Equation.DSMT4">
+                <p:oleObj spid="_x0000_s554047" name="Equation" r:id="rId6" imgW="1168400" imgH="228600" progId="Equation.DSMT4">
                   <p:embed/>
                 </p:oleObj>
               </mc:Choice>
@@ -14832,7 +14832,7 @@
           <a:graphicData uri="http://schemas.openxmlformats.org/presentationml/2006/ole">
             <mc:AlternateContent xmlns:mc="http://schemas.openxmlformats.org/markup-compatibility/2006">
               <mc:Choice xmlns:v="urn:schemas-microsoft-com:vml" Requires="v">
-                <p:oleObj spid="_x0000_s554035" name="Equation" r:id="rId8" imgW="1511300" imgH="254000" progId="Equation.DSMT4">
+                <p:oleObj spid="_x0000_s554048" name="Equation" r:id="rId8" imgW="1511300" imgH="254000" progId="Equation.DSMT4">
                   <p:embed/>
                 </p:oleObj>
               </mc:Choice>
@@ -14889,7 +14889,7 @@
           <a:graphicData uri="http://schemas.openxmlformats.org/presentationml/2006/ole">
             <mc:AlternateContent xmlns:mc="http://schemas.openxmlformats.org/markup-compatibility/2006">
               <mc:Choice xmlns:v="urn:schemas-microsoft-com:vml" Requires="v">
-                <p:oleObj spid="_x0000_s554036" name="Equation" r:id="rId10" imgW="1524000" imgH="254000" progId="Equation.DSMT4">
+                <p:oleObj spid="_x0000_s554049" name="Equation" r:id="rId10" imgW="1524000" imgH="254000" progId="Equation.DSMT4">
                   <p:embed/>
                 </p:oleObj>
               </mc:Choice>
@@ -15512,7 +15512,7 @@
           <a:graphicData uri="http://schemas.openxmlformats.org/presentationml/2006/ole">
             <mc:AlternateContent xmlns:mc="http://schemas.openxmlformats.org/markup-compatibility/2006">
               <mc:Choice xmlns:v="urn:schemas-microsoft-com:vml" Requires="v">
-                <p:oleObj spid="_x0000_s426076" name="Equation" r:id="rId4" imgW="1854200" imgH="482600" progId="Equation.DSMT4">
+                <p:oleObj spid="_x0000_s426080" name="Equation" r:id="rId4" imgW="1854200" imgH="482600" progId="Equation.DSMT4">
                   <p:embed/>
                 </p:oleObj>
               </mc:Choice>
@@ -15886,7 +15886,7 @@
           <a:graphicData uri="http://schemas.openxmlformats.org/presentationml/2006/ole">
             <mc:AlternateContent xmlns:mc="http://schemas.openxmlformats.org/markup-compatibility/2006">
               <mc:Choice xmlns:v="urn:schemas-microsoft-com:vml" Requires="v">
-                <p:oleObj spid="_x0000_s481330" name="Equation" r:id="rId4" imgW="1854200" imgH="482600" progId="Equation.DSMT4">
+                <p:oleObj spid="_x0000_s481334" name="Equation" r:id="rId4" imgW="1854200" imgH="482600" progId="Equation.DSMT4">
                   <p:embed/>
                 </p:oleObj>
               </mc:Choice>
@@ -16099,7 +16099,7 @@
           <a:graphicData uri="http://schemas.openxmlformats.org/presentationml/2006/ole">
             <mc:AlternateContent xmlns:mc="http://schemas.openxmlformats.org/markup-compatibility/2006">
               <mc:Choice xmlns:v="urn:schemas-microsoft-com:vml" Requires="v">
-                <p:oleObj spid="_x0000_s528417" name="Equation" r:id="rId4" imgW="1803400" imgH="482600" progId="Equation.DSMT4">
+                <p:oleObj spid="_x0000_s528421" name="Equation" r:id="rId4" imgW="1803400" imgH="482600" progId="Equation.DSMT4">
                   <p:embed/>
                 </p:oleObj>
               </mc:Choice>
@@ -16298,7 +16298,7 @@
           <a:graphicData uri="http://schemas.openxmlformats.org/presentationml/2006/ole">
             <mc:AlternateContent xmlns:mc="http://schemas.openxmlformats.org/markup-compatibility/2006">
               <mc:Choice xmlns:v="urn:schemas-microsoft-com:vml" Requires="v">
-                <p:oleObj spid="_x0000_s447551" name="Equation" r:id="rId4" imgW="2514600" imgH="254000" progId="Equation.DSMT4">
+                <p:oleObj spid="_x0000_s447555" name="Equation" r:id="rId4" imgW="2514600" imgH="254000" progId="Equation.DSMT4">
                   <p:embed/>
                 </p:oleObj>
               </mc:Choice>
@@ -16658,7 +16658,7 @@
           <a:graphicData uri="http://schemas.openxmlformats.org/presentationml/2006/ole">
             <mc:AlternateContent xmlns:mc="http://schemas.openxmlformats.org/markup-compatibility/2006">
               <mc:Choice xmlns:v="urn:schemas-microsoft-com:vml" Requires="v">
-                <p:oleObj spid="_x0000_s449651" name="Equation" r:id="rId4" imgW="698500" imgH="254000" progId="Equation.DSMT4">
+                <p:oleObj spid="_x0000_s449658" name="Equation" r:id="rId4" imgW="698500" imgH="254000" progId="Equation.DSMT4">
                   <p:embed/>
                 </p:oleObj>
               </mc:Choice>
@@ -16715,7 +16715,7 @@
           <a:graphicData uri="http://schemas.openxmlformats.org/presentationml/2006/ole">
             <mc:AlternateContent xmlns:mc="http://schemas.openxmlformats.org/markup-compatibility/2006">
               <mc:Choice xmlns:v="urn:schemas-microsoft-com:vml" Requires="v">
-                <p:oleObj spid="_x0000_s449652" name="Equation" r:id="rId6" imgW="1651000" imgH="254000" progId="Equation.DSMT4">
+                <p:oleObj spid="_x0000_s449659" name="Equation" r:id="rId6" imgW="1651000" imgH="254000" progId="Equation.DSMT4">
                   <p:embed/>
                 </p:oleObj>
               </mc:Choice>
@@ -17129,7 +17129,7 @@
           <a:graphicData uri="http://schemas.openxmlformats.org/presentationml/2006/ole">
             <mc:AlternateContent xmlns:mc="http://schemas.openxmlformats.org/markup-compatibility/2006">
               <mc:Choice xmlns:v="urn:schemas-microsoft-com:vml" Requires="v">
-                <p:oleObj spid="_x0000_s506991" name="Equation" r:id="rId4" imgW="698500" imgH="254000" progId="Equation.DSMT4">
+                <p:oleObj spid="_x0000_s507001" name="Equation" r:id="rId4" imgW="698500" imgH="254000" progId="Equation.DSMT4">
                   <p:embed/>
                 </p:oleObj>
               </mc:Choice>
@@ -17186,7 +17186,7 @@
           <a:graphicData uri="http://schemas.openxmlformats.org/presentationml/2006/ole">
             <mc:AlternateContent xmlns:mc="http://schemas.openxmlformats.org/markup-compatibility/2006">
               <mc:Choice xmlns:v="urn:schemas-microsoft-com:vml" Requires="v">
-                <p:oleObj spid="_x0000_s506992" name="Equation" r:id="rId6" imgW="1651000" imgH="254000" progId="Equation.DSMT4">
+                <p:oleObj spid="_x0000_s507002" name="Equation" r:id="rId6" imgW="1651000" imgH="254000" progId="Equation.DSMT4">
                   <p:embed/>
                 </p:oleObj>
               </mc:Choice>
@@ -17243,7 +17243,7 @@
           <a:graphicData uri="http://schemas.openxmlformats.org/presentationml/2006/ole">
             <mc:AlternateContent xmlns:mc="http://schemas.openxmlformats.org/markup-compatibility/2006">
               <mc:Choice xmlns:v="urn:schemas-microsoft-com:vml" Requires="v">
-                <p:oleObj spid="_x0000_s506993" name="Equation" r:id="rId8" imgW="1333500" imgH="482600" progId="Equation.DSMT4">
+                <p:oleObj spid="_x0000_s507003" name="Equation" r:id="rId8" imgW="1333500" imgH="482600" progId="Equation.DSMT4">
                   <p:embed/>
                 </p:oleObj>
               </mc:Choice>
@@ -17543,7 +17543,7 @@
           <a:graphicData uri="http://schemas.openxmlformats.org/presentationml/2006/ole">
             <mc:AlternateContent xmlns:mc="http://schemas.openxmlformats.org/markup-compatibility/2006">
               <mc:Choice xmlns:v="urn:schemas-microsoft-com:vml" Requires="v">
-                <p:oleObj spid="_x0000_s507998" name="Equation" r:id="rId4" imgW="698500" imgH="254000" progId="Equation.DSMT4">
+                <p:oleObj spid="_x0000_s508005" name="Equation" r:id="rId4" imgW="698500" imgH="254000" progId="Equation.DSMT4">
                   <p:embed/>
                 </p:oleObj>
               </mc:Choice>
@@ -17600,7 +17600,7 @@
           <a:graphicData uri="http://schemas.openxmlformats.org/presentationml/2006/ole">
             <mc:AlternateContent xmlns:mc="http://schemas.openxmlformats.org/markup-compatibility/2006">
               <mc:Choice xmlns:v="urn:schemas-microsoft-com:vml" Requires="v">
-                <p:oleObj spid="_x0000_s507999" name="Equation" r:id="rId6" imgW="1333500" imgH="482600" progId="Equation.DSMT4">
+                <p:oleObj spid="_x0000_s508006" name="Equation" r:id="rId6" imgW="1333500" imgH="482600" progId="Equation.DSMT4">
                   <p:embed/>
                 </p:oleObj>
               </mc:Choice>
@@ -17793,13 +17793,13 @@
   <p:clrMapOvr>
     <a:masterClrMapping/>
   </p:clrMapOvr>
-  <mc:AlternateContent xmlns:mc="http://schemas.openxmlformats.org/markup-compatibility/2006">
-    <mc:Choice xmlns:p14="http://schemas.microsoft.com/office/powerpoint/2010/main" Requires="p14">
+  <mc:AlternateContent xmlns:mc="http://schemas.openxmlformats.org/markup-compatibility/2006" xmlns:p14="http://schemas.microsoft.com/office/powerpoint/2010/main">
+    <mc:Choice Requires="p14">
       <p:transition spd="med" p14:dur="700" advClick="0">
         <p:fade/>
       </p:transition>
     </mc:Choice>
-    <mc:Fallback>
+    <mc:Fallback xmlns="">
       <p:transition xmlns:p14="http://schemas.microsoft.com/office/powerpoint/2010/main" spd="med" advClick="0">
         <p:fade/>
       </p:transition>
@@ -18024,7 +18024,7 @@
           <a:graphicData uri="http://schemas.openxmlformats.org/presentationml/2006/ole">
             <mc:AlternateContent xmlns:mc="http://schemas.openxmlformats.org/markup-compatibility/2006">
               <mc:Choice xmlns:v="urn:schemas-microsoft-com:vml" Requires="v">
-                <p:oleObj spid="_x0000_s522299" name="Equation" r:id="rId4" imgW="1600200" imgH="215900" progId="Equation.DSMT4">
+                <p:oleObj spid="_x0000_s522306" name="Equation" r:id="rId4" imgW="1600200" imgH="215900" progId="Equation.DSMT4">
                   <p:embed/>
                 </p:oleObj>
               </mc:Choice>
@@ -18081,7 +18081,7 @@
           <a:graphicData uri="http://schemas.openxmlformats.org/presentationml/2006/ole">
             <mc:AlternateContent xmlns:mc="http://schemas.openxmlformats.org/markup-compatibility/2006">
               <mc:Choice xmlns:v="urn:schemas-microsoft-com:vml" Requires="v">
-                <p:oleObj spid="_x0000_s522300" name="Equation" r:id="rId6" imgW="1397000" imgH="457200" progId="Equation.DSMT4">
+                <p:oleObj spid="_x0000_s522307" name="Equation" r:id="rId6" imgW="1397000" imgH="457200" progId="Equation.DSMT4">
                   <p:embed/>
                 </p:oleObj>
               </mc:Choice>
@@ -18490,7 +18490,7 @@
           <a:graphicData uri="http://schemas.openxmlformats.org/presentationml/2006/ole">
             <mc:AlternateContent xmlns:mc="http://schemas.openxmlformats.org/markup-compatibility/2006">
               <mc:Choice xmlns:v="urn:schemas-microsoft-com:vml" Requires="v">
-                <p:oleObj spid="_x0000_s461886" name="Equation" r:id="rId4" imgW="1333500" imgH="482600" progId="Equation.DSMT4">
+                <p:oleObj spid="_x0000_s461890" name="Equation" r:id="rId4" imgW="1333500" imgH="482600" progId="Equation.DSMT4">
                   <p:embed/>
                 </p:oleObj>
               </mc:Choice>
@@ -18728,7 +18728,7 @@
           <a:graphicData uri="http://schemas.openxmlformats.org/presentationml/2006/ole">
             <mc:AlternateContent xmlns:mc="http://schemas.openxmlformats.org/markup-compatibility/2006">
               <mc:Choice xmlns:v="urn:schemas-microsoft-com:vml" Requires="v">
-                <p:oleObj spid="_x0000_s523316" name="Equation" r:id="rId4" imgW="1333500" imgH="482600" progId="Equation.DSMT4">
+                <p:oleObj spid="_x0000_s523320" name="Equation" r:id="rId4" imgW="1333500" imgH="482600" progId="Equation.DSMT4">
                   <p:embed/>
                 </p:oleObj>
               </mc:Choice>
@@ -19131,7 +19131,7 @@
           <a:graphicData uri="http://schemas.openxmlformats.org/presentationml/2006/ole">
             <mc:AlternateContent xmlns:mc="http://schemas.openxmlformats.org/markup-compatibility/2006">
               <mc:Choice xmlns:v="urn:schemas-microsoft-com:vml" Requires="v">
-                <p:oleObj spid="_x0000_s420049" name="Equation" r:id="rId4" imgW="139700" imgH="215900" progId="Equation.DSMT4">
+                <p:oleObj spid="_x0000_s420059" name="Equation" r:id="rId4" imgW="139700" imgH="215900" progId="Equation.DSMT4">
                   <p:embed/>
                 </p:oleObj>
               </mc:Choice>
@@ -19188,7 +19188,7 @@
           <a:graphicData uri="http://schemas.openxmlformats.org/presentationml/2006/ole">
             <mc:AlternateContent xmlns:mc="http://schemas.openxmlformats.org/markup-compatibility/2006">
               <mc:Choice xmlns:v="urn:schemas-microsoft-com:vml" Requires="v">
-                <p:oleObj spid="_x0000_s420050" name="Equation" r:id="rId6" imgW="2044700" imgH="228600" progId="Equation.DSMT4">
+                <p:oleObj spid="_x0000_s420060" name="Equation" r:id="rId6" imgW="2044700" imgH="228600" progId="Equation.DSMT4">
                   <p:embed/>
                 </p:oleObj>
               </mc:Choice>
@@ -19328,7 +19328,7 @@
           <a:graphicData uri="http://schemas.openxmlformats.org/presentationml/2006/ole">
             <mc:AlternateContent xmlns:mc="http://schemas.openxmlformats.org/markup-compatibility/2006">
               <mc:Choice xmlns:v="urn:schemas-microsoft-com:vml" Requires="v">
-                <p:oleObj spid="_x0000_s420051" name="Equation" r:id="rId8" imgW="2159000" imgH="457200" progId="Equation.DSMT4">
+                <p:oleObj spid="_x0000_s420061" name="Equation" r:id="rId8" imgW="2159000" imgH="457200" progId="Equation.DSMT4">
                   <p:embed/>
                 </p:oleObj>
               </mc:Choice>
@@ -19643,7 +19643,7 @@
           <a:graphicData uri="http://schemas.openxmlformats.org/presentationml/2006/ole">
             <mc:AlternateContent xmlns:mc="http://schemas.openxmlformats.org/markup-compatibility/2006">
               <mc:Choice xmlns:v="urn:schemas-microsoft-com:vml" Requires="v">
-                <p:oleObj spid="_x0000_s542747" name="Equation" r:id="rId4" imgW="1333500" imgH="482600" progId="Equation.DSMT4">
+                <p:oleObj spid="_x0000_s542751" name="Equation" r:id="rId4" imgW="1333500" imgH="482600" progId="Equation.DSMT4">
                   <p:embed/>
                 </p:oleObj>
               </mc:Choice>
@@ -19818,7 +19818,7 @@
           <a:graphicData uri="http://schemas.openxmlformats.org/presentationml/2006/ole">
             <mc:AlternateContent xmlns:mc="http://schemas.openxmlformats.org/markup-compatibility/2006">
               <mc:Choice xmlns:v="urn:schemas-microsoft-com:vml" Requires="v">
-                <p:oleObj spid="_x0000_s544815" name="Equation" r:id="rId4" imgW="1333500" imgH="482600" progId="Equation.DSMT4">
+                <p:oleObj spid="_x0000_s544822" name="Equation" r:id="rId4" imgW="1333500" imgH="482600" progId="Equation.DSMT4">
                   <p:embed/>
                 </p:oleObj>
               </mc:Choice>
@@ -19978,7 +19978,7 @@
           <a:graphicData uri="http://schemas.openxmlformats.org/presentationml/2006/ole">
             <mc:AlternateContent xmlns:mc="http://schemas.openxmlformats.org/markup-compatibility/2006">
               <mc:Choice xmlns:v="urn:schemas-microsoft-com:vml" Requires="v">
-                <p:oleObj spid="_x0000_s544816" name="Equation" r:id="rId6" imgW="698500" imgH="254000" progId="Equation.DSMT4">
+                <p:oleObj spid="_x0000_s544823" name="Equation" r:id="rId6" imgW="698500" imgH="254000" progId="Equation.DSMT4">
                   <p:embed/>
                 </p:oleObj>
               </mc:Choice>
@@ -20290,13 +20290,7 @@
               <a:rPr lang="en-US" sz="5400" dirty="0" smtClean="0">
                 <a:latin typeface="Comic Sans MS" pitchFamily="66" charset="0"/>
               </a:rPr>
-              <a:t>ame </a:t>
-            </a:r>
-            <a:r>
-              <a:rPr lang="en-US" sz="5400" dirty="0" smtClean="0">
-                <a:latin typeface="Comic Sans MS" pitchFamily="66" charset="0"/>
-              </a:rPr>
-              <a:t>for </a:t>
+              <a:t>ame for </a:t>
             </a:r>
             <a:r>
               <a:rPr lang="en-US" sz="5400" dirty="0" smtClean="0">
@@ -20401,7 +20395,7 @@
           <a:graphicData uri="http://schemas.openxmlformats.org/presentationml/2006/ole">
             <mc:AlternateContent xmlns:mc="http://schemas.openxmlformats.org/markup-compatibility/2006">
               <mc:Choice xmlns:v="urn:schemas-microsoft-com:vml" Requires="v">
-                <p:oleObj spid="_x0000_s525410" name="Equation" r:id="rId4" imgW="1333500" imgH="482600" progId="Equation.DSMT4">
+                <p:oleObj spid="_x0000_s525420" name="Equation" r:id="rId4" imgW="1333500" imgH="482600" progId="Equation.DSMT4">
                   <p:embed/>
                 </p:oleObj>
               </mc:Choice>
@@ -20493,7 +20487,7 @@
           <a:graphicData uri="http://schemas.openxmlformats.org/presentationml/2006/ole">
             <mc:AlternateContent xmlns:mc="http://schemas.openxmlformats.org/markup-compatibility/2006">
               <mc:Choice xmlns:v="urn:schemas-microsoft-com:vml" Requires="v">
-                <p:oleObj spid="_x0000_s525411" name="Equation" r:id="rId6" imgW="1333500" imgH="482600" progId="Equation.DSMT4">
+                <p:oleObj spid="_x0000_s525421" name="Equation" r:id="rId6" imgW="1333500" imgH="482600" progId="Equation.DSMT4">
                   <p:embed/>
                 </p:oleObj>
               </mc:Choice>
@@ -20537,25 +20531,25 @@
           <p:nvPr>
             <p:extLst>
               <p:ext uri="{D42A27DB-BD31-4B8C-83A1-F6EECF244321}">
-                <p14:modId xmlns:p14="http://schemas.microsoft.com/office/powerpoint/2010/main" val="3112501937"/>
+                <p14:modId xmlns:p14="http://schemas.microsoft.com/office/powerpoint/2010/main" val="2639636780"/>
               </p:ext>
             </p:extLst>
           </p:nvPr>
         </p:nvGraphicFramePr>
         <p:xfrm>
-          <a:off x="2953672" y="4721341"/>
-          <a:ext cx="3172598" cy="1149351"/>
+          <a:off x="2909888" y="4721225"/>
+          <a:ext cx="3262312" cy="1149350"/>
         </p:xfrm>
         <a:graphic>
           <a:graphicData uri="http://schemas.openxmlformats.org/presentationml/2006/ole">
             <mc:AlternateContent xmlns:mc="http://schemas.openxmlformats.org/markup-compatibility/2006">
               <mc:Choice xmlns:v="urn:schemas-microsoft-com:vml" Requires="v">
-                <p:oleObj spid="_x0000_s525412" name="Equation" r:id="rId8" imgW="1333500" imgH="482600" progId="Equation.DSMT4">
+                <p:oleObj spid="_x0000_s525422" name="Equation" r:id="rId8" imgW="1371600" imgH="482600" progId="Equation.DSMT4">
                   <p:embed/>
                 </p:oleObj>
               </mc:Choice>
               <mc:Fallback>
-                <p:oleObj name="Equation" r:id="rId8" imgW="1333500" imgH="482600" progId="Equation.DSMT4">
+                <p:oleObj name="Equation" r:id="rId8" imgW="1371600" imgH="482600" progId="Equation.DSMT4">
                   <p:embed/>
                   <p:pic>
                     <p:nvPicPr>
@@ -20571,8 +20565,8 @@
                     </p:blipFill>
                     <p:spPr>
                       <a:xfrm>
-                        <a:off x="2953672" y="4721341"/>
-                        <a:ext cx="3172598" cy="1149351"/>
+                        <a:off x="2909888" y="4721225"/>
+                        <a:ext cx="3262312" cy="1149350"/>
                       </a:xfrm>
                       <a:prstGeom prst="rect">
                         <a:avLst/>
@@ -21221,7 +21215,7 @@
           <a:graphicData uri="http://schemas.openxmlformats.org/presentationml/2006/ole">
             <mc:AlternateContent xmlns:mc="http://schemas.openxmlformats.org/markup-compatibility/2006">
               <mc:Choice xmlns:v="urn:schemas-microsoft-com:vml" Requires="v">
-                <p:oleObj spid="_x0000_s628746" name="Equation" r:id="rId4" imgW="1333500" imgH="482600" progId="Equation.DSMT4">
+                <p:oleObj spid="_x0000_s628756" name="Equation" r:id="rId4" imgW="1333500" imgH="482600" progId="Equation.DSMT4">
                   <p:embed/>
                 </p:oleObj>
               </mc:Choice>
@@ -21313,7 +21307,7 @@
           <a:graphicData uri="http://schemas.openxmlformats.org/presentationml/2006/ole">
             <mc:AlternateContent xmlns:mc="http://schemas.openxmlformats.org/markup-compatibility/2006">
               <mc:Choice xmlns:v="urn:schemas-microsoft-com:vml" Requires="v">
-                <p:oleObj spid="_x0000_s628747" name="Equation" r:id="rId6" imgW="1333500" imgH="482600" progId="Equation.DSMT4">
+                <p:oleObj spid="_x0000_s628757" name="Equation" r:id="rId6" imgW="1333500" imgH="482600" progId="Equation.DSMT4">
                   <p:embed/>
                 </p:oleObj>
               </mc:Choice>
@@ -21335,63 +21329,6 @@
                     <p:spPr>
                       <a:xfrm>
                         <a:off x="4736112" y="3340100"/>
-                        <a:ext cx="3172598" cy="1149351"/>
-                      </a:xfrm>
-                      <a:prstGeom prst="rect">
-                        <a:avLst/>
-                      </a:prstGeom>
-                    </p:spPr>
-                  </p:pic>
-                </p:oleObj>
-              </mc:Fallback>
-            </mc:AlternateContent>
-          </a:graphicData>
-        </a:graphic>
-      </p:graphicFrame>
-      <p:graphicFrame>
-        <p:nvGraphicFramePr>
-          <p:cNvPr id="11" name="Object 10"/>
-          <p:cNvGraphicFramePr>
-            <a:graphicFrameLocks noChangeAspect="1"/>
-          </p:cNvGraphicFramePr>
-          <p:nvPr>
-            <p:extLst>
-              <p:ext uri="{D42A27DB-BD31-4B8C-83A1-F6EECF244321}">
-                <p14:modId xmlns:p14="http://schemas.microsoft.com/office/powerpoint/2010/main" val="3168840683"/>
-              </p:ext>
-            </p:extLst>
-          </p:nvPr>
-        </p:nvGraphicFramePr>
-        <p:xfrm>
-          <a:off x="2953672" y="4721341"/>
-          <a:ext cx="3172598" cy="1149351"/>
-        </p:xfrm>
-        <a:graphic>
-          <a:graphicData uri="http://schemas.openxmlformats.org/presentationml/2006/ole">
-            <mc:AlternateContent xmlns:mc="http://schemas.openxmlformats.org/markup-compatibility/2006">
-              <mc:Choice xmlns:v="urn:schemas-microsoft-com:vml" Requires="v">
-                <p:oleObj spid="_x0000_s628748" name="Equation" r:id="rId8" imgW="1333500" imgH="482600" progId="Equation.DSMT4">
-                  <p:embed/>
-                </p:oleObj>
-              </mc:Choice>
-              <mc:Fallback>
-                <p:oleObj name="Equation" r:id="rId8" imgW="1333500" imgH="482600" progId="Equation.DSMT4">
-                  <p:embed/>
-                  <p:pic>
-                    <p:nvPicPr>
-                      <p:cNvPr id="0" name=""/>
-                      <p:cNvPicPr/>
-                      <p:nvPr/>
-                    </p:nvPicPr>
-                    <p:blipFill>
-                      <a:blip r:embed="rId9"/>
-                      <a:stretch>
-                        <a:fillRect/>
-                      </a:stretch>
-                    </p:blipFill>
-                    <p:spPr>
-                      <a:xfrm>
-                        <a:off x="2953672" y="4721341"/>
                         <a:ext cx="3172598" cy="1149351"/>
                       </a:xfrm>
                       <a:prstGeom prst="rect">
@@ -21604,6 +21541,63 @@
           <a:effectLst/>
         </p:spPr>
       </p:cxnSp>
+      <p:graphicFrame>
+        <p:nvGraphicFramePr>
+          <p:cNvPr id="14" name="Object 13"/>
+          <p:cNvGraphicFramePr>
+            <a:graphicFrameLocks noChangeAspect="1"/>
+          </p:cNvGraphicFramePr>
+          <p:nvPr>
+            <p:extLst>
+              <p:ext uri="{D42A27DB-BD31-4B8C-83A1-F6EECF244321}">
+                <p14:modId xmlns:p14="http://schemas.microsoft.com/office/powerpoint/2010/main" val="2943451757"/>
+              </p:ext>
+            </p:extLst>
+          </p:nvPr>
+        </p:nvGraphicFramePr>
+        <p:xfrm>
+          <a:off x="2909888" y="4721225"/>
+          <a:ext cx="3262312" cy="1149350"/>
+        </p:xfrm>
+        <a:graphic>
+          <a:graphicData uri="http://schemas.openxmlformats.org/presentationml/2006/ole">
+            <mc:AlternateContent xmlns:mc="http://schemas.openxmlformats.org/markup-compatibility/2006">
+              <mc:Choice xmlns:v="urn:schemas-microsoft-com:vml" Requires="v">
+                <p:oleObj spid="_x0000_s628758" name="Equation" r:id="rId8" imgW="1371600" imgH="482600" progId="Equation.DSMT4">
+                  <p:embed/>
+                </p:oleObj>
+              </mc:Choice>
+              <mc:Fallback>
+                <p:oleObj name="Equation" r:id="rId8" imgW="1371600" imgH="482600" progId="Equation.DSMT4">
+                  <p:embed/>
+                  <p:pic>
+                    <p:nvPicPr>
+                      <p:cNvPr id="0" name=""/>
+                      <p:cNvPicPr/>
+                      <p:nvPr/>
+                    </p:nvPicPr>
+                    <p:blipFill>
+                      <a:blip r:embed="rId9"/>
+                      <a:stretch>
+                        <a:fillRect/>
+                      </a:stretch>
+                    </p:blipFill>
+                    <p:spPr>
+                      <a:xfrm>
+                        <a:off x="2909888" y="4721225"/>
+                        <a:ext cx="3262312" cy="1149350"/>
+                      </a:xfrm>
+                      <a:prstGeom prst="rect">
+                        <a:avLst/>
+                      </a:prstGeom>
+                    </p:spPr>
+                  </p:pic>
+                </p:oleObj>
+              </mc:Fallback>
+            </mc:AlternateContent>
+          </a:graphicData>
+        </a:graphic>
+      </p:graphicFrame>
     </p:spTree>
     <p:extLst>
       <p:ext uri="{BB962C8B-B14F-4D97-AF65-F5344CB8AC3E}">
@@ -21614,13 +21608,13 @@
   <p:clrMapOvr>
     <a:masterClrMapping/>
   </p:clrMapOvr>
-  <mc:AlternateContent xmlns:mc="http://schemas.openxmlformats.org/markup-compatibility/2006">
-    <mc:Choice xmlns:p14="http://schemas.microsoft.com/office/powerpoint/2010/main" Requires="p14">
+  <mc:AlternateContent xmlns:mc="http://schemas.openxmlformats.org/markup-compatibility/2006" xmlns:p14="http://schemas.microsoft.com/office/powerpoint/2010/main">
+    <mc:Choice Requires="p14">
       <p:transition spd="slow" p14:dur="1100" advClick="0">
         <p:fade/>
       </p:transition>
     </mc:Choice>
-    <mc:Fallback>
+    <mc:Fallback xmlns="">
       <p:transition xmlns:p14="http://schemas.microsoft.com/office/powerpoint/2010/main" spd="slow" advClick="0">
         <p:fade/>
       </p:transition>
@@ -21816,6 +21810,50 @@
                             </p:childTnLst>
                           </p:cTn>
                         </p:par>
+                        <p:par>
+                          <p:cTn id="20" fill="hold">
+                            <p:stCondLst>
+                              <p:cond delay="1000"/>
+                            </p:stCondLst>
+                            <p:childTnLst>
+                              <p:par>
+                                <p:cTn id="21" presetID="10" presetClass="entr" presetSubtype="0" fill="hold" nodeType="afterEffect">
+                                  <p:stCondLst>
+                                    <p:cond delay="0"/>
+                                  </p:stCondLst>
+                                  <p:childTnLst>
+                                    <p:set>
+                                      <p:cBhvr>
+                                        <p:cTn id="22" dur="1" fill="hold">
+                                          <p:stCondLst>
+                                            <p:cond delay="0"/>
+                                          </p:stCondLst>
+                                        </p:cTn>
+                                        <p:tgtEl>
+                                          <p:spTgt spid="14"/>
+                                        </p:tgtEl>
+                                        <p:attrNameLst>
+                                          <p:attrName>style.visibility</p:attrName>
+                                        </p:attrNameLst>
+                                      </p:cBhvr>
+                                      <p:to>
+                                        <p:strVal val="visible"/>
+                                      </p:to>
+                                    </p:set>
+                                    <p:animEffect transition="in" filter="fade">
+                                      <p:cBhvr>
+                                        <p:cTn id="23" dur="500"/>
+                                        <p:tgtEl>
+                                          <p:spTgt spid="14"/>
+                                        </p:tgtEl>
+                                      </p:cBhvr>
+                                    </p:animEffect>
+                                  </p:childTnLst>
+                                </p:cTn>
+                              </p:par>
+                            </p:childTnLst>
+                          </p:cTn>
+                        </p:par>
                       </p:childTnLst>
                     </p:cTn>
                   </p:par>
@@ -21919,7 +21957,7 @@
           <a:graphicData uri="http://schemas.openxmlformats.org/presentationml/2006/ole">
             <mc:AlternateContent xmlns:mc="http://schemas.openxmlformats.org/markup-compatibility/2006">
               <mc:Choice xmlns:v="urn:schemas-microsoft-com:vml" Requires="v">
-                <p:oleObj spid="_x0000_s630797" name="Equation" r:id="rId4" imgW="1333500" imgH="482600" progId="Equation.DSMT4">
+                <p:oleObj spid="_x0000_s630807" name="Equation" r:id="rId4" imgW="1333500" imgH="482600" progId="Equation.DSMT4">
                   <p:embed/>
                 </p:oleObj>
               </mc:Choice>
@@ -21998,20 +22036,20 @@
           <p:nvPr>
             <p:extLst>
               <p:ext uri="{D42A27DB-BD31-4B8C-83A1-F6EECF244321}">
-                <p14:modId xmlns:p14="http://schemas.microsoft.com/office/powerpoint/2010/main" val="3353763863"/>
+                <p14:modId xmlns:p14="http://schemas.microsoft.com/office/powerpoint/2010/main" val="851805598"/>
               </p:ext>
             </p:extLst>
           </p:nvPr>
         </p:nvGraphicFramePr>
         <p:xfrm>
-          <a:off x="4916488" y="3309938"/>
+          <a:off x="4741320" y="3288040"/>
           <a:ext cx="2811462" cy="1209675"/>
         </p:xfrm>
         <a:graphic>
           <a:graphicData uri="http://schemas.openxmlformats.org/presentationml/2006/ole">
             <mc:AlternateContent xmlns:mc="http://schemas.openxmlformats.org/markup-compatibility/2006">
               <mc:Choice xmlns:v="urn:schemas-microsoft-com:vml" Requires="v">
-                <p:oleObj spid="_x0000_s630798" name="Equation" r:id="rId6" imgW="1181100" imgH="508000" progId="Equation.DSMT4">
+                <p:oleObj spid="_x0000_s630808" name="Equation" r:id="rId6" imgW="1181100" imgH="508000" progId="Equation.DSMT4">
                   <p:embed/>
                 </p:oleObj>
               </mc:Choice>
@@ -22032,7 +22070,7 @@
                     </p:blipFill>
                     <p:spPr>
                       <a:xfrm>
-                        <a:off x="4916488" y="3309938"/>
+                        <a:off x="4741320" y="3288040"/>
                         <a:ext cx="2811462" cy="1209675"/>
                       </a:xfrm>
                       <a:prstGeom prst="rect">
@@ -22055,25 +22093,25 @@
           <p:nvPr>
             <p:extLst>
               <p:ext uri="{D42A27DB-BD31-4B8C-83A1-F6EECF244321}">
-                <p14:modId xmlns:p14="http://schemas.microsoft.com/office/powerpoint/2010/main" val="3023742709"/>
+                <p14:modId xmlns:p14="http://schemas.microsoft.com/office/powerpoint/2010/main" val="4140384609"/>
               </p:ext>
             </p:extLst>
           </p:nvPr>
         </p:nvGraphicFramePr>
         <p:xfrm>
-          <a:off x="3179763" y="4992688"/>
-          <a:ext cx="2719387" cy="604837"/>
+          <a:off x="2905405" y="4718963"/>
+          <a:ext cx="2809875" cy="604837"/>
         </p:xfrm>
         <a:graphic>
           <a:graphicData uri="http://schemas.openxmlformats.org/presentationml/2006/ole">
             <mc:AlternateContent xmlns:mc="http://schemas.openxmlformats.org/markup-compatibility/2006">
               <mc:Choice xmlns:v="urn:schemas-microsoft-com:vml" Requires="v">
-                <p:oleObj spid="_x0000_s630799" name="Equation" r:id="rId8" imgW="1143000" imgH="254000" progId="Equation.DSMT4">
+                <p:oleObj spid="_x0000_s630809" name="Equation" r:id="rId8" imgW="1181100" imgH="254000" progId="Equation.DSMT4">
                   <p:embed/>
                 </p:oleObj>
               </mc:Choice>
               <mc:Fallback>
-                <p:oleObj name="Equation" r:id="rId8" imgW="1143000" imgH="254000" progId="Equation.DSMT4">
+                <p:oleObj name="Equation" r:id="rId8" imgW="1181100" imgH="254000" progId="Equation.DSMT4">
                   <p:embed/>
                   <p:pic>
                     <p:nvPicPr>
@@ -22089,8 +22127,8 @@
                     </p:blipFill>
                     <p:spPr>
                       <a:xfrm>
-                        <a:off x="3179763" y="4992688"/>
-                        <a:ext cx="2719387" cy="604837"/>
+                        <a:off x="2905405" y="4718963"/>
+                        <a:ext cx="2809875" cy="604837"/>
                       </a:xfrm>
                       <a:prstGeom prst="rect">
                         <a:avLst/>
@@ -22399,13 +22437,13 @@
   <p:clrMapOvr>
     <a:masterClrMapping/>
   </p:clrMapOvr>
-  <mc:AlternateContent xmlns:mc="http://schemas.openxmlformats.org/markup-compatibility/2006">
-    <mc:Choice xmlns:p14="http://schemas.microsoft.com/office/powerpoint/2010/main" Requires="p14">
+  <mc:AlternateContent xmlns:mc="http://schemas.openxmlformats.org/markup-compatibility/2006" xmlns:p14="http://schemas.microsoft.com/office/powerpoint/2010/main">
+    <mc:Choice Requires="p14">
       <p:transition spd="med" p14:dur="600" advClick="0">
         <p:fade/>
       </p:transition>
     </mc:Choice>
-    <mc:Fallback>
+    <mc:Fallback xmlns="">
       <p:transition xmlns:p14="http://schemas.microsoft.com/office/powerpoint/2010/main" spd="med" advClick="0">
         <p:fade/>
       </p:transition>
@@ -22665,7 +22703,7 @@
           <a:graphicData uri="http://schemas.openxmlformats.org/presentationml/2006/ole">
             <mc:AlternateContent xmlns:mc="http://schemas.openxmlformats.org/markup-compatibility/2006">
               <mc:Choice xmlns:v="urn:schemas-microsoft-com:vml" Requires="v">
-                <p:oleObj spid="_x0000_s529446" name="Equation" r:id="rId4" imgW="2692400" imgH="482600" progId="Equation.DSMT4">
+                <p:oleObj spid="_x0000_s529450" name="Equation" r:id="rId4" imgW="2692400" imgH="482600" progId="Equation.DSMT4">
                   <p:embed/>
                 </p:oleObj>
               </mc:Choice>
@@ -23447,13 +23485,13 @@
   <p:clrMapOvr>
     <a:masterClrMapping/>
   </p:clrMapOvr>
-  <mc:AlternateContent xmlns:mc="http://schemas.openxmlformats.org/markup-compatibility/2006" xmlns:p14="http://schemas.microsoft.com/office/powerpoint/2010/main">
-    <mc:Choice Requires="p14">
+  <mc:AlternateContent xmlns:mc="http://schemas.openxmlformats.org/markup-compatibility/2006">
+    <mc:Choice xmlns:p14="http://schemas.microsoft.com/office/powerpoint/2010/main" Requires="p14">
       <p:transition spd="med" p14:dur="700" advClick="0">
         <p:fade/>
       </p:transition>
     </mc:Choice>
-    <mc:Fallback xmlns="">
+    <mc:Fallback>
       <p:transition xmlns:p14="http://schemas.microsoft.com/office/powerpoint/2010/main" spd="med" advClick="0">
         <p:fade/>
       </p:transition>
@@ -23628,13 +23666,13 @@
   <p:clrMapOvr>
     <a:masterClrMapping/>
   </p:clrMapOvr>
-  <mc:AlternateContent xmlns:mc="http://schemas.openxmlformats.org/markup-compatibility/2006" xmlns:p14="http://schemas.microsoft.com/office/powerpoint/2010/main">
-    <mc:Choice Requires="p14">
+  <mc:AlternateContent xmlns:mc="http://schemas.openxmlformats.org/markup-compatibility/2006">
+    <mc:Choice xmlns:p14="http://schemas.microsoft.com/office/powerpoint/2010/main" Requires="p14">
       <p:transition spd="med" p14:dur="700" advClick="0">
         <p:fade/>
       </p:transition>
     </mc:Choice>
-    <mc:Fallback xmlns="">
+    <mc:Fallback>
       <p:transition xmlns:p14="http://schemas.microsoft.com/office/powerpoint/2010/main" spd="med" advClick="0">
         <p:fade/>
       </p:transition>
@@ -24002,7 +24040,7 @@
           <a:graphicData uri="http://schemas.openxmlformats.org/presentationml/2006/ole">
             <mc:AlternateContent xmlns:mc="http://schemas.openxmlformats.org/markup-compatibility/2006">
               <mc:Choice xmlns:v="urn:schemas-microsoft-com:vml" Requires="v">
-                <p:oleObj spid="_x0000_s1103" name="Equation" r:id="rId4" imgW="1295400" imgH="228600" progId="Equation.DSMT4">
+                <p:oleObj spid="_x0000_s1107" name="Equation" r:id="rId4" imgW="1295400" imgH="228600" progId="Equation.DSMT4">
                   <p:embed/>
                 </p:oleObj>
               </mc:Choice>
@@ -24934,7 +24972,7 @@
           <a:graphicData uri="http://schemas.openxmlformats.org/presentationml/2006/ole">
             <mc:AlternateContent xmlns:mc="http://schemas.openxmlformats.org/markup-compatibility/2006">
               <mc:Choice xmlns:v="urn:schemas-microsoft-com:vml" Requires="v">
-                <p:oleObj spid="_x0000_s422986" name="Equation" r:id="rId4" imgW="1498600" imgH="457200" progId="Equation.DSMT4">
+                <p:oleObj spid="_x0000_s422990" name="Equation" r:id="rId4" imgW="1498600" imgH="457200" progId="Equation.DSMT4">
                   <p:embed/>
                 </p:oleObj>
               </mc:Choice>
@@ -25177,7 +25215,7 @@
           <a:graphicData uri="http://schemas.openxmlformats.org/presentationml/2006/ole">
             <mc:AlternateContent xmlns:mc="http://schemas.openxmlformats.org/markup-compatibility/2006">
               <mc:Choice xmlns:v="urn:schemas-microsoft-com:vml" Requires="v">
-                <p:oleObj spid="_x0000_s421962" name="Equation" r:id="rId4" imgW="1600200" imgH="457200" progId="Equation.DSMT4">
+                <p:oleObj spid="_x0000_s421966" name="Equation" r:id="rId4" imgW="1600200" imgH="457200" progId="Equation.DSMT4">
                   <p:embed/>
                 </p:oleObj>
               </mc:Choice>
@@ -25640,7 +25678,7 @@
           <a:graphicData uri="http://schemas.openxmlformats.org/presentationml/2006/ole">
             <mc:AlternateContent xmlns:mc="http://schemas.openxmlformats.org/markup-compatibility/2006">
               <mc:Choice xmlns:v="urn:schemas-microsoft-com:vml" Requires="v">
-                <p:oleObj spid="_x0000_s435260" name="Equation" r:id="rId4" imgW="2108200" imgH="228600" progId="Equation.DSMT4">
+                <p:oleObj spid="_x0000_s435264" name="Equation" r:id="rId4" imgW="2108200" imgH="228600" progId="Equation.DSMT4">
                   <p:embed/>
                 </p:oleObj>
               </mc:Choice>

</xml_diff>

<commit_message>
mention canonical in prpostn_algebra.pptx
</commit_message>
<xml_diff>
--- a/spring18/slidesS18/prpostn_algebra.pptx
+++ b/spring18/slidesS18/prpostn_algebra.pptx
@@ -6,10 +6,10 @@
     <p:sldMasterId id="2147483651" r:id="rId2"/>
   </p:sldMasterIdLst>
   <p:notesMasterIdLst>
-    <p:notesMasterId r:id="rId56"/>
+    <p:notesMasterId r:id="rId55"/>
   </p:notesMasterIdLst>
   <p:handoutMasterIdLst>
-    <p:handoutMasterId r:id="rId57"/>
+    <p:handoutMasterId r:id="rId56"/>
   </p:handoutMasterIdLst>
   <p:sldIdLst>
     <p:sldId id="392" r:id="rId3"/>
@@ -55,21 +55,20 @@
     <p:sldId id="553" r:id="rId43"/>
     <p:sldId id="568" r:id="rId44"/>
     <p:sldId id="566" r:id="rId45"/>
-    <p:sldId id="567" r:id="rId46"/>
-    <p:sldId id="572" r:id="rId47"/>
-    <p:sldId id="557" r:id="rId48"/>
-    <p:sldId id="531" r:id="rId49"/>
-    <p:sldId id="536" r:id="rId50"/>
-    <p:sldId id="537" r:id="rId51"/>
-    <p:sldId id="538" r:id="rId52"/>
-    <p:sldId id="503" r:id="rId53"/>
-    <p:sldId id="523" r:id="rId54"/>
-    <p:sldId id="504" r:id="rId55"/>
+    <p:sldId id="572" r:id="rId46"/>
+    <p:sldId id="573" r:id="rId47"/>
+    <p:sldId id="531" r:id="rId48"/>
+    <p:sldId id="536" r:id="rId49"/>
+    <p:sldId id="537" r:id="rId50"/>
+    <p:sldId id="538" r:id="rId51"/>
+    <p:sldId id="503" r:id="rId52"/>
+    <p:sldId id="575" r:id="rId53"/>
+    <p:sldId id="504" r:id="rId54"/>
   </p:sldIdLst>
   <p:sldSz cx="9144000" cy="6858000" type="screen4x3"/>
   <p:notesSz cx="9601200" cy="7315200"/>
   <p:custDataLst>
-    <p:tags r:id="rId59"/>
+    <p:tags r:id="rId58"/>
   </p:custDataLst>
   <p:defaultTextStyle>
     <a:defPPr>
@@ -4718,88 +4717,6 @@
               <a:rPr lang="en-US" smtClean="0"/>
               <a:pPr/>
               <a:t>52</a:t>
-            </a:fld>
-            <a:endParaRPr lang="en-US"/>
-          </a:p>
-        </p:txBody>
-      </p:sp>
-    </p:spTree>
-  </p:cSld>
-  <p:clrMapOvr>
-    <a:masterClrMapping/>
-  </p:clrMapOvr>
-</p:notes>
-</file>
-
-<file path=ppt/notesSlides/notesSlide52.xml><?xml version="1.0" encoding="utf-8"?>
-<p:notes xmlns:a="http://schemas.openxmlformats.org/drawingml/2006/main" xmlns:r="http://schemas.openxmlformats.org/officeDocument/2006/relationships" xmlns:p="http://schemas.openxmlformats.org/presentationml/2006/main">
-  <p:cSld>
-    <p:spTree>
-      <p:nvGrpSpPr>
-        <p:cNvPr id="1" name=""/>
-        <p:cNvGrpSpPr/>
-        <p:nvPr/>
-      </p:nvGrpSpPr>
-      <p:grpSpPr>
-        <a:xfrm>
-          <a:off x="0" y="0"/>
-          <a:ext cx="0" cy="0"/>
-          <a:chOff x="0" y="0"/>
-          <a:chExt cx="0" cy="0"/>
-        </a:xfrm>
-      </p:grpSpPr>
-      <p:sp>
-        <p:nvSpPr>
-          <p:cNvPr id="2" name="Slide Image Placeholder 1"/>
-          <p:cNvSpPr>
-            <a:spLocks noGrp="1" noRot="1" noChangeAspect="1"/>
-          </p:cNvSpPr>
-          <p:nvPr>
-            <p:ph type="sldImg"/>
-          </p:nvPr>
-        </p:nvSpPr>
-        <p:spPr/>
-      </p:sp>
-      <p:sp>
-        <p:nvSpPr>
-          <p:cNvPr id="3" name="Notes Placeholder 2"/>
-          <p:cNvSpPr>
-            <a:spLocks noGrp="1"/>
-          </p:cNvSpPr>
-          <p:nvPr>
-            <p:ph type="body" idx="1"/>
-          </p:nvPr>
-        </p:nvSpPr>
-        <p:spPr/>
-        <p:txBody>
-          <a:bodyPr>
-            <a:normAutofit/>
-          </a:bodyPr>
-          <a:lstStyle/>
-          <a:p>
-            <a:endParaRPr lang="en-US"/>
-          </a:p>
-        </p:txBody>
-      </p:sp>
-      <p:sp>
-        <p:nvSpPr>
-          <p:cNvPr id="4" name="Slide Number Placeholder 3"/>
-          <p:cNvSpPr>
-            <a:spLocks noGrp="1"/>
-          </p:cNvSpPr>
-          <p:nvPr>
-            <p:ph type="sldNum" sz="quarter" idx="10"/>
-          </p:nvPr>
-        </p:nvSpPr>
-        <p:spPr/>
-        <p:txBody>
-          <a:bodyPr/>
-          <a:lstStyle/>
-          <a:p>
-            <a:fld id="{A02B9F3F-3042-489F-AF35-1A733968F079}" type="slidenum">
-              <a:rPr lang="en-US" smtClean="0"/>
-              <a:pPr/>
-              <a:t>53</a:t>
             </a:fld>
             <a:endParaRPr lang="en-US"/>
           </a:p>
@@ -9320,7 +9237,7 @@
           <a:graphicData uri="http://schemas.openxmlformats.org/presentationml/2006/ole">
             <mc:AlternateContent xmlns:mc="http://schemas.openxmlformats.org/markup-compatibility/2006">
               <mc:Choice xmlns:v="urn:schemas-microsoft-com:vml" Requires="v">
-                <p:oleObj spid="_x0000_s439372" name="Equation" r:id="rId4" imgW="2146300" imgH="228600" progId="Equation.DSMT4">
+                <p:oleObj spid="_x0000_s439379" name="Equation" r:id="rId4" imgW="2146300" imgH="228600" progId="Equation.DSMT4">
                   <p:embed/>
                 </p:oleObj>
               </mc:Choice>
@@ -9636,7 +9553,7 @@
           <a:graphicData uri="http://schemas.openxmlformats.org/presentationml/2006/ole">
             <mc:AlternateContent xmlns:mc="http://schemas.openxmlformats.org/markup-compatibility/2006">
               <mc:Choice xmlns:v="urn:schemas-microsoft-com:vml" Requires="v">
-                <p:oleObj spid="_x0000_s434315" name="Equation" r:id="rId4" imgW="2146300" imgH="228600" progId="Equation.DSMT4">
+                <p:oleObj spid="_x0000_s434326" name="Equation" r:id="rId4" imgW="2146300" imgH="228600" progId="Equation.DSMT4">
                   <p:embed/>
                 </p:oleObj>
               </mc:Choice>
@@ -9693,7 +9610,7 @@
           <a:graphicData uri="http://schemas.openxmlformats.org/presentationml/2006/ole">
             <mc:AlternateContent xmlns:mc="http://schemas.openxmlformats.org/markup-compatibility/2006">
               <mc:Choice xmlns:v="urn:schemas-microsoft-com:vml" Requires="v">
-                <p:oleObj spid="_x0000_s434316" name="Equation" r:id="rId6" imgW="2514600" imgH="228600" progId="Equation.DSMT4">
+                <p:oleObj spid="_x0000_s434327" name="Equation" r:id="rId6" imgW="2514600" imgH="228600" progId="Equation.DSMT4">
                   <p:embed/>
                 </p:oleObj>
               </mc:Choice>
@@ -9874,7 +9791,7 @@
           <a:graphicData uri="http://schemas.openxmlformats.org/presentationml/2006/ole">
             <mc:AlternateContent xmlns:mc="http://schemas.openxmlformats.org/markup-compatibility/2006">
               <mc:Choice xmlns:v="urn:schemas-microsoft-com:vml" Requires="v">
-                <p:oleObj spid="_x0000_s436328" name="Equation" r:id="rId4" imgW="2514600" imgH="228600" progId="Equation.DSMT4">
+                <p:oleObj spid="_x0000_s436335" name="Equation" r:id="rId4" imgW="2514600" imgH="228600" progId="Equation.DSMT4">
                   <p:embed/>
                 </p:oleObj>
               </mc:Choice>
@@ -10109,7 +10026,7 @@
           <a:graphicData uri="http://schemas.openxmlformats.org/presentationml/2006/ole">
             <mc:AlternateContent xmlns:mc="http://schemas.openxmlformats.org/markup-compatibility/2006">
               <mc:Choice xmlns:v="urn:schemas-microsoft-com:vml" Requires="v">
-                <p:oleObj spid="_x0000_s437408" name="Equation" r:id="rId4" imgW="2514600" imgH="228600" progId="Equation.DSMT4">
+                <p:oleObj spid="_x0000_s437419" name="Equation" r:id="rId4" imgW="2514600" imgH="228600" progId="Equation.DSMT4">
                   <p:embed/>
                 </p:oleObj>
               </mc:Choice>
@@ -10166,7 +10083,7 @@
           <a:graphicData uri="http://schemas.openxmlformats.org/presentationml/2006/ole">
             <mc:AlternateContent xmlns:mc="http://schemas.openxmlformats.org/markup-compatibility/2006">
               <mc:Choice xmlns:v="urn:schemas-microsoft-com:vml" Requires="v">
-                <p:oleObj spid="_x0000_s437409" name="Equation" r:id="rId6" imgW="1866900" imgH="228600" progId="Equation.DSMT4">
+                <p:oleObj spid="_x0000_s437420" name="Equation" r:id="rId6" imgW="1866900" imgH="228600" progId="Equation.DSMT4">
                   <p:embed/>
                 </p:oleObj>
               </mc:Choice>
@@ -10347,7 +10264,7 @@
           <a:graphicData uri="http://schemas.openxmlformats.org/presentationml/2006/ole">
             <mc:AlternateContent xmlns:mc="http://schemas.openxmlformats.org/markup-compatibility/2006">
               <mc:Choice xmlns:v="urn:schemas-microsoft-com:vml" Requires="v">
-                <p:oleObj spid="_x0000_s479324" name="Equation" r:id="rId4" imgW="1866900" imgH="228600" progId="Equation.DSMT4">
+                <p:oleObj spid="_x0000_s479331" name="Equation" r:id="rId4" imgW="1866900" imgH="228600" progId="Equation.DSMT4">
                   <p:embed/>
                 </p:oleObj>
               </mc:Choice>
@@ -10584,7 +10501,7 @@
           <a:graphicData uri="http://schemas.openxmlformats.org/presentationml/2006/ole">
             <mc:AlternateContent xmlns:mc="http://schemas.openxmlformats.org/markup-compatibility/2006">
               <mc:Choice xmlns:v="urn:schemas-microsoft-com:vml" Requires="v">
-                <p:oleObj spid="_x0000_s440508" name="Equation" r:id="rId4" imgW="1866900" imgH="228600" progId="Equation.DSMT4">
+                <p:oleObj spid="_x0000_s440519" name="Equation" r:id="rId4" imgW="1866900" imgH="228600" progId="Equation.DSMT4">
                   <p:embed/>
                 </p:oleObj>
               </mc:Choice>
@@ -10641,7 +10558,7 @@
           <a:graphicData uri="http://schemas.openxmlformats.org/presentationml/2006/ole">
             <mc:AlternateContent xmlns:mc="http://schemas.openxmlformats.org/markup-compatibility/2006">
               <mc:Choice xmlns:v="urn:schemas-microsoft-com:vml" Requires="v">
-                <p:oleObj spid="_x0000_s440509" name="Equation" r:id="rId6" imgW="1689100" imgH="254000" progId="Equation.DSMT4">
+                <p:oleObj spid="_x0000_s440520" name="Equation" r:id="rId6" imgW="1689100" imgH="254000" progId="Equation.DSMT4">
                   <p:embed/>
                 </p:oleObj>
               </mc:Choice>
@@ -10752,6 +10669,9 @@
                     <p:cTn id="3" fill="hold">
                       <p:stCondLst>
                         <p:cond delay="indefinite"/>
+                        <p:cond evt="onBegin" delay="0">
+                          <p:tn val="2"/>
+                        </p:cond>
                       </p:stCondLst>
                       <p:childTnLst>
                         <p:par>
@@ -10761,7 +10681,7 @@
                             </p:stCondLst>
                             <p:childTnLst>
                               <p:par>
-                                <p:cTn id="5" presetID="9" presetClass="exit" presetSubtype="0" fill="hold" nodeType="clickEffect">
+                                <p:cTn id="5" presetID="9" presetClass="exit" presetSubtype="0" fill="hold" nodeType="afterEffect">
                                   <p:stCondLst>
                                     <p:cond delay="0"/>
                                   </p:stCondLst>
@@ -10898,7 +10818,7 @@
           <a:graphicData uri="http://schemas.openxmlformats.org/presentationml/2006/ole">
             <mc:AlternateContent xmlns:mc="http://schemas.openxmlformats.org/markup-compatibility/2006">
               <mc:Choice xmlns:v="urn:schemas-microsoft-com:vml" Requires="v">
-                <p:oleObj spid="_x0000_s573465" name="Equation" r:id="rId4" imgW="1511300" imgH="254000" progId="Equation.DSMT4">
+                <p:oleObj spid="_x0000_s573472" name="Equation" r:id="rId4" imgW="1511300" imgH="254000" progId="Equation.DSMT4">
                   <p:embed/>
                 </p:oleObj>
               </mc:Choice>
@@ -11199,7 +11119,7 @@
           <a:graphicData uri="http://schemas.openxmlformats.org/presentationml/2006/ole">
             <mc:AlternateContent xmlns:mc="http://schemas.openxmlformats.org/markup-compatibility/2006">
               <mc:Choice xmlns:v="urn:schemas-microsoft-com:vml" Requires="v">
-                <p:oleObj spid="_x0000_s571414" name="Equation" r:id="rId4" imgW="1866900" imgH="457200" progId="Equation.DSMT4">
+                <p:oleObj spid="_x0000_s571421" name="Equation" r:id="rId4" imgW="1866900" imgH="457200" progId="Equation.DSMT4">
                   <p:embed/>
                 </p:oleObj>
               </mc:Choice>
@@ -11483,7 +11403,7 @@
           <a:graphicData uri="http://schemas.openxmlformats.org/presentationml/2006/ole">
             <mc:AlternateContent xmlns:mc="http://schemas.openxmlformats.org/markup-compatibility/2006">
               <mc:Choice xmlns:v="urn:schemas-microsoft-com:vml" Requires="v">
-                <p:oleObj spid="_x0000_s572438" name="Equation" r:id="rId4" imgW="1790700" imgH="457200" progId="Equation.DSMT4">
+                <p:oleObj spid="_x0000_s572445" name="Equation" r:id="rId4" imgW="1790700" imgH="457200" progId="Equation.DSMT4">
                   <p:embed/>
                 </p:oleObj>
               </mc:Choice>
@@ -11949,7 +11869,7 @@
           <a:graphicData uri="http://schemas.openxmlformats.org/presentationml/2006/ole">
             <mc:AlternateContent xmlns:mc="http://schemas.openxmlformats.org/markup-compatibility/2006">
               <mc:Choice xmlns:v="urn:schemas-microsoft-com:vml" Requires="v">
-                <p:oleObj spid="_x0000_s433309" name="Equation" r:id="rId4" imgW="1511300" imgH="254000" progId="Equation.DSMT4">
+                <p:oleObj spid="_x0000_s433316" name="Equation" r:id="rId4" imgW="1511300" imgH="254000" progId="Equation.DSMT4">
                   <p:embed/>
                 </p:oleObj>
               </mc:Choice>
@@ -12434,7 +12354,7 @@
           <a:graphicData uri="http://schemas.openxmlformats.org/presentationml/2006/ole">
             <mc:AlternateContent xmlns:mc="http://schemas.openxmlformats.org/markup-compatibility/2006">
               <mc:Choice xmlns:v="urn:schemas-microsoft-com:vml" Requires="v">
-                <p:oleObj spid="_x0000_s441555" name="Equation" r:id="rId4" imgW="1371600" imgH="482600" progId="Equation.DSMT4">
+                <p:oleObj spid="_x0000_s441566" name="Equation" r:id="rId4" imgW="1371600" imgH="482600" progId="Equation.DSMT4">
                   <p:embed/>
                 </p:oleObj>
               </mc:Choice>
@@ -12552,7 +12472,7 @@
           <a:graphicData uri="http://schemas.openxmlformats.org/presentationml/2006/ole">
             <mc:AlternateContent xmlns:mc="http://schemas.openxmlformats.org/markup-compatibility/2006">
               <mc:Choice xmlns:v="urn:schemas-microsoft-com:vml" Requires="v">
-                <p:oleObj spid="_x0000_s441556" name="Equation" r:id="rId6" imgW="1511300" imgH="254000" progId="Equation.DSMT4">
+                <p:oleObj spid="_x0000_s441567" name="Equation" r:id="rId6" imgW="1511300" imgH="254000" progId="Equation.DSMT4">
                   <p:embed/>
                 </p:oleObj>
               </mc:Choice>
@@ -12658,7 +12578,7 @@
           <a:graphicData uri="http://schemas.openxmlformats.org/presentationml/2006/ole">
             <mc:AlternateContent xmlns:mc="http://schemas.openxmlformats.org/markup-compatibility/2006">
               <mc:Choice xmlns:v="urn:schemas-microsoft-com:vml" Requires="v">
-                <p:oleObj spid="_x0000_s603156" name="Equation" r:id="rId4" imgW="1371600" imgH="482600" progId="Equation.DSMT4">
+                <p:oleObj spid="_x0000_s603163" name="Equation" r:id="rId4" imgW="1371600" imgH="482600" progId="Equation.DSMT4">
                   <p:embed/>
                 </p:oleObj>
               </mc:Choice>
@@ -12779,7 +12699,70 @@
   <p:timing>
     <p:tnLst>
       <p:par>
-        <p:cTn xmlns:p14="http://schemas.microsoft.com/office/powerpoint/2010/main" id="1" dur="indefinite" restart="never" nodeType="tmRoot"/>
+        <p:cTn xmlns:p14="http://schemas.microsoft.com/office/powerpoint/2010/main" id="1" dur="indefinite" restart="never" nodeType="tmRoot">
+          <p:childTnLst>
+            <p:seq concurrent="1" nextAc="seek">
+              <p:cTn id="2" dur="indefinite" nodeType="mainSeq">
+                <p:childTnLst>
+                  <p:par>
+                    <p:cTn id="3" fill="hold">
+                      <p:stCondLst>
+                        <p:cond delay="indefinite"/>
+                      </p:stCondLst>
+                      <p:childTnLst>
+                        <p:par>
+                          <p:cTn id="4" fill="hold">
+                            <p:stCondLst>
+                              <p:cond delay="0"/>
+                            </p:stCondLst>
+                            <p:childTnLst>
+                              <p:par>
+                                <p:cTn id="5" presetID="42" presetClass="path" presetSubtype="0" accel="50000" decel="50000" fill="hold" nodeType="clickEffect">
+                                  <p:stCondLst>
+                                    <p:cond delay="0"/>
+                                  </p:stCondLst>
+                                  <p:childTnLst>
+                                    <p:animMotion origin="layout" path="M -2.09302E-6 3.59473E-6 L -0.00763 -0.18067 " pathEditMode="relative" rAng="0" ptsTypes="AA">
+                                      <p:cBhvr>
+                                        <p:cTn id="6" dur="2000" fill="hold"/>
+                                        <p:tgtEl>
+                                          <p:spTgt spid="16"/>
+                                        </p:tgtEl>
+                                        <p:attrNameLst>
+                                          <p:attrName>ppt_x</p:attrName>
+                                          <p:attrName>ppt_y</p:attrName>
+                                        </p:attrNameLst>
+                                      </p:cBhvr>
+                                      <p:rCtr x="-382" y="-9045"/>
+                                    </p:animMotion>
+                                  </p:childTnLst>
+                                </p:cTn>
+                              </p:par>
+                            </p:childTnLst>
+                          </p:cTn>
+                        </p:par>
+                      </p:childTnLst>
+                    </p:cTn>
+                  </p:par>
+                </p:childTnLst>
+              </p:cTn>
+              <p:prevCondLst>
+                <p:cond evt="onPrev" delay="0">
+                  <p:tgtEl>
+                    <p:sldTgt/>
+                  </p:tgtEl>
+                </p:cond>
+              </p:prevCondLst>
+              <p:nextCondLst>
+                <p:cond evt="onNext" delay="0">
+                  <p:tgtEl>
+                    <p:sldTgt/>
+                  </p:tgtEl>
+                </p:cond>
+              </p:nextCondLst>
+            </p:seq>
+          </p:childTnLst>
+        </p:cTn>
       </p:par>
     </p:tnLst>
   </p:timing>
@@ -12787,7 +12770,7 @@
 </file>
 
 <file path=ppt/slides/slide22.xml><?xml version="1.0" encoding="utf-8"?>
-<p:sld xmlns:a="http://schemas.openxmlformats.org/drawingml/2006/main" xmlns:r="http://schemas.openxmlformats.org/officeDocument/2006/relationships" xmlns:p="http://schemas.openxmlformats.org/presentationml/2006/main">
+<p:sld xmlns:a="http://schemas.openxmlformats.org/drawingml/2006/main" xmlns:r="http://schemas.openxmlformats.org/officeDocument/2006/relationships" xmlns:p="http://schemas.openxmlformats.org/presentationml/2006/main" show="0">
   <p:cSld>
     <p:spTree>
       <p:nvGrpSpPr>
@@ -12825,7 +12808,7 @@
           <a:graphicData uri="http://schemas.openxmlformats.org/presentationml/2006/ole">
             <mc:AlternateContent xmlns:mc="http://schemas.openxmlformats.org/markup-compatibility/2006">
               <mc:Choice xmlns:v="urn:schemas-microsoft-com:vml" Requires="v">
-                <p:oleObj spid="_x0000_s502840" name="Equation" r:id="rId4" imgW="1371600" imgH="482600" progId="Equation.DSMT4">
+                <p:oleObj spid="_x0000_s502847" name="Equation" r:id="rId4" imgW="1371600" imgH="482600" progId="Equation.DSMT4">
                   <p:embed/>
                 </p:oleObj>
               </mc:Choice>
@@ -12931,11 +12914,11 @@
   <p:clrMapOvr>
     <a:masterClrMapping/>
   </p:clrMapOvr>
-  <mc:AlternateContent xmlns:mc="http://schemas.openxmlformats.org/markup-compatibility/2006" xmlns:p14="http://schemas.microsoft.com/office/powerpoint/2010/main">
-    <mc:Choice Requires="p14">
+  <mc:AlternateContent xmlns:mc="http://schemas.openxmlformats.org/markup-compatibility/2006">
+    <mc:Choice xmlns:p14="http://schemas.microsoft.com/office/powerpoint/2010/main" Requires="p14">
       <p:transition p14:dur="0" advClick="0"/>
     </mc:Choice>
-    <mc:Fallback xmlns="">
+    <mc:Fallback>
       <p:transition xmlns:p14="http://schemas.microsoft.com/office/powerpoint/2010/main" advClick="0"/>
     </mc:Fallback>
   </mc:AlternateContent>
@@ -12975,20 +12958,20 @@
           <p:nvPr>
             <p:extLst>
               <p:ext uri="{D42A27DB-BD31-4B8C-83A1-F6EECF244321}">
-                <p14:modId xmlns:p14="http://schemas.microsoft.com/office/powerpoint/2010/main" val="667489669"/>
+                <p14:modId xmlns:p14="http://schemas.microsoft.com/office/powerpoint/2010/main" val="191143755"/>
               </p:ext>
             </p:extLst>
           </p:nvPr>
         </p:nvGraphicFramePr>
         <p:xfrm>
-          <a:off x="2108200" y="1206500"/>
+          <a:off x="2005568" y="1168016"/>
           <a:ext cx="4797425" cy="1689100"/>
         </p:xfrm>
         <a:graphic>
           <a:graphicData uri="http://schemas.openxmlformats.org/presentationml/2006/ole">
             <mc:AlternateContent xmlns:mc="http://schemas.openxmlformats.org/markup-compatibility/2006">
               <mc:Choice xmlns:v="urn:schemas-microsoft-com:vml" Requires="v">
-                <p:oleObj spid="_x0000_s444538" name="Equation" r:id="rId4" imgW="1371600" imgH="482600" progId="Equation.DSMT4">
+                <p:oleObj spid="_x0000_s444549" name="Equation" r:id="rId4" imgW="1371600" imgH="482600" progId="Equation.DSMT4">
                   <p:embed/>
                 </p:oleObj>
               </mc:Choice>
@@ -13009,7 +12992,7 @@
                     </p:blipFill>
                     <p:spPr>
                       <a:xfrm>
-                        <a:off x="2108200" y="1206500"/>
+                        <a:off x="2005568" y="1168016"/>
                         <a:ext cx="4797425" cy="1689100"/>
                       </a:xfrm>
                       <a:prstGeom prst="rect">
@@ -13130,7 +13113,7 @@
             <a:graphicData uri="http://schemas.openxmlformats.org/presentationml/2006/ole">
               <mc:AlternateContent xmlns:mc="http://schemas.openxmlformats.org/markup-compatibility/2006">
                 <mc:Choice xmlns:v="urn:schemas-microsoft-com:vml" Requires="v">
-                  <p:oleObj spid="_x0000_s444539" name="Equation" r:id="rId6" imgW="139700" imgH="215900" progId="Equation.DSMT4">
+                  <p:oleObj spid="_x0000_s444550" name="Equation" r:id="rId6" imgW="139700" imgH="215900" progId="Equation.DSMT4">
                     <p:embed/>
                   </p:oleObj>
                 </mc:Choice>
@@ -13245,32 +13228,32 @@
       </p:grpSpPr>
       <p:graphicFrame>
         <p:nvGraphicFramePr>
-          <p:cNvPr id="23" name="Object 22"/>
+          <p:cNvPr id="20" name="Object 19"/>
           <p:cNvGraphicFramePr>
             <a:graphicFrameLocks noChangeAspect="1"/>
           </p:cNvGraphicFramePr>
           <p:nvPr>
             <p:extLst>
               <p:ext uri="{D42A27DB-BD31-4B8C-83A1-F6EECF244321}">
-                <p14:modId xmlns:p14="http://schemas.microsoft.com/office/powerpoint/2010/main" val="2423676866"/>
+                <p14:modId xmlns:p14="http://schemas.microsoft.com/office/powerpoint/2010/main" val="1335376093"/>
               </p:ext>
             </p:extLst>
           </p:nvPr>
         </p:nvGraphicFramePr>
         <p:xfrm>
-          <a:off x="2108200" y="1206500"/>
-          <a:ext cx="4797425" cy="1689100"/>
+          <a:off x="1485900" y="2908300"/>
+          <a:ext cx="6307138" cy="1689100"/>
         </p:xfrm>
         <a:graphic>
           <a:graphicData uri="http://schemas.openxmlformats.org/presentationml/2006/ole">
             <mc:AlternateContent xmlns:mc="http://schemas.openxmlformats.org/markup-compatibility/2006">
               <mc:Choice xmlns:v="urn:schemas-microsoft-com:vml" Requires="v">
-                <p:oleObj spid="_x0000_s442498" name="Equation" r:id="rId4" imgW="1371600" imgH="482600" progId="Equation.DSMT4">
+                <p:oleObj spid="_x0000_s442509" name="Equation" r:id="rId4" imgW="1803400" imgH="482600" progId="Equation.DSMT4">
                   <p:embed/>
                 </p:oleObj>
               </mc:Choice>
               <mc:Fallback>
-                <p:oleObj name="Equation" r:id="rId4" imgW="1371600" imgH="482600" progId="Equation.DSMT4">
+                <p:oleObj name="Equation" r:id="rId4" imgW="1803400" imgH="482600" progId="Equation.DSMT4">
                   <p:embed/>
                   <p:pic>
                     <p:nvPicPr>
@@ -13280,63 +13263,6 @@
                     </p:nvPicPr>
                     <p:blipFill>
                       <a:blip r:embed="rId5"/>
-                      <a:stretch>
-                        <a:fillRect/>
-                      </a:stretch>
-                    </p:blipFill>
-                    <p:spPr>
-                      <a:xfrm>
-                        <a:off x="2108200" y="1206500"/>
-                        <a:ext cx="4797425" cy="1689100"/>
-                      </a:xfrm>
-                      <a:prstGeom prst="rect">
-                        <a:avLst/>
-                      </a:prstGeom>
-                    </p:spPr>
-                  </p:pic>
-                </p:oleObj>
-              </mc:Fallback>
-            </mc:AlternateContent>
-          </a:graphicData>
-        </a:graphic>
-      </p:graphicFrame>
-      <p:graphicFrame>
-        <p:nvGraphicFramePr>
-          <p:cNvPr id="20" name="Object 19"/>
-          <p:cNvGraphicFramePr>
-            <a:graphicFrameLocks noChangeAspect="1"/>
-          </p:cNvGraphicFramePr>
-          <p:nvPr>
-            <p:extLst>
-              <p:ext uri="{D42A27DB-BD31-4B8C-83A1-F6EECF244321}">
-                <p14:modId xmlns:p14="http://schemas.microsoft.com/office/powerpoint/2010/main" val="1335376093"/>
-              </p:ext>
-            </p:extLst>
-          </p:nvPr>
-        </p:nvGraphicFramePr>
-        <p:xfrm>
-          <a:off x="1485900" y="2908300"/>
-          <a:ext cx="6307138" cy="1689100"/>
-        </p:xfrm>
-        <a:graphic>
-          <a:graphicData uri="http://schemas.openxmlformats.org/presentationml/2006/ole">
-            <mc:AlternateContent xmlns:mc="http://schemas.openxmlformats.org/markup-compatibility/2006">
-              <mc:Choice xmlns:v="urn:schemas-microsoft-com:vml" Requires="v">
-                <p:oleObj spid="_x0000_s442499" name="Equation" r:id="rId6" imgW="1803400" imgH="482600" progId="Equation.DSMT4">
-                  <p:embed/>
-                </p:oleObj>
-              </mc:Choice>
-              <mc:Fallback>
-                <p:oleObj name="Equation" r:id="rId6" imgW="1803400" imgH="482600" progId="Equation.DSMT4">
-                  <p:embed/>
-                  <p:pic>
-                    <p:nvPicPr>
-                      <p:cNvPr id="0" name=""/>
-                      <p:cNvPicPr/>
-                      <p:nvPr/>
-                    </p:nvPicPr>
-                    <p:blipFill>
-                      <a:blip r:embed="rId7"/>
                       <a:stretch>
                         <a:fillRect/>
                       </a:stretch>
@@ -13418,6 +13344,63 @@
           </a:p>
         </p:txBody>
       </p:sp>
+      <p:graphicFrame>
+        <p:nvGraphicFramePr>
+          <p:cNvPr id="6" name="Object 5"/>
+          <p:cNvGraphicFramePr>
+            <a:graphicFrameLocks noChangeAspect="1"/>
+          </p:cNvGraphicFramePr>
+          <p:nvPr>
+            <p:extLst>
+              <p:ext uri="{D42A27DB-BD31-4B8C-83A1-F6EECF244321}">
+                <p14:modId xmlns:p14="http://schemas.microsoft.com/office/powerpoint/2010/main" val="2331663324"/>
+              </p:ext>
+            </p:extLst>
+          </p:nvPr>
+        </p:nvGraphicFramePr>
+        <p:xfrm>
+          <a:off x="2005568" y="1168016"/>
+          <a:ext cx="4797425" cy="1689100"/>
+        </p:xfrm>
+        <a:graphic>
+          <a:graphicData uri="http://schemas.openxmlformats.org/presentationml/2006/ole">
+            <mc:AlternateContent xmlns:mc="http://schemas.openxmlformats.org/markup-compatibility/2006">
+              <mc:Choice xmlns:v="urn:schemas-microsoft-com:vml" Requires="v">
+                <p:oleObj spid="_x0000_s442510" name="Equation" r:id="rId6" imgW="1371600" imgH="482600" progId="Equation.DSMT4">
+                  <p:embed/>
+                </p:oleObj>
+              </mc:Choice>
+              <mc:Fallback>
+                <p:oleObj name="Equation" r:id="rId6" imgW="1371600" imgH="482600" progId="Equation.DSMT4">
+                  <p:embed/>
+                  <p:pic>
+                    <p:nvPicPr>
+                      <p:cNvPr id="0" name=""/>
+                      <p:cNvPicPr/>
+                      <p:nvPr/>
+                    </p:nvPicPr>
+                    <p:blipFill>
+                      <a:blip r:embed="rId7"/>
+                      <a:stretch>
+                        <a:fillRect/>
+                      </a:stretch>
+                    </p:blipFill>
+                    <p:spPr>
+                      <a:xfrm>
+                        <a:off x="2005568" y="1168016"/>
+                        <a:ext cx="4797425" cy="1689100"/>
+                      </a:xfrm>
+                      <a:prstGeom prst="rect">
+                        <a:avLst/>
+                      </a:prstGeom>
+                    </p:spPr>
+                  </p:pic>
+                </p:oleObj>
+              </mc:Fallback>
+            </mc:AlternateContent>
+          </a:graphicData>
+        </a:graphic>
+      </p:graphicFrame>
     </p:spTree>
     <p:extLst>
       <p:ext uri="{BB962C8B-B14F-4D97-AF65-F5344CB8AC3E}">
@@ -13489,7 +13472,7 @@
           <a:graphicData uri="http://schemas.openxmlformats.org/presentationml/2006/ole">
             <mc:AlternateContent xmlns:mc="http://schemas.openxmlformats.org/markup-compatibility/2006">
               <mc:Choice xmlns:v="urn:schemas-microsoft-com:vml" Requires="v">
-                <p:oleObj spid="_x0000_s446610" name="Equation" r:id="rId4" imgW="1803400" imgH="482600" progId="Equation.DSMT4">
+                <p:oleObj spid="_x0000_s446621" name="Equation" r:id="rId4" imgW="1803400" imgH="482600" progId="Equation.DSMT4">
                   <p:embed/>
                 </p:oleObj>
               </mc:Choice>
@@ -13631,7 +13614,7 @@
             <a:graphicData uri="http://schemas.openxmlformats.org/presentationml/2006/ole">
               <mc:AlternateContent xmlns:mc="http://schemas.openxmlformats.org/markup-compatibility/2006">
                 <mc:Choice xmlns:v="urn:schemas-microsoft-com:vml" Requires="v">
-                  <p:oleObj spid="_x0000_s446611" name="Equation" r:id="rId6" imgW="177800" imgH="241300" progId="Equation.DSMT4">
+                  <p:oleObj spid="_x0000_s446622" name="Equation" r:id="rId6" imgW="177800" imgH="241300" progId="Equation.DSMT4">
                     <p:embed/>
                   </p:oleObj>
                 </mc:Choice>
@@ -13757,7 +13740,7 @@
           <a:graphicData uri="http://schemas.openxmlformats.org/presentationml/2006/ole">
             <mc:AlternateContent xmlns:mc="http://schemas.openxmlformats.org/markup-compatibility/2006">
               <mc:Choice xmlns:v="urn:schemas-microsoft-com:vml" Requires="v">
-                <p:oleObj spid="_x0000_s445594" name="Equation" r:id="rId4" imgW="1854200" imgH="482600" progId="Equation.DSMT4">
+                <p:oleObj spid="_x0000_s445605" name="Equation" r:id="rId4" imgW="1854200" imgH="482600" progId="Equation.DSMT4">
                   <p:embed/>
                 </p:oleObj>
               </mc:Choice>
@@ -13814,7 +13797,7 @@
           <a:graphicData uri="http://schemas.openxmlformats.org/presentationml/2006/ole">
             <mc:AlternateContent xmlns:mc="http://schemas.openxmlformats.org/markup-compatibility/2006">
               <mc:Choice xmlns:v="urn:schemas-microsoft-com:vml" Requires="v">
-                <p:oleObj spid="_x0000_s445595" name="Equation" r:id="rId6" imgW="1803400" imgH="482600" progId="Equation.DSMT4">
+                <p:oleObj spid="_x0000_s445606" name="Equation" r:id="rId6" imgW="1803400" imgH="482600" progId="Equation.DSMT4">
                   <p:embed/>
                 </p:oleObj>
               </mc:Choice>
@@ -13972,7 +13955,7 @@
           <a:graphicData uri="http://schemas.openxmlformats.org/presentationml/2006/ole">
             <mc:AlternateContent xmlns:mc="http://schemas.openxmlformats.org/markup-compatibility/2006">
               <mc:Choice xmlns:v="urn:schemas-microsoft-com:vml" Requires="v">
-                <p:oleObj spid="_x0000_s480348" name="Equation" r:id="rId4" imgW="1854200" imgH="482600" progId="Equation.DSMT4">
+                <p:oleObj spid="_x0000_s480355" name="Equation" r:id="rId4" imgW="1854200" imgH="482600" progId="Equation.DSMT4">
                   <p:embed/>
                 </p:oleObj>
               </mc:Choice>
@@ -14239,21 +14222,30 @@
                             </p:childTnLst>
                           </p:cTn>
                         </p:par>
+                      </p:childTnLst>
+                    </p:cTn>
+                  </p:par>
+                  <p:par>
+                    <p:cTn id="8" fill="hold">
+                      <p:stCondLst>
+                        <p:cond delay="indefinite"/>
+                      </p:stCondLst>
+                      <p:childTnLst>
                         <p:par>
-                          <p:cTn id="8" fill="hold">
+                          <p:cTn id="9" fill="hold">
                             <p:stCondLst>
-                              <p:cond delay="500"/>
+                              <p:cond delay="0"/>
                             </p:stCondLst>
                             <p:childTnLst>
                               <p:par>
-                                <p:cTn id="9" presetID="10" presetClass="entr" presetSubtype="0" fill="hold" grpId="0" nodeType="afterEffect">
+                                <p:cTn id="10" presetID="49" presetClass="entr" presetSubtype="0" decel="100000" fill="hold" grpId="1" nodeType="clickEffect">
                                   <p:stCondLst>
                                     <p:cond delay="0"/>
                                   </p:stCondLst>
                                   <p:childTnLst>
                                     <p:set>
                                       <p:cBhvr>
-                                        <p:cTn id="10" dur="1" fill="hold">
+                                        <p:cTn id="11" dur="1" fill="hold">
                                           <p:stCondLst>
                                             <p:cond delay="0"/>
                                           </p:stCondLst>
@@ -14269,9 +14261,78 @@
                                         <p:strVal val="visible"/>
                                       </p:to>
                                     </p:set>
+                                    <p:anim calcmode="lin" valueType="num">
+                                      <p:cBhvr>
+                                        <p:cTn id="12" dur="500" fill="hold"/>
+                                        <p:tgtEl>
+                                          <p:spTgt spid="5"/>
+                                        </p:tgtEl>
+                                        <p:attrNameLst>
+                                          <p:attrName>ppt_w</p:attrName>
+                                        </p:attrNameLst>
+                                      </p:cBhvr>
+                                      <p:tavLst>
+                                        <p:tav tm="0">
+                                          <p:val>
+                                            <p:fltVal val="0"/>
+                                          </p:val>
+                                        </p:tav>
+                                        <p:tav tm="100000">
+                                          <p:val>
+                                            <p:strVal val="#ppt_w"/>
+                                          </p:val>
+                                        </p:tav>
+                                      </p:tavLst>
+                                    </p:anim>
+                                    <p:anim calcmode="lin" valueType="num">
+                                      <p:cBhvr>
+                                        <p:cTn id="13" dur="500" fill="hold"/>
+                                        <p:tgtEl>
+                                          <p:spTgt spid="5"/>
+                                        </p:tgtEl>
+                                        <p:attrNameLst>
+                                          <p:attrName>ppt_h</p:attrName>
+                                        </p:attrNameLst>
+                                      </p:cBhvr>
+                                      <p:tavLst>
+                                        <p:tav tm="0">
+                                          <p:val>
+                                            <p:fltVal val="0"/>
+                                          </p:val>
+                                        </p:tav>
+                                        <p:tav tm="100000">
+                                          <p:val>
+                                            <p:strVal val="#ppt_h"/>
+                                          </p:val>
+                                        </p:tav>
+                                      </p:tavLst>
+                                    </p:anim>
+                                    <p:anim calcmode="lin" valueType="num">
+                                      <p:cBhvr>
+                                        <p:cTn id="14" dur="500" fill="hold"/>
+                                        <p:tgtEl>
+                                          <p:spTgt spid="5"/>
+                                        </p:tgtEl>
+                                        <p:attrNameLst>
+                                          <p:attrName>style.rotation</p:attrName>
+                                        </p:attrNameLst>
+                                      </p:cBhvr>
+                                      <p:tavLst>
+                                        <p:tav tm="0">
+                                          <p:val>
+                                            <p:fltVal val="360"/>
+                                          </p:val>
+                                        </p:tav>
+                                        <p:tav tm="100000">
+                                          <p:val>
+                                            <p:fltVal val="0"/>
+                                          </p:val>
+                                        </p:tav>
+                                      </p:tavLst>
+                                    </p:anim>
                                     <p:animEffect transition="in" filter="fade">
                                       <p:cBhvr>
-                                        <p:cTn id="11" dur="500"/>
+                                        <p:cTn id="15" dur="500"/>
                                         <p:tgtEl>
                                           <p:spTgt spid="5"/>
                                         </p:tgtEl>
@@ -14309,7 +14370,7 @@
     </p:tnLst>
     <p:bldLst>
       <p:bldP spid="25" grpId="0" animBg="1"/>
-      <p:bldP spid="5" grpId="0" animBg="1"/>
+      <p:bldP spid="5" grpId="1" animBg="1"/>
     </p:bldLst>
   </p:timing>
 </p:sld>
@@ -14431,7 +14492,7 @@
           <a:graphicData uri="http://schemas.openxmlformats.org/presentationml/2006/ole">
             <mc:AlternateContent xmlns:mc="http://schemas.openxmlformats.org/markup-compatibility/2006">
               <mc:Choice xmlns:v="urn:schemas-microsoft-com:vml" Requires="v">
-                <p:oleObj spid="_x0000_s554072" name="Equation" r:id="rId4" imgW="1181100" imgH="228600" progId="Equation.DSMT4">
+                <p:oleObj spid="_x0000_s554091" name="Equation" r:id="rId4" imgW="1181100" imgH="228600" progId="Equation.DSMT4">
                   <p:embed/>
                 </p:oleObj>
               </mc:Choice>
@@ -14488,7 +14549,7 @@
           <a:graphicData uri="http://schemas.openxmlformats.org/presentationml/2006/ole">
             <mc:AlternateContent xmlns:mc="http://schemas.openxmlformats.org/markup-compatibility/2006">
               <mc:Choice xmlns:v="urn:schemas-microsoft-com:vml" Requires="v">
-                <p:oleObj spid="_x0000_s554073" name="Equation" r:id="rId6" imgW="1168400" imgH="228600" progId="Equation.DSMT4">
+                <p:oleObj spid="_x0000_s554092" name="Equation" r:id="rId6" imgW="1168400" imgH="228600" progId="Equation.DSMT4">
                   <p:embed/>
                 </p:oleObj>
               </mc:Choice>
@@ -14545,7 +14606,7 @@
           <a:graphicData uri="http://schemas.openxmlformats.org/presentationml/2006/ole">
             <mc:AlternateContent xmlns:mc="http://schemas.openxmlformats.org/markup-compatibility/2006">
               <mc:Choice xmlns:v="urn:schemas-microsoft-com:vml" Requires="v">
-                <p:oleObj spid="_x0000_s554074" name="Equation" r:id="rId8" imgW="1511300" imgH="254000" progId="Equation.DSMT4">
+                <p:oleObj spid="_x0000_s554093" name="Equation" r:id="rId8" imgW="1511300" imgH="254000" progId="Equation.DSMT4">
                   <p:embed/>
                 </p:oleObj>
               </mc:Choice>
@@ -14602,7 +14663,7 @@
           <a:graphicData uri="http://schemas.openxmlformats.org/presentationml/2006/ole">
             <mc:AlternateContent xmlns:mc="http://schemas.openxmlformats.org/markup-compatibility/2006">
               <mc:Choice xmlns:v="urn:schemas-microsoft-com:vml" Requires="v">
-                <p:oleObj spid="_x0000_s554075" name="Equation" r:id="rId10" imgW="1524000" imgH="254000" progId="Equation.DSMT4">
+                <p:oleObj spid="_x0000_s554094" name="Equation" r:id="rId10" imgW="1524000" imgH="254000" progId="Equation.DSMT4">
                   <p:embed/>
                 </p:oleObj>
               </mc:Choice>
@@ -14916,7 +14977,7 @@
           <a:graphicData uri="http://schemas.openxmlformats.org/presentationml/2006/ole">
             <mc:AlternateContent xmlns:mc="http://schemas.openxmlformats.org/markup-compatibility/2006">
               <mc:Choice xmlns:v="urn:schemas-microsoft-com:vml" Requires="v">
-                <p:oleObj spid="_x0000_s426089" name="Equation" r:id="rId4" imgW="1854200" imgH="482600" progId="Equation.DSMT4">
+                <p:oleObj spid="_x0000_s426096" name="Equation" r:id="rId4" imgW="1854200" imgH="482600" progId="Equation.DSMT4">
                   <p:embed/>
                 </p:oleObj>
               </mc:Choice>
@@ -15599,7 +15660,7 @@
           <a:graphicData uri="http://schemas.openxmlformats.org/presentationml/2006/ole">
             <mc:AlternateContent xmlns:mc="http://schemas.openxmlformats.org/markup-compatibility/2006">
               <mc:Choice xmlns:v="urn:schemas-microsoft-com:vml" Requires="v">
-                <p:oleObj spid="_x0000_s481343" name="Equation" r:id="rId4" imgW="1854200" imgH="482600" progId="Equation.DSMT4">
+                <p:oleObj spid="_x0000_s481350" name="Equation" r:id="rId4" imgW="1854200" imgH="482600" progId="Equation.DSMT4">
                   <p:embed/>
                 </p:oleObj>
               </mc:Choice>
@@ -15812,7 +15873,7 @@
           <a:graphicData uri="http://schemas.openxmlformats.org/presentationml/2006/ole">
             <mc:AlternateContent xmlns:mc="http://schemas.openxmlformats.org/markup-compatibility/2006">
               <mc:Choice xmlns:v="urn:schemas-microsoft-com:vml" Requires="v">
-                <p:oleObj spid="_x0000_s528430" name="Equation" r:id="rId4" imgW="1803400" imgH="482600" progId="Equation.DSMT4">
+                <p:oleObj spid="_x0000_s528437" name="Equation" r:id="rId4" imgW="1803400" imgH="482600" progId="Equation.DSMT4">
                   <p:embed/>
                 </p:oleObj>
               </mc:Choice>
@@ -16011,7 +16072,7 @@
           <a:graphicData uri="http://schemas.openxmlformats.org/presentationml/2006/ole">
             <mc:AlternateContent xmlns:mc="http://schemas.openxmlformats.org/markup-compatibility/2006">
               <mc:Choice xmlns:v="urn:schemas-microsoft-com:vml" Requires="v">
-                <p:oleObj spid="_x0000_s447563" name="Equation" r:id="rId4" imgW="2514600" imgH="254000" progId="Equation.DSMT4">
+                <p:oleObj spid="_x0000_s447570" name="Equation" r:id="rId4" imgW="2514600" imgH="254000" progId="Equation.DSMT4">
                   <p:embed/>
                 </p:oleObj>
               </mc:Choice>
@@ -16371,7 +16432,7 @@
           <a:graphicData uri="http://schemas.openxmlformats.org/presentationml/2006/ole">
             <mc:AlternateContent xmlns:mc="http://schemas.openxmlformats.org/markup-compatibility/2006">
               <mc:Choice xmlns:v="urn:schemas-microsoft-com:vml" Requires="v">
-                <p:oleObj spid="_x0000_s449672" name="Equation" r:id="rId4" imgW="698500" imgH="254000" progId="Equation.DSMT4">
+                <p:oleObj spid="_x0000_s449683" name="Equation" r:id="rId4" imgW="698500" imgH="254000" progId="Equation.DSMT4">
                   <p:embed/>
                 </p:oleObj>
               </mc:Choice>
@@ -16428,7 +16489,7 @@
           <a:graphicData uri="http://schemas.openxmlformats.org/presentationml/2006/ole">
             <mc:AlternateContent xmlns:mc="http://schemas.openxmlformats.org/markup-compatibility/2006">
               <mc:Choice xmlns:v="urn:schemas-microsoft-com:vml" Requires="v">
-                <p:oleObj spid="_x0000_s449673" name="Equation" r:id="rId6" imgW="1651000" imgH="254000" progId="Equation.DSMT4">
+                <p:oleObj spid="_x0000_s449684" name="Equation" r:id="rId6" imgW="1651000" imgH="254000" progId="Equation.DSMT4">
                   <p:embed/>
                 </p:oleObj>
               </mc:Choice>
@@ -16583,9 +16644,6 @@
                     <p:cTn id="3" fill="hold">
                       <p:stCondLst>
                         <p:cond delay="indefinite"/>
-                        <p:cond evt="onBegin" delay="0">
-                          <p:tn val="2"/>
-                        </p:cond>
                       </p:stCondLst>
                       <p:childTnLst>
                         <p:par>
@@ -16595,7 +16653,7 @@
                             </p:stCondLst>
                             <p:childTnLst>
                               <p:par>
-                                <p:cTn id="5" presetID="10" presetClass="entr" presetSubtype="0" fill="hold" grpId="0" nodeType="afterEffect">
+                                <p:cTn id="5" presetID="10" presetClass="entr" presetSubtype="0" fill="hold" grpId="0" nodeType="clickEffect">
                                   <p:stCondLst>
                                     <p:cond delay="0"/>
                                   </p:stCondLst>
@@ -16842,7 +16900,7 @@
           <a:graphicData uri="http://schemas.openxmlformats.org/presentationml/2006/ole">
             <mc:AlternateContent xmlns:mc="http://schemas.openxmlformats.org/markup-compatibility/2006">
               <mc:Choice xmlns:v="urn:schemas-microsoft-com:vml" Requires="v">
-                <p:oleObj spid="_x0000_s507024" name="Equation" r:id="rId4" imgW="698500" imgH="254000" progId="Equation.DSMT4">
+                <p:oleObj spid="_x0000_s507039" name="Equation" r:id="rId4" imgW="698500" imgH="254000" progId="Equation.DSMT4">
                   <p:embed/>
                 </p:oleObj>
               </mc:Choice>
@@ -16899,7 +16957,7 @@
           <a:graphicData uri="http://schemas.openxmlformats.org/presentationml/2006/ole">
             <mc:AlternateContent xmlns:mc="http://schemas.openxmlformats.org/markup-compatibility/2006">
               <mc:Choice xmlns:v="urn:schemas-microsoft-com:vml" Requires="v">
-                <p:oleObj spid="_x0000_s507025" name="Equation" r:id="rId6" imgW="1651000" imgH="254000" progId="Equation.DSMT4">
+                <p:oleObj spid="_x0000_s507040" name="Equation" r:id="rId6" imgW="1651000" imgH="254000" progId="Equation.DSMT4">
                   <p:embed/>
                 </p:oleObj>
               </mc:Choice>
@@ -16956,7 +17014,7 @@
           <a:graphicData uri="http://schemas.openxmlformats.org/presentationml/2006/ole">
             <mc:AlternateContent xmlns:mc="http://schemas.openxmlformats.org/markup-compatibility/2006">
               <mc:Choice xmlns:v="urn:schemas-microsoft-com:vml" Requires="v">
-                <p:oleObj spid="_x0000_s507026" name="Equation" r:id="rId8" imgW="1333500" imgH="482600" progId="Equation.DSMT4">
+                <p:oleObj spid="_x0000_s507041" name="Equation" r:id="rId8" imgW="1333500" imgH="482600" progId="Equation.DSMT4">
                   <p:embed/>
                 </p:oleObj>
               </mc:Choice>
@@ -17259,7 +17317,7 @@
           <a:graphicData uri="http://schemas.openxmlformats.org/presentationml/2006/ole">
             <mc:AlternateContent xmlns:mc="http://schemas.openxmlformats.org/markup-compatibility/2006">
               <mc:Choice xmlns:v="urn:schemas-microsoft-com:vml" Requires="v">
-                <p:oleObj spid="_x0000_s508021" name="Equation" r:id="rId4" imgW="698500" imgH="254000" progId="Equation.DSMT4">
+                <p:oleObj spid="_x0000_s508032" name="Equation" r:id="rId4" imgW="698500" imgH="254000" progId="Equation.DSMT4">
                   <p:embed/>
                 </p:oleObj>
               </mc:Choice>
@@ -17316,7 +17374,7 @@
           <a:graphicData uri="http://schemas.openxmlformats.org/presentationml/2006/ole">
             <mc:AlternateContent xmlns:mc="http://schemas.openxmlformats.org/markup-compatibility/2006">
               <mc:Choice xmlns:v="urn:schemas-microsoft-com:vml" Requires="v">
-                <p:oleObj spid="_x0000_s508022" name="Equation" r:id="rId6" imgW="1333500" imgH="482600" progId="Equation.DSMT4">
+                <p:oleObj spid="_x0000_s508033" name="Equation" r:id="rId6" imgW="1333500" imgH="482600" progId="Equation.DSMT4">
                   <p:embed/>
                 </p:oleObj>
               </mc:Choice>
@@ -17533,6 +17591,9 @@
                     <p:cTn id="3" fill="hold">
                       <p:stCondLst>
                         <p:cond delay="indefinite"/>
+                        <p:cond evt="onBegin" delay="0">
+                          <p:tn val="2"/>
+                        </p:cond>
                       </p:stCondLst>
                       <p:childTnLst>
                         <p:par>
@@ -17542,7 +17603,7 @@
                             </p:stCondLst>
                             <p:childTnLst>
                               <p:par>
-                                <p:cTn id="5" presetID="49" presetClass="entr" presetSubtype="0" decel="100000" fill="hold" nodeType="clickEffect">
+                                <p:cTn id="5" presetID="22" presetClass="entr" presetSubtype="8" fill="hold" grpId="0" nodeType="afterEffect">
                                   <p:stCondLst>
                                     <p:cond delay="0"/>
                                   </p:stCondLst>
@@ -17550,6 +17611,50 @@
                                     <p:set>
                                       <p:cBhvr>
                                         <p:cTn id="6" dur="1" fill="hold">
+                                          <p:stCondLst>
+                                            <p:cond delay="0"/>
+                                          </p:stCondLst>
+                                        </p:cTn>
+                                        <p:tgtEl>
+                                          <p:spTgt spid="2"/>
+                                        </p:tgtEl>
+                                        <p:attrNameLst>
+                                          <p:attrName>style.visibility</p:attrName>
+                                        </p:attrNameLst>
+                                      </p:cBhvr>
+                                      <p:to>
+                                        <p:strVal val="visible"/>
+                                      </p:to>
+                                    </p:set>
+                                    <p:animEffect transition="in" filter="wipe(left)">
+                                      <p:cBhvr>
+                                        <p:cTn id="7" dur="500"/>
+                                        <p:tgtEl>
+                                          <p:spTgt spid="2"/>
+                                        </p:tgtEl>
+                                      </p:cBhvr>
+                                    </p:animEffect>
+                                  </p:childTnLst>
+                                </p:cTn>
+                              </p:par>
+                            </p:childTnLst>
+                          </p:cTn>
+                        </p:par>
+                        <p:par>
+                          <p:cTn id="8" fill="hold">
+                            <p:stCondLst>
+                              <p:cond delay="500"/>
+                            </p:stCondLst>
+                            <p:childTnLst>
+                              <p:par>
+                                <p:cTn id="9" presetID="49" presetClass="entr" presetSubtype="0" decel="100000" fill="hold" nodeType="afterEffect">
+                                  <p:stCondLst>
+                                    <p:cond delay="0"/>
+                                  </p:stCondLst>
+                                  <p:childTnLst>
+                                    <p:set>
+                                      <p:cBhvr>
+                                        <p:cTn id="10" dur="1" fill="hold">
                                           <p:stCondLst>
                                             <p:cond delay="0"/>
                                           </p:stCondLst>
@@ -17571,7 +17676,7 @@
                                     </p:set>
                                     <p:anim calcmode="lin" valueType="num">
                                       <p:cBhvr>
-                                        <p:cTn id="7" dur="500" fill="hold"/>
+                                        <p:cTn id="11" dur="500" fill="hold"/>
                                         <p:tgtEl>
                                           <p:spTgt spid="3">
                                             <p:txEl>
@@ -17598,7 +17703,7 @@
                                     </p:anim>
                                     <p:anim calcmode="lin" valueType="num">
                                       <p:cBhvr>
-                                        <p:cTn id="8" dur="500" fill="hold"/>
+                                        <p:cTn id="12" dur="500" fill="hold"/>
                                         <p:tgtEl>
                                           <p:spTgt spid="3">
                                             <p:txEl>
@@ -17625,7 +17730,7 @@
                                     </p:anim>
                                     <p:anim calcmode="lin" valueType="num">
                                       <p:cBhvr>
-                                        <p:cTn id="9" dur="500" fill="hold"/>
+                                        <p:cTn id="13" dur="500" fill="hold"/>
                                         <p:tgtEl>
                                           <p:spTgt spid="3">
                                             <p:txEl>
@@ -17652,66 +17757,13 @@
                                     </p:anim>
                                     <p:animEffect transition="in" filter="fade">
                                       <p:cBhvr>
-                                        <p:cTn id="10" dur="500"/>
+                                        <p:cTn id="14" dur="500"/>
                                         <p:tgtEl>
                                           <p:spTgt spid="3">
                                             <p:txEl>
                                               <p:pRg st="0" end="0"/>
                                             </p:txEl>
                                           </p:spTgt>
-                                        </p:tgtEl>
-                                      </p:cBhvr>
-                                    </p:animEffect>
-                                  </p:childTnLst>
-                                </p:cTn>
-                              </p:par>
-                            </p:childTnLst>
-                          </p:cTn>
-                        </p:par>
-                      </p:childTnLst>
-                    </p:cTn>
-                  </p:par>
-                  <p:par>
-                    <p:cTn id="11" fill="hold">
-                      <p:stCondLst>
-                        <p:cond delay="indefinite"/>
-                      </p:stCondLst>
-                      <p:childTnLst>
-                        <p:par>
-                          <p:cTn id="12" fill="hold">
-                            <p:stCondLst>
-                              <p:cond delay="0"/>
-                            </p:stCondLst>
-                            <p:childTnLst>
-                              <p:par>
-                                <p:cTn id="13" presetID="22" presetClass="entr" presetSubtype="8" fill="hold" grpId="0" nodeType="clickEffect">
-                                  <p:stCondLst>
-                                    <p:cond delay="0"/>
-                                  </p:stCondLst>
-                                  <p:childTnLst>
-                                    <p:set>
-                                      <p:cBhvr>
-                                        <p:cTn id="14" dur="1" fill="hold">
-                                          <p:stCondLst>
-                                            <p:cond delay="0"/>
-                                          </p:stCondLst>
-                                        </p:cTn>
-                                        <p:tgtEl>
-                                          <p:spTgt spid="2"/>
-                                        </p:tgtEl>
-                                        <p:attrNameLst>
-                                          <p:attrName>style.visibility</p:attrName>
-                                        </p:attrNameLst>
-                                      </p:cBhvr>
-                                      <p:to>
-                                        <p:strVal val="visible"/>
-                                      </p:to>
-                                    </p:set>
-                                    <p:animEffect transition="in" filter="wipe(left)">
-                                      <p:cBhvr>
-                                        <p:cTn id="15" dur="500"/>
-                                        <p:tgtEl>
-                                          <p:spTgt spid="2"/>
                                         </p:tgtEl>
                                       </p:cBhvr>
                                     </p:animEffect>
@@ -17874,7 +17926,7 @@
           <a:graphicData uri="http://schemas.openxmlformats.org/presentationml/2006/ole">
             <mc:AlternateContent xmlns:mc="http://schemas.openxmlformats.org/markup-compatibility/2006">
               <mc:Choice xmlns:v="urn:schemas-microsoft-com:vml" Requires="v">
-                <p:oleObj spid="_x0000_s522320" name="Equation" r:id="rId4" imgW="1600200" imgH="215900" progId="Equation.DSMT4">
+                <p:oleObj spid="_x0000_s522331" name="Equation" r:id="rId4" imgW="1600200" imgH="215900" progId="Equation.DSMT4">
                   <p:embed/>
                 </p:oleObj>
               </mc:Choice>
@@ -17931,7 +17983,7 @@
           <a:graphicData uri="http://schemas.openxmlformats.org/presentationml/2006/ole">
             <mc:AlternateContent xmlns:mc="http://schemas.openxmlformats.org/markup-compatibility/2006">
               <mc:Choice xmlns:v="urn:schemas-microsoft-com:vml" Requires="v">
-                <p:oleObj spid="_x0000_s522321" name="Equation" r:id="rId6" imgW="1397000" imgH="457200" progId="Equation.DSMT4">
+                <p:oleObj spid="_x0000_s522332" name="Equation" r:id="rId6" imgW="1397000" imgH="457200" progId="Equation.DSMT4">
                   <p:embed/>
                 </p:oleObj>
               </mc:Choice>
@@ -18340,7 +18392,7 @@
           <a:graphicData uri="http://schemas.openxmlformats.org/presentationml/2006/ole">
             <mc:AlternateContent xmlns:mc="http://schemas.openxmlformats.org/markup-compatibility/2006">
               <mc:Choice xmlns:v="urn:schemas-microsoft-com:vml" Requires="v">
-                <p:oleObj spid="_x0000_s461899" name="Equation" r:id="rId4" imgW="1333500" imgH="482600" progId="Equation.DSMT4">
+                <p:oleObj spid="_x0000_s461906" name="Equation" r:id="rId4" imgW="1333500" imgH="482600" progId="Equation.DSMT4">
                   <p:embed/>
                 </p:oleObj>
               </mc:Choice>
@@ -18578,7 +18630,7 @@
           <a:graphicData uri="http://schemas.openxmlformats.org/presentationml/2006/ole">
             <mc:AlternateContent xmlns:mc="http://schemas.openxmlformats.org/markup-compatibility/2006">
               <mc:Choice xmlns:v="urn:schemas-microsoft-com:vml" Requires="v">
-                <p:oleObj spid="_x0000_s523329" name="Equation" r:id="rId4" imgW="1333500" imgH="482600" progId="Equation.DSMT4">
+                <p:oleObj spid="_x0000_s523336" name="Equation" r:id="rId4" imgW="1333500" imgH="482600" progId="Equation.DSMT4">
                   <p:embed/>
                 </p:oleObj>
               </mc:Choice>
@@ -18870,7 +18922,7 @@
           <a:graphicData uri="http://schemas.openxmlformats.org/presentationml/2006/ole">
             <mc:AlternateContent xmlns:mc="http://schemas.openxmlformats.org/markup-compatibility/2006">
               <mc:Choice xmlns:v="urn:schemas-microsoft-com:vml" Requires="v">
-                <p:oleObj spid="_x0000_s542760" name="Equation" r:id="rId4" imgW="1333500" imgH="482600" progId="Equation.DSMT4">
+                <p:oleObj spid="_x0000_s542767" name="Equation" r:id="rId4" imgW="1333500" imgH="482600" progId="Equation.DSMT4">
                   <p:embed/>
                 </p:oleObj>
               </mc:Choice>
@@ -19156,7 +19208,7 @@
           <a:graphicData uri="http://schemas.openxmlformats.org/presentationml/2006/ole">
             <mc:AlternateContent xmlns:mc="http://schemas.openxmlformats.org/markup-compatibility/2006">
               <mc:Choice xmlns:v="urn:schemas-microsoft-com:vml" Requires="v">
-                <p:oleObj spid="_x0000_s420079" name="Equation" r:id="rId4" imgW="139700" imgH="215900" progId="Equation.DSMT4">
+                <p:oleObj spid="_x0000_s420094" name="Equation" r:id="rId4" imgW="139700" imgH="215900" progId="Equation.DSMT4">
                   <p:embed/>
                 </p:oleObj>
               </mc:Choice>
@@ -19213,7 +19265,7 @@
           <a:graphicData uri="http://schemas.openxmlformats.org/presentationml/2006/ole">
             <mc:AlternateContent xmlns:mc="http://schemas.openxmlformats.org/markup-compatibility/2006">
               <mc:Choice xmlns:v="urn:schemas-microsoft-com:vml" Requires="v">
-                <p:oleObj spid="_x0000_s420080" name="Equation" r:id="rId6" imgW="2044700" imgH="228600" progId="Equation.DSMT4">
+                <p:oleObj spid="_x0000_s420095" name="Equation" r:id="rId6" imgW="2044700" imgH="228600" progId="Equation.DSMT4">
                   <p:embed/>
                 </p:oleObj>
               </mc:Choice>
@@ -19353,7 +19405,7 @@
           <a:graphicData uri="http://schemas.openxmlformats.org/presentationml/2006/ole">
             <mc:AlternateContent xmlns:mc="http://schemas.openxmlformats.org/markup-compatibility/2006">
               <mc:Choice xmlns:v="urn:schemas-microsoft-com:vml" Requires="v">
-                <p:oleObj spid="_x0000_s420081" name="Equation" r:id="rId8" imgW="2159000" imgH="457200" progId="Equation.DSMT4">
+                <p:oleObj spid="_x0000_s420096" name="Equation" r:id="rId8" imgW="2159000" imgH="457200" progId="Equation.DSMT4">
                   <p:embed/>
                 </p:oleObj>
               </mc:Choice>
@@ -19668,7 +19720,7 @@
           <a:graphicData uri="http://schemas.openxmlformats.org/presentationml/2006/ole">
             <mc:AlternateContent xmlns:mc="http://schemas.openxmlformats.org/markup-compatibility/2006">
               <mc:Choice xmlns:v="urn:schemas-microsoft-com:vml" Requires="v">
-                <p:oleObj spid="_x0000_s544836" name="Equation" r:id="rId4" imgW="1333500" imgH="482600" progId="Equation.DSMT4">
+                <p:oleObj spid="_x0000_s544847" name="Equation" r:id="rId4" imgW="1333500" imgH="482600" progId="Equation.DSMT4">
                   <p:embed/>
                 </p:oleObj>
               </mc:Choice>
@@ -19828,7 +19880,7 @@
           <a:graphicData uri="http://schemas.openxmlformats.org/presentationml/2006/ole">
             <mc:AlternateContent xmlns:mc="http://schemas.openxmlformats.org/markup-compatibility/2006">
               <mc:Choice xmlns:v="urn:schemas-microsoft-com:vml" Requires="v">
-                <p:oleObj spid="_x0000_s544837" name="Equation" r:id="rId6" imgW="698500" imgH="254000" progId="Equation.DSMT4">
+                <p:oleObj spid="_x0000_s544848" name="Equation" r:id="rId6" imgW="698500" imgH="254000" progId="Equation.DSMT4">
                   <p:embed/>
                 </p:oleObj>
               </mc:Choice>
@@ -20245,7 +20297,7 @@
           <a:graphicData uri="http://schemas.openxmlformats.org/presentationml/2006/ole">
             <mc:AlternateContent xmlns:mc="http://schemas.openxmlformats.org/markup-compatibility/2006">
               <mc:Choice xmlns:v="urn:schemas-microsoft-com:vml" Requires="v">
-                <p:oleObj spid="_x0000_s525443" name="Equation" r:id="rId4" imgW="1333500" imgH="482600" progId="Equation.DSMT4">
+                <p:oleObj spid="_x0000_s525458" name="Equation" r:id="rId4" imgW="1333500" imgH="482600" progId="Equation.DSMT4">
                   <p:embed/>
                 </p:oleObj>
               </mc:Choice>
@@ -20337,7 +20389,7 @@
           <a:graphicData uri="http://schemas.openxmlformats.org/presentationml/2006/ole">
             <mc:AlternateContent xmlns:mc="http://schemas.openxmlformats.org/markup-compatibility/2006">
               <mc:Choice xmlns:v="urn:schemas-microsoft-com:vml" Requires="v">
-                <p:oleObj spid="_x0000_s525444" name="Equation" r:id="rId6" imgW="1333500" imgH="482600" progId="Equation.DSMT4">
+                <p:oleObj spid="_x0000_s525459" name="Equation" r:id="rId6" imgW="1333500" imgH="482600" progId="Equation.DSMT4">
                   <p:embed/>
                 </p:oleObj>
               </mc:Choice>
@@ -20394,7 +20446,7 @@
           <a:graphicData uri="http://schemas.openxmlformats.org/presentationml/2006/ole">
             <mc:AlternateContent xmlns:mc="http://schemas.openxmlformats.org/markup-compatibility/2006">
               <mc:Choice xmlns:v="urn:schemas-microsoft-com:vml" Requires="v">
-                <p:oleObj spid="_x0000_s525445" name="Equation" r:id="rId8" imgW="1371600" imgH="482600" progId="Equation.DSMT4">
+                <p:oleObj spid="_x0000_s525460" name="Equation" r:id="rId8" imgW="1371600" imgH="482600" progId="Equation.DSMT4">
                   <p:embed/>
                 </p:oleObj>
               </mc:Choice>
@@ -21004,7 +21056,7 @@
           <a:graphicData uri="http://schemas.openxmlformats.org/presentationml/2006/ole">
             <mc:AlternateContent xmlns:mc="http://schemas.openxmlformats.org/markup-compatibility/2006">
               <mc:Choice xmlns:v="urn:schemas-microsoft-com:vml" Requires="v">
-                <p:oleObj spid="_x0000_s632855" name="Equation" r:id="rId4" imgW="1371600" imgH="482600" progId="Equation.DSMT4">
+                <p:oleObj spid="_x0000_s632870" name="Equation" r:id="rId4" imgW="1371600" imgH="482600" progId="Equation.DSMT4">
                   <p:embed/>
                 </p:oleObj>
               </mc:Choice>
@@ -21094,7 +21146,7 @@
           <a:graphicData uri="http://schemas.openxmlformats.org/presentationml/2006/ole">
             <mc:AlternateContent xmlns:mc="http://schemas.openxmlformats.org/markup-compatibility/2006">
               <mc:Choice xmlns:v="urn:schemas-microsoft-com:vml" Requires="v">
-                <p:oleObj spid="_x0000_s632856" name="Equation" r:id="rId6" imgW="1333500" imgH="482600" progId="Equation.DSMT4">
+                <p:oleObj spid="_x0000_s632871" name="Equation" r:id="rId6" imgW="1333500" imgH="482600" progId="Equation.DSMT4">
                   <p:embed/>
                 </p:oleObj>
               </mc:Choice>
@@ -21186,7 +21238,7 @@
           <a:graphicData uri="http://schemas.openxmlformats.org/presentationml/2006/ole">
             <mc:AlternateContent xmlns:mc="http://schemas.openxmlformats.org/markup-compatibility/2006">
               <mc:Choice xmlns:v="urn:schemas-microsoft-com:vml" Requires="v">
-                <p:oleObj spid="_x0000_s632857" name="Equation" r:id="rId8" imgW="1333500" imgH="482600" progId="Equation.DSMT4">
+                <p:oleObj spid="_x0000_s632872" name="Equation" r:id="rId8" imgW="1333500" imgH="482600" progId="Equation.DSMT4">
                   <p:embed/>
                 </p:oleObj>
               </mc:Choice>
@@ -21343,13 +21395,13 @@
   <p:clrMapOvr>
     <a:masterClrMapping/>
   </p:clrMapOvr>
-  <mc:AlternateContent xmlns:mc="http://schemas.openxmlformats.org/markup-compatibility/2006" xmlns:p14="http://schemas.microsoft.com/office/powerpoint/2010/main">
-    <mc:Choice Requires="p14">
+  <mc:AlternateContent xmlns:mc="http://schemas.openxmlformats.org/markup-compatibility/2006">
+    <mc:Choice xmlns:p14="http://schemas.microsoft.com/office/powerpoint/2010/main" Requires="p14">
       <p:transition spd="slow" p14:dur="1100" advClick="0">
         <p:fade/>
       </p:transition>
     </mc:Choice>
-    <mc:Fallback xmlns="">
+    <mc:Fallback>
       <p:transition xmlns:p14="http://schemas.microsoft.com/office/powerpoint/2010/main" spd="slow" advClick="0">
         <p:fade/>
       </p:transition>
@@ -21358,88 +21410,9 @@
   <p:timing>
     <p:tnLst>
       <p:par>
-        <p:cTn xmlns:p14="http://schemas.microsoft.com/office/powerpoint/2010/main" id="1" dur="indefinite" restart="never" nodeType="tmRoot">
-          <p:childTnLst>
-            <p:seq concurrent="1" nextAc="seek">
-              <p:cTn id="2" dur="indefinite" nodeType="mainSeq">
-                <p:childTnLst>
-                  <p:par>
-                    <p:cTn id="3" fill="hold">
-                      <p:stCondLst>
-                        <p:cond delay="indefinite"/>
-                      </p:stCondLst>
-                      <p:childTnLst>
-                        <p:par>
-                          <p:cTn id="4" fill="hold">
-                            <p:stCondLst>
-                              <p:cond delay="0"/>
-                            </p:stCondLst>
-                            <p:childTnLst>
-                              <p:par>
-                                <p:cTn id="5" presetID="10" presetClass="entr" presetSubtype="0" fill="hold" grpId="0" nodeType="clickEffect">
-                                  <p:stCondLst>
-                                    <p:cond delay="0"/>
-                                  </p:stCondLst>
-                                  <p:childTnLst>
-                                    <p:set>
-                                      <p:cBhvr>
-                                        <p:cTn id="6" dur="1" fill="hold">
-                                          <p:stCondLst>
-                                            <p:cond delay="0"/>
-                                          </p:stCondLst>
-                                        </p:cTn>
-                                        <p:tgtEl>
-                                          <p:spTgt spid="13"/>
-                                        </p:tgtEl>
-                                        <p:attrNameLst>
-                                          <p:attrName>style.visibility</p:attrName>
-                                        </p:attrNameLst>
-                                      </p:cBhvr>
-                                      <p:to>
-                                        <p:strVal val="visible"/>
-                                      </p:to>
-                                    </p:set>
-                                    <p:animEffect transition="in" filter="fade">
-                                      <p:cBhvr>
-                                        <p:cTn id="7" dur="500"/>
-                                        <p:tgtEl>
-                                          <p:spTgt spid="13"/>
-                                        </p:tgtEl>
-                                      </p:cBhvr>
-                                    </p:animEffect>
-                                  </p:childTnLst>
-                                </p:cTn>
-                              </p:par>
-                            </p:childTnLst>
-                          </p:cTn>
-                        </p:par>
-                      </p:childTnLst>
-                    </p:cTn>
-                  </p:par>
-                </p:childTnLst>
-              </p:cTn>
-              <p:prevCondLst>
-                <p:cond evt="onPrev" delay="0">
-                  <p:tgtEl>
-                    <p:sldTgt/>
-                  </p:tgtEl>
-                </p:cond>
-              </p:prevCondLst>
-              <p:nextCondLst>
-                <p:cond evt="onNext" delay="0">
-                  <p:tgtEl>
-                    <p:sldTgt/>
-                  </p:tgtEl>
-                </p:cond>
-              </p:nextCondLst>
-            </p:seq>
-          </p:childTnLst>
-        </p:cTn>
+        <p:cTn xmlns:p14="http://schemas.microsoft.com/office/powerpoint/2010/main" id="1" dur="indefinite" restart="never" nodeType="tmRoot"/>
       </p:par>
     </p:tnLst>
-    <p:bldLst>
-      <p:bldP spid="13" grpId="0"/>
-    </p:bldLst>
   </p:timing>
 </p:sld>
 </file>
@@ -21483,7 +21456,7 @@
           <a:graphicData uri="http://schemas.openxmlformats.org/presentationml/2006/ole">
             <mc:AlternateContent xmlns:mc="http://schemas.openxmlformats.org/markup-compatibility/2006">
               <mc:Choice xmlns:v="urn:schemas-microsoft-com:vml" Requires="v">
-                <p:oleObj spid="_x0000_s628785" name="Equation" r:id="rId4" imgW="1371600" imgH="482600" progId="Equation.DSMT4">
+                <p:oleObj spid="_x0000_s628800" name="Equation" r:id="rId4" imgW="1371600" imgH="482600" progId="Equation.DSMT4">
                   <p:embed/>
                 </p:oleObj>
               </mc:Choice>
@@ -21573,7 +21546,7 @@
           <a:graphicData uri="http://schemas.openxmlformats.org/presentationml/2006/ole">
             <mc:AlternateContent xmlns:mc="http://schemas.openxmlformats.org/markup-compatibility/2006">
               <mc:Choice xmlns:v="urn:schemas-microsoft-com:vml" Requires="v">
-                <p:oleObj spid="_x0000_s628786" name="Equation" r:id="rId6" imgW="1333500" imgH="482600" progId="Equation.DSMT4">
+                <p:oleObj spid="_x0000_s628801" name="Equation" r:id="rId6" imgW="1333500" imgH="482600" progId="Equation.DSMT4">
                   <p:embed/>
                 </p:oleObj>
               </mc:Choice>
@@ -21665,7 +21638,7 @@
           <a:graphicData uri="http://schemas.openxmlformats.org/presentationml/2006/ole">
             <mc:AlternateContent xmlns:mc="http://schemas.openxmlformats.org/markup-compatibility/2006">
               <mc:Choice xmlns:v="urn:schemas-microsoft-com:vml" Requires="v">
-                <p:oleObj spid="_x0000_s628787" name="Equation" r:id="rId8" imgW="1333500" imgH="482600" progId="Equation.DSMT4">
+                <p:oleObj spid="_x0000_s628802" name="Equation" r:id="rId8" imgW="1333500" imgH="482600" progId="Equation.DSMT4">
                   <p:embed/>
                 </p:oleObj>
               </mc:Choice>
@@ -22087,7 +22060,7 @@
 </file>
 
 <file path=ppt/slides/slide44.xml><?xml version="1.0" encoding="utf-8"?>
-<p:sld xmlns:a="http://schemas.openxmlformats.org/drawingml/2006/main" xmlns:r="http://schemas.openxmlformats.org/officeDocument/2006/relationships" xmlns:p="http://schemas.openxmlformats.org/presentationml/2006/main" show="0">
+<p:sld xmlns:a="http://schemas.openxmlformats.org/drawingml/2006/main" xmlns:r="http://schemas.openxmlformats.org/officeDocument/2006/relationships" xmlns:p="http://schemas.openxmlformats.org/presentationml/2006/main">
   <p:cSld>
     <p:spTree>
       <p:nvGrpSpPr>
@@ -22145,7 +22118,7 @@
           <p:nvPr>
             <p:extLst>
               <p:ext uri="{D42A27DB-BD31-4B8C-83A1-F6EECF244321}">
-                <p14:modId xmlns:p14="http://schemas.microsoft.com/office/powerpoint/2010/main" val="100300090"/>
+                <p14:modId xmlns:p14="http://schemas.microsoft.com/office/powerpoint/2010/main" val="2095902168"/>
               </p:ext>
             </p:extLst>
           </p:nvPr>
@@ -22158,7 +22131,7 @@
           <a:graphicData uri="http://schemas.openxmlformats.org/presentationml/2006/ole">
             <mc:AlternateContent xmlns:mc="http://schemas.openxmlformats.org/markup-compatibility/2006">
               <mc:Choice xmlns:v="urn:schemas-microsoft-com:vml" Requires="v">
-                <p:oleObj spid="_x0000_s630833" name="Equation" r:id="rId4" imgW="1333500" imgH="482600" progId="Equation.DSMT4">
+                <p:oleObj spid="_x0000_s636966" name="Equation" r:id="rId4" imgW="1333500" imgH="482600" progId="Equation.DSMT4">
                   <p:embed/>
                 </p:oleObj>
               </mc:Choice>
@@ -22237,7 +22210,7 @@
           <p:nvPr>
             <p:extLst>
               <p:ext uri="{D42A27DB-BD31-4B8C-83A1-F6EECF244321}">
-                <p14:modId xmlns:p14="http://schemas.microsoft.com/office/powerpoint/2010/main" val="851805598"/>
+                <p14:modId xmlns:p14="http://schemas.microsoft.com/office/powerpoint/2010/main" val="3962741882"/>
               </p:ext>
             </p:extLst>
           </p:nvPr>
@@ -22250,7 +22223,7 @@
           <a:graphicData uri="http://schemas.openxmlformats.org/presentationml/2006/ole">
             <mc:AlternateContent xmlns:mc="http://schemas.openxmlformats.org/markup-compatibility/2006">
               <mc:Choice xmlns:v="urn:schemas-microsoft-com:vml" Requires="v">
-                <p:oleObj spid="_x0000_s630834" name="Equation" r:id="rId6" imgW="1181100" imgH="508000" progId="Equation.DSMT4">
+                <p:oleObj spid="_x0000_s636967" name="Equation" r:id="rId6" imgW="1181100" imgH="508000" progId="Equation.DSMT4">
                   <p:embed/>
                 </p:oleObj>
               </mc:Choice>
@@ -22294,7 +22267,7 @@
           <p:nvPr>
             <p:extLst>
               <p:ext uri="{D42A27DB-BD31-4B8C-83A1-F6EECF244321}">
-                <p14:modId xmlns:p14="http://schemas.microsoft.com/office/powerpoint/2010/main" val="4140384609"/>
+                <p14:modId xmlns:p14="http://schemas.microsoft.com/office/powerpoint/2010/main" val="3026723214"/>
               </p:ext>
             </p:extLst>
           </p:nvPr>
@@ -22307,7 +22280,7 @@
           <a:graphicData uri="http://schemas.openxmlformats.org/presentationml/2006/ole">
             <mc:AlternateContent xmlns:mc="http://schemas.openxmlformats.org/markup-compatibility/2006">
               <mc:Choice xmlns:v="urn:schemas-microsoft-com:vml" Requires="v">
-                <p:oleObj spid="_x0000_s630835" name="Equation" r:id="rId8" imgW="1181100" imgH="254000" progId="Equation.DSMT4">
+                <p:oleObj spid="_x0000_s636968" name="Equation" r:id="rId8" imgW="1181100" imgH="254000" progId="Equation.DSMT4">
                   <p:embed/>
                 </p:oleObj>
               </mc:Choice>
@@ -22344,42 +22317,6 @@
       </p:graphicFrame>
       <p:sp>
         <p:nvSpPr>
-          <p:cNvPr id="15" name="Title 1"/>
-          <p:cNvSpPr>
-            <a:spLocks noGrp="1"/>
-          </p:cNvSpPr>
-          <p:nvPr>
-            <p:ph type="title"/>
-          </p:nvPr>
-        </p:nvSpPr>
-        <p:spPr>
-          <a:xfrm>
-            <a:off x="1651000" y="363538"/>
-            <a:ext cx="6794500" cy="1003300"/>
-          </a:xfrm>
-        </p:spPr>
-        <p:txBody>
-          <a:bodyPr/>
-          <a:lstStyle/>
-          <a:p>
-            <a:r>
-              <a:rPr lang="en-US" sz="4000" dirty="0" smtClean="0">
-                <a:solidFill>
-                  <a:srgbClr val="C40025"/>
-                </a:solidFill>
-              </a:rPr>
-              <a:t>example</a:t>
-            </a:r>
-            <a:endParaRPr lang="en-US" sz="4000" dirty="0">
-              <a:solidFill>
-                <a:srgbClr val="C40025"/>
-              </a:solidFill>
-            </a:endParaRPr>
-          </a:p>
-        </p:txBody>
-      </p:sp>
-      <p:sp>
-        <p:nvSpPr>
           <p:cNvPr id="12" name="TextBox 11"/>
           <p:cNvSpPr txBox="1"/>
           <p:nvPr/>
@@ -22413,23 +22350,100 @@
           </a:p>
         </p:txBody>
       </p:sp>
+      <p:sp>
+        <p:nvSpPr>
+          <p:cNvPr id="10" name="Title 1"/>
+          <p:cNvSpPr>
+            <a:spLocks noGrp="1"/>
+          </p:cNvSpPr>
+          <p:nvPr>
+            <p:ph type="title"/>
+          </p:nvPr>
+        </p:nvSpPr>
+        <p:spPr>
+          <a:xfrm>
+            <a:off x="1651000" y="363538"/>
+            <a:ext cx="6794500" cy="1003300"/>
+          </a:xfrm>
+        </p:spPr>
+        <p:txBody>
+          <a:bodyPr/>
+          <a:lstStyle/>
+          <a:p>
+            <a:r>
+              <a:rPr lang="en-US" sz="4000" dirty="0" smtClean="0">
+                <a:solidFill>
+                  <a:srgbClr val="C40025"/>
+                </a:solidFill>
+              </a:rPr>
+              <a:t>example</a:t>
+            </a:r>
+            <a:endParaRPr lang="en-US" sz="4000" dirty="0">
+              <a:solidFill>
+                <a:srgbClr val="C40025"/>
+              </a:solidFill>
+            </a:endParaRPr>
+          </a:p>
+        </p:txBody>
+      </p:sp>
+      <p:sp>
+        <p:nvSpPr>
+          <p:cNvPr id="13" name="TextBox 12"/>
+          <p:cNvSpPr txBox="1"/>
+          <p:nvPr/>
+        </p:nvSpPr>
+        <p:spPr>
+          <a:xfrm>
+            <a:off x="987847" y="1808703"/>
+            <a:ext cx="6982501" cy="923330"/>
+          </a:xfrm>
+          <a:prstGeom prst="rect">
+            <a:avLst/>
+          </a:prstGeom>
+          <a:noFill/>
+        </p:spPr>
+        <p:txBody>
+          <a:bodyPr wrap="none" rtlCol="0">
+            <a:spAutoFit/>
+          </a:bodyPr>
+          <a:lstStyle/>
+          <a:p>
+            <a:pPr algn="l"/>
+            <a:r>
+              <a:rPr lang="en-US" sz="5400" dirty="0" smtClean="0">
+                <a:latin typeface="Comic Sans MS" pitchFamily="66" charset="0"/>
+              </a:rPr>
+              <a:t>also sort the </a:t>
+            </a:r>
+            <a:r>
+              <a:rPr lang="en-US" sz="5400" dirty="0" smtClean="0">
+                <a:solidFill>
+                  <a:srgbClr val="C40025"/>
+                </a:solidFill>
+                <a:latin typeface="Comic Sans MS" pitchFamily="66" charset="0"/>
+              </a:rPr>
+              <a:t>clauses</a:t>
+            </a:r>
+          </a:p>
+        </p:txBody>
+      </p:sp>
     </p:spTree>
     <p:extLst>
       <p:ext uri="{BB962C8B-B14F-4D97-AF65-F5344CB8AC3E}">
-        <p14:creationId xmlns:p14="http://schemas.microsoft.com/office/powerpoint/2010/main" val="2463668425"/>
+        <p14:creationId xmlns:p14="http://schemas.microsoft.com/office/powerpoint/2010/main" val="2951599251"/>
       </p:ext>
     </p:extLst>
   </p:cSld>
   <p:clrMapOvr>
     <a:masterClrMapping/>
   </p:clrMapOvr>
-  <mc:AlternateContent xmlns:mc="http://schemas.openxmlformats.org/markup-compatibility/2006">
-    <mc:Choice xmlns:p14="http://schemas.microsoft.com/office/powerpoint/2010/main" Requires="p14">
+  <mc:AlternateContent xmlns:mc="http://schemas.openxmlformats.org/markup-compatibility/2006" xmlns:p14="http://schemas.microsoft.com/office/powerpoint/2010/main">
+    <mc:Choice Requires="p14">
       <p:transition spd="med" p14:dur="600" advClick="0">
         <p:fade/>
       </p:transition>
     </mc:Choice>
-    <mc:Fallback>
+    <mc:Fallback xmlns="">
       <p:transition xmlns:p14="http://schemas.microsoft.com/office/powerpoint/2010/main" spd="med" advClick="0">
         <p:fade/>
       </p:transition>
@@ -22438,9 +22452,150 @@
   <p:timing>
     <p:tnLst>
       <p:par>
-        <p:cTn xmlns:p14="http://schemas.microsoft.com/office/powerpoint/2010/main" id="1" dur="indefinite" restart="never" nodeType="tmRoot"/>
+        <p:cTn xmlns:p14="http://schemas.microsoft.com/office/powerpoint/2010/main" id="1" dur="indefinite" restart="never" nodeType="tmRoot">
+          <p:childTnLst>
+            <p:seq concurrent="1" nextAc="seek">
+              <p:cTn id="2" dur="indefinite" nodeType="mainSeq">
+                <p:childTnLst>
+                  <p:par>
+                    <p:cTn id="3" fill="hold">
+                      <p:stCondLst>
+                        <p:cond delay="indefinite"/>
+                      </p:stCondLst>
+                      <p:childTnLst>
+                        <p:par>
+                          <p:cTn id="4" fill="hold">
+                            <p:stCondLst>
+                              <p:cond delay="0"/>
+                            </p:stCondLst>
+                            <p:childTnLst>
+                              <p:par>
+                                <p:cTn id="5" presetID="10" presetClass="entr" presetSubtype="0" fill="hold" grpId="0" nodeType="clickEffect">
+                                  <p:stCondLst>
+                                    <p:cond delay="0"/>
+                                  </p:stCondLst>
+                                  <p:childTnLst>
+                                    <p:set>
+                                      <p:cBhvr>
+                                        <p:cTn id="6" dur="1" fill="hold">
+                                          <p:stCondLst>
+                                            <p:cond delay="0"/>
+                                          </p:stCondLst>
+                                        </p:cTn>
+                                        <p:tgtEl>
+                                          <p:spTgt spid="13"/>
+                                        </p:tgtEl>
+                                        <p:attrNameLst>
+                                          <p:attrName>style.visibility</p:attrName>
+                                        </p:attrNameLst>
+                                      </p:cBhvr>
+                                      <p:to>
+                                        <p:strVal val="visible"/>
+                                      </p:to>
+                                    </p:set>
+                                    <p:animEffect transition="in" filter="fade">
+                                      <p:cBhvr>
+                                        <p:cTn id="7" dur="500"/>
+                                        <p:tgtEl>
+                                          <p:spTgt spid="13"/>
+                                        </p:tgtEl>
+                                      </p:cBhvr>
+                                    </p:animEffect>
+                                  </p:childTnLst>
+                                </p:cTn>
+                              </p:par>
+                            </p:childTnLst>
+                          </p:cTn>
+                        </p:par>
+                      </p:childTnLst>
+                    </p:cTn>
+                  </p:par>
+                  <p:par>
+                    <p:cTn id="8" fill="hold">
+                      <p:stCondLst>
+                        <p:cond delay="indefinite"/>
+                      </p:stCondLst>
+                      <p:childTnLst>
+                        <p:par>
+                          <p:cTn id="9" fill="hold">
+                            <p:stCondLst>
+                              <p:cond delay="0"/>
+                            </p:stCondLst>
+                            <p:childTnLst>
+                              <p:par>
+                                <p:cTn id="10" presetID="0" presetClass="path" presetSubtype="0" accel="50000" decel="50000" fill="hold" nodeType="clickEffect">
+                                  <p:stCondLst>
+                                    <p:cond delay="0"/>
+                                  </p:stCondLst>
+                                  <p:childTnLst>
+                                    <p:animMotion origin="layout" path="M -0.00278 -0.05136 L 0.13745 -0.21397 " pathEditMode="relative" ptsTypes="AA">
+                                      <p:cBhvr>
+                                        <p:cTn id="11" dur="1000" fill="hold"/>
+                                        <p:tgtEl>
+                                          <p:spTgt spid="11"/>
+                                        </p:tgtEl>
+                                        <p:attrNameLst>
+                                          <p:attrName>ppt_x</p:attrName>
+                                          <p:attrName>ppt_y</p:attrName>
+                                        </p:attrNameLst>
+                                      </p:cBhvr>
+                                    </p:animMotion>
+                                  </p:childTnLst>
+                                </p:cTn>
+                              </p:par>
+                              <p:par>
+                                <p:cTn id="12" presetID="42" presetClass="path" presetSubtype="0" accel="50000" decel="50000" fill="hold" grpId="0" nodeType="withEffect">
+                                  <p:stCondLst>
+                                    <p:cond delay="0"/>
+                                  </p:stCondLst>
+                                  <p:childTnLst>
+                                    <p:animMotion origin="layout" path="M 1.45089E-6 -4.94795E-6 L -0.08279 -0.09854 " pathEditMode="relative" rAng="0" ptsTypes="AA">
+                                      <p:cBhvr>
+                                        <p:cTn id="13" dur="1000" fill="hold"/>
+                                        <p:tgtEl>
+                                          <p:spTgt spid="12"/>
+                                        </p:tgtEl>
+                                        <p:attrNameLst>
+                                          <p:attrName>ppt_x</p:attrName>
+                                          <p:attrName>ppt_y</p:attrName>
+                                        </p:attrNameLst>
+                                      </p:cBhvr>
+                                      <p:rCtr x="-4148" y="-4927"/>
+                                    </p:animMotion>
+                                  </p:childTnLst>
+                                </p:cTn>
+                              </p:par>
+                            </p:childTnLst>
+                          </p:cTn>
+                        </p:par>
+                      </p:childTnLst>
+                    </p:cTn>
+                  </p:par>
+                </p:childTnLst>
+              </p:cTn>
+              <p:prevCondLst>
+                <p:cond evt="onPrev" delay="0">
+                  <p:tgtEl>
+                    <p:sldTgt/>
+                  </p:tgtEl>
+                </p:cond>
+              </p:prevCondLst>
+              <p:nextCondLst>
+                <p:cond evt="onNext" delay="0">
+                  <p:tgtEl>
+                    <p:sldTgt/>
+                  </p:tgtEl>
+                </p:cond>
+              </p:nextCondLst>
+            </p:seq>
+          </p:childTnLst>
+        </p:cTn>
       </p:par>
     </p:tnLst>
+    <p:bldLst>
+      <p:bldP spid="12" grpId="0"/>
+      <p:bldP spid="13" grpId="0"/>
+    </p:bldLst>
   </p:timing>
 </p:sld>
 </file>
@@ -22504,25 +22659,25 @@
           <p:nvPr>
             <p:extLst>
               <p:ext uri="{D42A27DB-BD31-4B8C-83A1-F6EECF244321}">
-                <p14:modId xmlns:p14="http://schemas.microsoft.com/office/powerpoint/2010/main" val="2095902168"/>
+                <p14:modId xmlns:p14="http://schemas.microsoft.com/office/powerpoint/2010/main" val="3083144455"/>
               </p:ext>
             </p:extLst>
           </p:nvPr>
         </p:nvGraphicFramePr>
         <p:xfrm>
-          <a:off x="820136" y="3282949"/>
-          <a:ext cx="3172598" cy="1149351"/>
+          <a:off x="327025" y="1943870"/>
+          <a:ext cx="8497888" cy="1533525"/>
         </p:xfrm>
         <a:graphic>
           <a:graphicData uri="http://schemas.openxmlformats.org/presentationml/2006/ole">
             <mc:AlternateContent xmlns:mc="http://schemas.openxmlformats.org/markup-compatibility/2006">
               <mc:Choice xmlns:v="urn:schemas-microsoft-com:vml" Requires="v">
-                <p:oleObj spid="_x0000_s636951" name="Equation" r:id="rId4" imgW="1333500" imgH="482600" progId="Equation.DSMT4">
+                <p:oleObj spid="_x0000_s638979" name="Equation" r:id="rId4" imgW="2679700" imgH="482600" progId="Equation.DSMT4">
                   <p:embed/>
                 </p:oleObj>
               </mc:Choice>
               <mc:Fallback>
-                <p:oleObj name="Equation" r:id="rId4" imgW="1333500" imgH="482600" progId="Equation.DSMT4">
+                <p:oleObj name="Equation" r:id="rId4" imgW="2679700" imgH="482600" progId="Equation.DSMT4">
                   <p:embed/>
                   <p:pic>
                     <p:nvPicPr>
@@ -22538,8 +22693,8 @@
                     </p:blipFill>
                     <p:spPr>
                       <a:xfrm>
-                        <a:off x="820136" y="3282949"/>
-                        <a:ext cx="3172598" cy="1149351"/>
+                        <a:off x="327025" y="1943870"/>
+                        <a:ext cx="8497888" cy="1533525"/>
                       </a:xfrm>
                       <a:prstGeom prst="rect">
                         <a:avLst/>
@@ -22554,365 +22709,6 @@
       </p:graphicFrame>
       <p:sp>
         <p:nvSpPr>
-          <p:cNvPr id="5" name="TextBox 4"/>
-          <p:cNvSpPr txBox="1"/>
-          <p:nvPr/>
-        </p:nvSpPr>
-        <p:spPr>
-          <a:xfrm>
-            <a:off x="3947512" y="3886793"/>
-            <a:ext cx="869439" cy="584776"/>
-          </a:xfrm>
-          <a:prstGeom prst="rect">
-            <a:avLst/>
-          </a:prstGeom>
-          <a:noFill/>
-        </p:spPr>
-        <p:txBody>
-          <a:bodyPr wrap="square" rtlCol="0">
-            <a:spAutoFit/>
-          </a:bodyPr>
-          <a:lstStyle/>
-          <a:p>
-            <a:pPr algn="l"/>
-            <a:r>
-              <a:rPr lang="en-US" dirty="0" smtClean="0">
-                <a:solidFill>
-                  <a:srgbClr val="0000FF"/>
-                </a:solidFill>
-                <a:latin typeface="Comic Sans MS" pitchFamily="66" charset="0"/>
-              </a:rPr>
-              <a:t>OR</a:t>
-            </a:r>
-          </a:p>
-        </p:txBody>
-      </p:sp>
-      <p:graphicFrame>
-        <p:nvGraphicFramePr>
-          <p:cNvPr id="9" name="Object 8"/>
-          <p:cNvGraphicFramePr>
-            <a:graphicFrameLocks noChangeAspect="1"/>
-          </p:cNvGraphicFramePr>
-          <p:nvPr>
-            <p:extLst>
-              <p:ext uri="{D42A27DB-BD31-4B8C-83A1-F6EECF244321}">
-                <p14:modId xmlns:p14="http://schemas.microsoft.com/office/powerpoint/2010/main" val="3962741882"/>
-              </p:ext>
-            </p:extLst>
-          </p:nvPr>
-        </p:nvGraphicFramePr>
-        <p:xfrm>
-          <a:off x="4741320" y="3288040"/>
-          <a:ext cx="2811462" cy="1209675"/>
-        </p:xfrm>
-        <a:graphic>
-          <a:graphicData uri="http://schemas.openxmlformats.org/presentationml/2006/ole">
-            <mc:AlternateContent xmlns:mc="http://schemas.openxmlformats.org/markup-compatibility/2006">
-              <mc:Choice xmlns:v="urn:schemas-microsoft-com:vml" Requires="v">
-                <p:oleObj spid="_x0000_s636952" name="Equation" r:id="rId6" imgW="1181100" imgH="508000" progId="Equation.DSMT4">
-                  <p:embed/>
-                </p:oleObj>
-              </mc:Choice>
-              <mc:Fallback>
-                <p:oleObj name="Equation" r:id="rId6" imgW="1181100" imgH="508000" progId="Equation.DSMT4">
-                  <p:embed/>
-                  <p:pic>
-                    <p:nvPicPr>
-                      <p:cNvPr id="0" name=""/>
-                      <p:cNvPicPr/>
-                      <p:nvPr/>
-                    </p:nvPicPr>
-                    <p:blipFill>
-                      <a:blip r:embed="rId7"/>
-                      <a:stretch>
-                        <a:fillRect/>
-                      </a:stretch>
-                    </p:blipFill>
-                    <p:spPr>
-                      <a:xfrm>
-                        <a:off x="4741320" y="3288040"/>
-                        <a:ext cx="2811462" cy="1209675"/>
-                      </a:xfrm>
-                      <a:prstGeom prst="rect">
-                        <a:avLst/>
-                      </a:prstGeom>
-                    </p:spPr>
-                  </p:pic>
-                </p:oleObj>
-              </mc:Fallback>
-            </mc:AlternateContent>
-          </a:graphicData>
-        </a:graphic>
-      </p:graphicFrame>
-      <p:graphicFrame>
-        <p:nvGraphicFramePr>
-          <p:cNvPr id="11" name="Object 10"/>
-          <p:cNvGraphicFramePr>
-            <a:graphicFrameLocks noChangeAspect="1"/>
-          </p:cNvGraphicFramePr>
-          <p:nvPr>
-            <p:extLst>
-              <p:ext uri="{D42A27DB-BD31-4B8C-83A1-F6EECF244321}">
-                <p14:modId xmlns:p14="http://schemas.microsoft.com/office/powerpoint/2010/main" val="3026723214"/>
-              </p:ext>
-            </p:extLst>
-          </p:nvPr>
-        </p:nvGraphicFramePr>
-        <p:xfrm>
-          <a:off x="2905405" y="4718963"/>
-          <a:ext cx="2809875" cy="604837"/>
-        </p:xfrm>
-        <a:graphic>
-          <a:graphicData uri="http://schemas.openxmlformats.org/presentationml/2006/ole">
-            <mc:AlternateContent xmlns:mc="http://schemas.openxmlformats.org/markup-compatibility/2006">
-              <mc:Choice xmlns:v="urn:schemas-microsoft-com:vml" Requires="v">
-                <p:oleObj spid="_x0000_s636953" name="Equation" r:id="rId8" imgW="1181100" imgH="254000" progId="Equation.DSMT4">
-                  <p:embed/>
-                </p:oleObj>
-              </mc:Choice>
-              <mc:Fallback>
-                <p:oleObj name="Equation" r:id="rId8" imgW="1181100" imgH="254000" progId="Equation.DSMT4">
-                  <p:embed/>
-                  <p:pic>
-                    <p:nvPicPr>
-                      <p:cNvPr id="0" name=""/>
-                      <p:cNvPicPr/>
-                      <p:nvPr/>
-                    </p:nvPicPr>
-                    <p:blipFill>
-                      <a:blip r:embed="rId9"/>
-                      <a:stretch>
-                        <a:fillRect/>
-                      </a:stretch>
-                    </p:blipFill>
-                    <p:spPr>
-                      <a:xfrm>
-                        <a:off x="2905405" y="4718963"/>
-                        <a:ext cx="2809875" cy="604837"/>
-                      </a:xfrm>
-                      <a:prstGeom prst="rect">
-                        <a:avLst/>
-                      </a:prstGeom>
-                    </p:spPr>
-                  </p:pic>
-                </p:oleObj>
-              </mc:Fallback>
-            </mc:AlternateContent>
-          </a:graphicData>
-        </a:graphic>
-      </p:graphicFrame>
-      <p:sp>
-        <p:nvSpPr>
-          <p:cNvPr id="12" name="TextBox 11"/>
-          <p:cNvSpPr txBox="1"/>
-          <p:nvPr/>
-        </p:nvSpPr>
-        <p:spPr>
-          <a:xfrm>
-            <a:off x="7778324" y="3907806"/>
-            <a:ext cx="869439" cy="584776"/>
-          </a:xfrm>
-          <a:prstGeom prst="rect">
-            <a:avLst/>
-          </a:prstGeom>
-          <a:noFill/>
-        </p:spPr>
-        <p:txBody>
-          <a:bodyPr wrap="square" rtlCol="0">
-            <a:spAutoFit/>
-          </a:bodyPr>
-          <a:lstStyle/>
-          <a:p>
-            <a:pPr algn="l"/>
-            <a:r>
-              <a:rPr lang="en-US" dirty="0" smtClean="0">
-                <a:solidFill>
-                  <a:srgbClr val="0000FF"/>
-                </a:solidFill>
-                <a:latin typeface="Comic Sans MS" pitchFamily="66" charset="0"/>
-              </a:rPr>
-              <a:t>OR</a:t>
-            </a:r>
-          </a:p>
-        </p:txBody>
-      </p:sp>
-      <p:sp>
-        <p:nvSpPr>
-          <p:cNvPr id="10" name="Title 1"/>
-          <p:cNvSpPr>
-            <a:spLocks noGrp="1"/>
-          </p:cNvSpPr>
-          <p:nvPr>
-            <p:ph type="title"/>
-          </p:nvPr>
-        </p:nvSpPr>
-        <p:spPr>
-          <a:xfrm>
-            <a:off x="1651000" y="363538"/>
-            <a:ext cx="6794500" cy="1003300"/>
-          </a:xfrm>
-        </p:spPr>
-        <p:txBody>
-          <a:bodyPr/>
-          <a:lstStyle/>
-          <a:p>
-            <a:r>
-              <a:rPr lang="en-US" sz="4000" dirty="0" smtClean="0">
-                <a:solidFill>
-                  <a:srgbClr val="C40025"/>
-                </a:solidFill>
-              </a:rPr>
-              <a:t>example</a:t>
-            </a:r>
-            <a:endParaRPr lang="en-US" sz="4000" dirty="0">
-              <a:solidFill>
-                <a:srgbClr val="C40025"/>
-              </a:solidFill>
-            </a:endParaRPr>
-          </a:p>
-        </p:txBody>
-      </p:sp>
-    </p:spTree>
-    <p:extLst>
-      <p:ext uri="{BB962C8B-B14F-4D97-AF65-F5344CB8AC3E}">
-        <p14:creationId xmlns:p14="http://schemas.microsoft.com/office/powerpoint/2010/main" val="2951599251"/>
-      </p:ext>
-    </p:extLst>
-  </p:cSld>
-  <p:clrMapOvr>
-    <a:masterClrMapping/>
-  </p:clrMapOvr>
-  <mc:AlternateContent xmlns:mc="http://schemas.openxmlformats.org/markup-compatibility/2006">
-    <mc:Choice xmlns:p14="http://schemas.microsoft.com/office/powerpoint/2010/main" Requires="p14">
-      <p:transition spd="med" p14:dur="600" advClick="0" advTm="2000">
-        <p:fade/>
-      </p:transition>
-    </mc:Choice>
-    <mc:Fallback>
-      <p:transition xmlns:p14="http://schemas.microsoft.com/office/powerpoint/2010/main" spd="med" advClick="0" advTm="2000">
-        <p:fade/>
-      </p:transition>
-    </mc:Fallback>
-  </mc:AlternateContent>
-  <p:timing>
-    <p:tnLst>
-      <p:par>
-        <p:cTn xmlns:p14="http://schemas.microsoft.com/office/powerpoint/2010/main" id="1" dur="indefinite" restart="never" nodeType="tmRoot"/>
-      </p:par>
-    </p:tnLst>
-  </p:timing>
-</p:sld>
-</file>
-
-<file path=ppt/slides/slide46.xml><?xml version="1.0" encoding="utf-8"?>
-<p:sld xmlns:a="http://schemas.openxmlformats.org/drawingml/2006/main" xmlns:r="http://schemas.openxmlformats.org/officeDocument/2006/relationships" xmlns:p="http://schemas.openxmlformats.org/presentationml/2006/main">
-  <p:cSld>
-    <p:spTree>
-      <p:nvGrpSpPr>
-        <p:cNvPr id="1" name=""/>
-        <p:cNvGrpSpPr/>
-        <p:nvPr/>
-      </p:nvGrpSpPr>
-      <p:grpSpPr>
-        <a:xfrm>
-          <a:off x="0" y="0"/>
-          <a:ext cx="0" cy="0"/>
-          <a:chOff x="0" y="0"/>
-          <a:chExt cx="0" cy="0"/>
-        </a:xfrm>
-      </p:grpSpPr>
-      <p:sp>
-        <p:nvSpPr>
-          <p:cNvPr id="4" name="Slide Number Placeholder 2"/>
-          <p:cNvSpPr>
-            <a:spLocks noGrp="1"/>
-          </p:cNvSpPr>
-          <p:nvPr>
-            <p:ph type="sldNum" sz="quarter" idx="10"/>
-          </p:nvPr>
-        </p:nvSpPr>
-        <p:spPr>
-          <a:xfrm>
-            <a:off x="7333815" y="6553200"/>
-            <a:ext cx="1810186" cy="276999"/>
-          </a:xfrm>
-        </p:spPr>
-        <p:txBody>
-          <a:bodyPr/>
-          <a:lstStyle/>
-          <a:p>
-            <a:r>
-              <a:rPr lang="en-US" dirty="0" smtClean="0"/>
-              <a:t>propositional algebra.</a:t>
-            </a:r>
-            <a:fld id="{3251DA95-B240-47FE-901D-B78FC8E8E532}" type="slidenum">
-              <a:rPr lang="en-US" smtClean="0"/>
-              <a:pPr/>
-              <a:t>46</a:t>
-            </a:fld>
-            <a:endParaRPr lang="en-US" dirty="0"/>
-          </a:p>
-        </p:txBody>
-      </p:sp>
-      <p:graphicFrame>
-        <p:nvGraphicFramePr>
-          <p:cNvPr id="7" name="Object 6"/>
-          <p:cNvGraphicFramePr>
-            <a:graphicFrameLocks noChangeAspect="1"/>
-          </p:cNvGraphicFramePr>
-          <p:nvPr>
-            <p:extLst>
-              <p:ext uri="{D42A27DB-BD31-4B8C-83A1-F6EECF244321}">
-                <p14:modId xmlns:p14="http://schemas.microsoft.com/office/powerpoint/2010/main" val="4272074639"/>
-              </p:ext>
-            </p:extLst>
-          </p:nvPr>
-        </p:nvGraphicFramePr>
-        <p:xfrm>
-          <a:off x="308108" y="2662885"/>
-          <a:ext cx="8537309" cy="1532229"/>
-        </p:xfrm>
-        <a:graphic>
-          <a:graphicData uri="http://schemas.openxmlformats.org/presentationml/2006/ole">
-            <mc:AlternateContent xmlns:mc="http://schemas.openxmlformats.org/markup-compatibility/2006">
-              <mc:Choice xmlns:v="urn:schemas-microsoft-com:vml" Requires="v">
-                <p:oleObj spid="_x0000_s529460" name="Equation" r:id="rId4" imgW="2692400" imgH="482600" progId="Equation.DSMT4">
-                  <p:embed/>
-                </p:oleObj>
-              </mc:Choice>
-              <mc:Fallback>
-                <p:oleObj name="Equation" r:id="rId4" imgW="2692400" imgH="482600" progId="Equation.DSMT4">
-                  <p:embed/>
-                  <p:pic>
-                    <p:nvPicPr>
-                      <p:cNvPr id="0" name=""/>
-                      <p:cNvPicPr/>
-                      <p:nvPr/>
-                    </p:nvPicPr>
-                    <p:blipFill>
-                      <a:blip r:embed="rId5"/>
-                      <a:stretch>
-                        <a:fillRect/>
-                      </a:stretch>
-                    </p:blipFill>
-                    <p:spPr>
-                      <a:xfrm>
-                        <a:off x="308108" y="2662885"/>
-                        <a:ext cx="8537309" cy="1532229"/>
-                      </a:xfrm>
-                      <a:prstGeom prst="rect">
-                        <a:avLst/>
-                      </a:prstGeom>
-                    </p:spPr>
-                  </p:pic>
-                </p:oleObj>
-              </mc:Fallback>
-            </mc:AlternateContent>
-          </a:graphicData>
-        </a:graphic>
-      </p:graphicFrame>
-      <p:sp>
-        <p:nvSpPr>
           <p:cNvPr id="10" name="Title 4"/>
           <p:cNvSpPr txBox="1">
             <a:spLocks/>
@@ -22921,8 +22717,8 @@
         </p:nvSpPr>
         <p:spPr bwMode="auto">
           <a:xfrm>
-            <a:off x="1892300" y="279400"/>
-            <a:ext cx="5969000" cy="1130300"/>
+            <a:off x="2285488" y="3858307"/>
+            <a:ext cx="6429954" cy="1208610"/>
           </a:xfrm>
           <a:prstGeom prst="rect">
             <a:avLst/>
@@ -23073,18 +22869,18 @@
           </a:lstStyle>
           <a:p>
             <a:r>
-              <a:rPr lang="en-US" sz="4800" dirty="0" smtClean="0"/>
+              <a:rPr lang="en-US" sz="6000" b="0" dirty="0" smtClean="0"/>
               <a:t>Sorted </a:t>
             </a:r>
             <a:r>
-              <a:rPr lang="en-US" sz="4800" dirty="0" smtClean="0">
+              <a:rPr lang="en-US" sz="6000" b="0" dirty="0" smtClean="0">
                 <a:solidFill>
                   <a:srgbClr val="000000"/>
                 </a:solidFill>
               </a:rPr>
               <a:t>Full DNF</a:t>
             </a:r>
-            <a:endParaRPr lang="en-US" sz="4800" dirty="0">
+            <a:endParaRPr lang="en-US" sz="6000" b="0" dirty="0">
               <a:solidFill>
                 <a:srgbClr val="000000"/>
               </a:solidFill>
@@ -23100,8 +22896,8 @@
         </p:nvSpPr>
         <p:spPr>
           <a:xfrm>
-            <a:off x="161126" y="425546"/>
-            <a:ext cx="1795984" cy="830997"/>
+            <a:off x="443364" y="3978788"/>
+            <a:ext cx="1790462" cy="923330"/>
           </a:xfrm>
           <a:prstGeom prst="rect">
             <a:avLst/>
@@ -23115,13 +22911,13 @@
           <a:p>
             <a:pPr algn="l"/>
             <a:r>
-              <a:rPr lang="en-US" sz="4800" dirty="0" smtClean="0">
+              <a:rPr lang="en-US" sz="5400" dirty="0" smtClean="0">
                 <a:solidFill>
-                  <a:srgbClr val="FF03E3"/>
+                  <a:srgbClr val="C40025"/>
                 </a:solidFill>
                 <a:latin typeface="Comic Sans MS" pitchFamily="66" charset="0"/>
               </a:rPr>
-              <a:t>Done:</a:t>
+              <a:t>Done</a:t>
             </a:r>
           </a:p>
         </p:txBody>
@@ -23134,7 +22930,7 @@
         </p:nvSpPr>
         <p:spPr bwMode="auto">
           <a:xfrm>
-            <a:off x="179609" y="2552709"/>
+            <a:off x="179609" y="1898481"/>
             <a:ext cx="8736673" cy="1808703"/>
           </a:xfrm>
           <a:prstGeom prst="roundRect">
@@ -23189,10 +22985,83 @@
           </a:p>
         </p:txBody>
       </p:sp>
+      <p:sp>
+        <p:nvSpPr>
+          <p:cNvPr id="6" name="TextBox 5"/>
+          <p:cNvSpPr txBox="1"/>
+          <p:nvPr/>
+        </p:nvSpPr>
+        <p:spPr>
+          <a:xfrm>
+            <a:off x="2224500" y="384829"/>
+            <a:ext cx="5562814" cy="1015663"/>
+          </a:xfrm>
+          <a:prstGeom prst="rect">
+            <a:avLst/>
+          </a:prstGeom>
+          <a:noFill/>
+        </p:spPr>
+        <p:txBody>
+          <a:bodyPr wrap="square" rtlCol="0">
+            <a:spAutoFit/>
+          </a:bodyPr>
+          <a:lstStyle/>
+          <a:p>
+            <a:pPr algn="l"/>
+            <a:r>
+              <a:rPr lang="en-US" sz="6000" b="1" dirty="0" smtClean="0">
+                <a:solidFill>
+                  <a:srgbClr val="0000FF"/>
+                </a:solidFill>
+                <a:latin typeface="Comic Sans MS" pitchFamily="66" charset="0"/>
+              </a:rPr>
+              <a:t>Canonical</a:t>
+            </a:r>
+            <a:r>
+              <a:rPr lang="en-US" sz="6000" b="1" dirty="0" smtClean="0">
+                <a:latin typeface="Comic Sans MS" pitchFamily="66" charset="0"/>
+              </a:rPr>
+              <a:t> DNF</a:t>
+            </a:r>
+          </a:p>
+        </p:txBody>
+      </p:sp>
+      <p:sp>
+        <p:nvSpPr>
+          <p:cNvPr id="8" name="TextBox 7"/>
+          <p:cNvSpPr txBox="1"/>
+          <p:nvPr/>
+        </p:nvSpPr>
+        <p:spPr>
+          <a:xfrm>
+            <a:off x="651180" y="5182370"/>
+            <a:ext cx="7851165" cy="923330"/>
+          </a:xfrm>
+          <a:prstGeom prst="rect">
+            <a:avLst/>
+          </a:prstGeom>
+          <a:noFill/>
+        </p:spPr>
+        <p:txBody>
+          <a:bodyPr wrap="none" rtlCol="0">
+            <a:spAutoFit/>
+          </a:bodyPr>
+          <a:lstStyle/>
+          <a:p>
+            <a:pPr algn="l"/>
+            <a:r>
+              <a:rPr lang="en-US" sz="5400" dirty="0" smtClean="0">
+                <a:latin typeface="Comic Sans MS" pitchFamily="66" charset="0"/>
+              </a:rPr>
+              <a:t>unique for each formula</a:t>
+            </a:r>
+          </a:p>
+        </p:txBody>
+      </p:sp>
     </p:spTree>
     <p:extLst>
       <p:ext uri="{BB962C8B-B14F-4D97-AF65-F5344CB8AC3E}">
-        <p14:creationId xmlns:p14="http://schemas.microsoft.com/office/powerpoint/2010/main" val="799748073"/>
+        <p14:creationId xmlns:p14="http://schemas.microsoft.com/office/powerpoint/2010/main" val="1046978317"/>
       </p:ext>
     </p:extLst>
   </p:cSld>
@@ -23429,6 +23298,112 @@
                       </p:childTnLst>
                     </p:cTn>
                   </p:par>
+                  <p:par>
+                    <p:cTn id="20" fill="hold">
+                      <p:stCondLst>
+                        <p:cond delay="indefinite"/>
+                      </p:stCondLst>
+                      <p:childTnLst>
+                        <p:par>
+                          <p:cTn id="21" fill="hold">
+                            <p:stCondLst>
+                              <p:cond delay="0"/>
+                            </p:stCondLst>
+                            <p:childTnLst>
+                              <p:par>
+                                <p:cTn id="22" presetID="10" presetClass="entr" presetSubtype="0" fill="hold" grpId="0" nodeType="clickEffect">
+                                  <p:stCondLst>
+                                    <p:cond delay="0"/>
+                                  </p:stCondLst>
+                                  <p:childTnLst>
+                                    <p:set>
+                                      <p:cBhvr>
+                                        <p:cTn id="23" dur="1" fill="hold">
+                                          <p:stCondLst>
+                                            <p:cond delay="0"/>
+                                          </p:stCondLst>
+                                        </p:cTn>
+                                        <p:tgtEl>
+                                          <p:spTgt spid="8"/>
+                                        </p:tgtEl>
+                                        <p:attrNameLst>
+                                          <p:attrName>style.visibility</p:attrName>
+                                        </p:attrNameLst>
+                                      </p:cBhvr>
+                                      <p:to>
+                                        <p:strVal val="visible"/>
+                                      </p:to>
+                                    </p:set>
+                                    <p:animEffect transition="in" filter="fade">
+                                      <p:cBhvr>
+                                        <p:cTn id="24" dur="500"/>
+                                        <p:tgtEl>
+                                          <p:spTgt spid="8"/>
+                                        </p:tgtEl>
+                                      </p:cBhvr>
+                                    </p:animEffect>
+                                  </p:childTnLst>
+                                </p:cTn>
+                              </p:par>
+                            </p:childTnLst>
+                          </p:cTn>
+                        </p:par>
+                      </p:childTnLst>
+                    </p:cTn>
+                  </p:par>
+                  <p:par>
+                    <p:cTn id="25" fill="hold">
+                      <p:stCondLst>
+                        <p:cond delay="indefinite"/>
+                      </p:stCondLst>
+                      <p:childTnLst>
+                        <p:par>
+                          <p:cTn id="26" fill="hold">
+                            <p:stCondLst>
+                              <p:cond delay="0"/>
+                            </p:stCondLst>
+                            <p:childTnLst>
+                              <p:par>
+                                <p:cTn id="27" presetID="10" presetClass="entr" presetSubtype="0" fill="hold" grpId="0" nodeType="clickEffect">
+                                  <p:stCondLst>
+                                    <p:cond delay="0"/>
+                                  </p:stCondLst>
+                                  <p:childTnLst>
+                                    <p:set>
+                                      <p:cBhvr>
+                                        <p:cTn id="28" dur="1" fill="hold">
+                                          <p:stCondLst>
+                                            <p:cond delay="0"/>
+                                          </p:stCondLst>
+                                        </p:cTn>
+                                        <p:tgtEl>
+                                          <p:spTgt spid="6"/>
+                                        </p:tgtEl>
+                                        <p:attrNameLst>
+                                          <p:attrName>style.visibility</p:attrName>
+                                        </p:attrNameLst>
+                                      </p:cBhvr>
+                                      <p:to>
+                                        <p:strVal val="visible"/>
+                                      </p:to>
+                                    </p:set>
+                                    <p:animEffect transition="in" filter="fade">
+                                      <p:cBhvr>
+                                        <p:cTn id="29" dur="500"/>
+                                        <p:tgtEl>
+                                          <p:spTgt spid="6"/>
+                                        </p:tgtEl>
+                                      </p:cBhvr>
+                                    </p:animEffect>
+                                  </p:childTnLst>
+                                </p:cTn>
+                              </p:par>
+                            </p:childTnLst>
+                          </p:cTn>
+                        </p:par>
+                      </p:childTnLst>
+                    </p:cTn>
+                  </p:par>
                 </p:childTnLst>
               </p:cTn>
               <p:prevCondLst>
@@ -23454,12 +23429,14 @@
       <p:bldP spid="10" grpId="0"/>
       <p:bldP spid="5" grpId="0" animBg="1"/>
       <p:bldP spid="2" grpId="0" animBg="1"/>
+      <p:bldP spid="6" grpId="0"/>
+      <p:bldP spid="8" grpId="0"/>
     </p:bldLst>
   </p:timing>
 </p:sld>
 </file>
 
-<file path=ppt/slides/slide47.xml><?xml version="1.0" encoding="utf-8"?>
+<file path=ppt/slides/slide46.xml><?xml version="1.0" encoding="utf-8"?>
 <p:sld xmlns:a="http://schemas.openxmlformats.org/drawingml/2006/main" xmlns:r="http://schemas.openxmlformats.org/officeDocument/2006/relationships" xmlns:p="http://schemas.openxmlformats.org/presentationml/2006/main">
   <p:cSld>
     <p:spTree>
@@ -23671,7 +23648,7 @@
             <a:fld id="{3251DA95-B240-47FE-901D-B78FC8E8E532}" type="slidenum">
               <a:rPr lang="en-US" smtClean="0"/>
               <a:pPr/>
-              <a:t>47</a:t>
+              <a:t>46</a:t>
             </a:fld>
             <a:endParaRPr lang="en-US" dirty="0"/>
           </a:p>
@@ -23827,6 +23804,169 @@
 </p:sld>
 </file>
 
+<file path=ppt/slides/slide47.xml><?xml version="1.0" encoding="utf-8"?>
+<p:sld xmlns:a="http://schemas.openxmlformats.org/drawingml/2006/main" xmlns:r="http://schemas.openxmlformats.org/officeDocument/2006/relationships" xmlns:p="http://schemas.openxmlformats.org/presentationml/2006/main">
+  <p:cSld>
+    <p:spTree>
+      <p:nvGrpSpPr>
+        <p:cNvPr id="1" name=""/>
+        <p:cNvGrpSpPr/>
+        <p:nvPr/>
+      </p:nvGrpSpPr>
+      <p:grpSpPr>
+        <a:xfrm>
+          <a:off x="0" y="0"/>
+          <a:ext cx="0" cy="0"/>
+          <a:chOff x="0" y="0"/>
+          <a:chExt cx="0" cy="0"/>
+        </a:xfrm>
+      </p:grpSpPr>
+      <p:sp>
+        <p:nvSpPr>
+          <p:cNvPr id="5" name="TextBox 4"/>
+          <p:cNvSpPr txBox="1"/>
+          <p:nvPr/>
+        </p:nvSpPr>
+        <p:spPr>
+          <a:xfrm>
+            <a:off x="249243" y="1847840"/>
+            <a:ext cx="8985240" cy="1754327"/>
+          </a:xfrm>
+          <a:prstGeom prst="rect">
+            <a:avLst/>
+          </a:prstGeom>
+          <a:noFill/>
+        </p:spPr>
+        <p:txBody>
+          <a:bodyPr wrap="square" rtlCol="0">
+            <a:spAutoFit/>
+          </a:bodyPr>
+          <a:lstStyle/>
+          <a:p>
+            <a:pPr algn="l"/>
+            <a:r>
+              <a:rPr lang="en-US" sz="5400" dirty="0" smtClean="0">
+                <a:solidFill>
+                  <a:srgbClr val="000000"/>
+                </a:solidFill>
+                <a:latin typeface="Comic Sans MS" pitchFamily="66" charset="0"/>
+              </a:rPr>
+              <a:t>Because two formulas are</a:t>
+            </a:r>
+          </a:p>
+          <a:p>
+            <a:pPr algn="l"/>
+            <a:r>
+              <a:rPr lang="en-US" sz="5400" dirty="0" smtClean="0">
+                <a:solidFill>
+                  <a:srgbClr val="000000"/>
+                </a:solidFill>
+                <a:latin typeface="Comic Sans MS" pitchFamily="66" charset="0"/>
+              </a:rPr>
+              <a:t>equivalent </a:t>
+            </a:r>
+            <a:endParaRPr lang="en-US" sz="5400" dirty="0">
+              <a:solidFill>
+                <a:srgbClr val="000000"/>
+              </a:solidFill>
+              <a:latin typeface="Comic Sans MS" pitchFamily="66" charset="0"/>
+            </a:endParaRPr>
+          </a:p>
+        </p:txBody>
+      </p:sp>
+      <p:sp>
+        <p:nvSpPr>
+          <p:cNvPr id="9" name="Title 1"/>
+          <p:cNvSpPr>
+            <a:spLocks noGrp="1"/>
+          </p:cNvSpPr>
+          <p:nvPr>
+            <p:ph type="title"/>
+          </p:nvPr>
+        </p:nvSpPr>
+        <p:spPr>
+          <a:xfrm>
+            <a:off x="1651000" y="363538"/>
+            <a:ext cx="6794500" cy="1003300"/>
+          </a:xfrm>
+        </p:spPr>
+        <p:txBody>
+          <a:bodyPr/>
+          <a:lstStyle/>
+          <a:p>
+            <a:r>
+              <a:rPr lang="en-US" sz="4000" dirty="0" smtClean="0"/>
+              <a:t>Algebra for Equivalence</a:t>
+            </a:r>
+            <a:endParaRPr lang="en-US" sz="4000" dirty="0"/>
+          </a:p>
+        </p:txBody>
+      </p:sp>
+      <p:sp>
+        <p:nvSpPr>
+          <p:cNvPr id="4" name="Slide Number Placeholder 2"/>
+          <p:cNvSpPr>
+            <a:spLocks noGrp="1"/>
+          </p:cNvSpPr>
+          <p:nvPr>
+            <p:ph type="sldNum" sz="quarter" idx="10"/>
+          </p:nvPr>
+        </p:nvSpPr>
+        <p:spPr>
+          <a:xfrm>
+            <a:off x="7333815" y="6553200"/>
+            <a:ext cx="1810186" cy="276999"/>
+          </a:xfrm>
+        </p:spPr>
+        <p:txBody>
+          <a:bodyPr/>
+          <a:lstStyle/>
+          <a:p>
+            <a:r>
+              <a:rPr lang="en-US" dirty="0" smtClean="0"/>
+              <a:t>propositional algebra.</a:t>
+            </a:r>
+            <a:fld id="{3251DA95-B240-47FE-901D-B78FC8E8E532}" type="slidenum">
+              <a:rPr lang="en-US" smtClean="0"/>
+              <a:pPr/>
+              <a:t>47</a:t>
+            </a:fld>
+            <a:endParaRPr lang="en-US" dirty="0"/>
+          </a:p>
+        </p:txBody>
+      </p:sp>
+    </p:spTree>
+    <p:extLst>
+      <p:ext uri="{BB962C8B-B14F-4D97-AF65-F5344CB8AC3E}">
+        <p14:creationId xmlns:p14="http://schemas.microsoft.com/office/powerpoint/2010/main" val="2003119538"/>
+      </p:ext>
+    </p:extLst>
+  </p:cSld>
+  <p:clrMapOvr>
+    <a:masterClrMapping/>
+  </p:clrMapOvr>
+  <mc:AlternateContent xmlns:mc="http://schemas.openxmlformats.org/markup-compatibility/2006">
+    <mc:Choice xmlns:p14="http://schemas.microsoft.com/office/powerpoint/2010/main" Requires="p14">
+      <p:transition spd="med" p14:dur="700" advClick="0">
+        <p:fade/>
+      </p:transition>
+    </mc:Choice>
+    <mc:Fallback>
+      <p:transition xmlns:p14="http://schemas.microsoft.com/office/powerpoint/2010/main" spd="med" advClick="0">
+        <p:fade/>
+      </p:transition>
+    </mc:Fallback>
+  </mc:AlternateContent>
+  <p:timing>
+    <p:tnLst>
+      <p:par>
+        <p:cTn xmlns:p14="http://schemas.microsoft.com/office/powerpoint/2010/main" id="1" dur="indefinite" restart="never" nodeType="tmRoot"/>
+      </p:par>
+    </p:tnLst>
+  </p:timing>
+</p:sld>
+</file>
+
 <file path=ppt/slides/slide48.xml><?xml version="1.0" encoding="utf-8"?>
 <p:sld xmlns:a="http://schemas.openxmlformats.org/drawingml/2006/main" xmlns:r="http://schemas.openxmlformats.org/officeDocument/2006/relationships" xmlns:p="http://schemas.openxmlformats.org/presentationml/2006/main">
   <p:cSld>
@@ -23853,7 +23993,7 @@
         <p:spPr>
           <a:xfrm>
             <a:off x="249243" y="1847840"/>
-            <a:ext cx="8985240" cy="1754327"/>
+            <a:ext cx="8985240" cy="2585323"/>
           </a:xfrm>
           <a:prstGeom prst="rect">
             <a:avLst/>
@@ -23888,6 +24028,24 @@
               </a:rPr>
               <a:t>equivalent </a:t>
             </a:r>
+            <a:r>
+              <a:rPr lang="en-US" sz="5400" dirty="0" err="1" smtClean="0">
+                <a:solidFill>
+                  <a:srgbClr val="000000"/>
+                </a:solidFill>
+                <a:latin typeface="Comic Sans MS" pitchFamily="66" charset="0"/>
+              </a:rPr>
+              <a:t>iff</a:t>
+            </a:r>
+            <a:r>
+              <a:rPr lang="en-US" sz="5400" dirty="0" smtClean="0">
+                <a:solidFill>
+                  <a:srgbClr val="000000"/>
+                </a:solidFill>
+                <a:latin typeface="Comic Sans MS" pitchFamily="66" charset="0"/>
+              </a:rPr>
+              <a:t> have same truth table</a:t>
+            </a:r>
             <a:endParaRPr lang="en-US" sz="5400" dirty="0">
               <a:solidFill>
                 <a:srgbClr val="000000"/>
@@ -23961,7 +24119,7 @@
     </p:spTree>
     <p:extLst>
       <p:ext uri="{BB962C8B-B14F-4D97-AF65-F5344CB8AC3E}">
-        <p14:creationId xmlns:p14="http://schemas.microsoft.com/office/powerpoint/2010/main" val="2003119538"/>
+        <p14:creationId xmlns:p14="http://schemas.microsoft.com/office/powerpoint/2010/main" val="2442323819"/>
       </p:ext>
     </p:extLst>
   </p:cSld>
@@ -24016,7 +24174,7 @@
         <p:spPr>
           <a:xfrm>
             <a:off x="249243" y="1847840"/>
-            <a:ext cx="8985240" cy="2585323"/>
+            <a:ext cx="8985240" cy="3416320"/>
           </a:xfrm>
           <a:prstGeom prst="rect">
             <a:avLst/>
@@ -24067,7 +24225,37 @@
                 </a:solidFill>
                 <a:latin typeface="Comic Sans MS" pitchFamily="66" charset="0"/>
               </a:rPr>
-              <a:t> have same truth table</a:t>
+              <a:t> have same truth table </a:t>
+            </a:r>
+            <a:r>
+              <a:rPr lang="en-US" sz="5400" dirty="0" err="1" smtClean="0">
+                <a:solidFill>
+                  <a:srgbClr val="000000"/>
+                </a:solidFill>
+                <a:latin typeface="Comic Sans MS" pitchFamily="66" charset="0"/>
+              </a:rPr>
+              <a:t>iff</a:t>
+            </a:r>
+            <a:r>
+              <a:rPr lang="en-US" sz="5400" dirty="0" smtClean="0">
+                <a:solidFill>
+                  <a:srgbClr val="000000"/>
+                </a:solidFill>
+                <a:latin typeface="Comic Sans MS" pitchFamily="66" charset="0"/>
+              </a:rPr>
+              <a:t> have same</a:t>
+            </a:r>
+          </a:p>
+          <a:p>
+            <a:pPr algn="l"/>
+            <a:r>
+              <a:rPr lang="en-US" sz="5400" dirty="0" smtClean="0">
+                <a:solidFill>
+                  <a:srgbClr val="000000"/>
+                </a:solidFill>
+                <a:latin typeface="Comic Sans MS" pitchFamily="66" charset="0"/>
+              </a:rPr>
+              <a:t>canonical DNF.</a:t>
             </a:r>
             <a:endParaRPr lang="en-US" sz="5400" dirty="0">
               <a:solidFill>
@@ -24142,20 +24330,20 @@
     </p:spTree>
     <p:extLst>
       <p:ext uri="{BB962C8B-B14F-4D97-AF65-F5344CB8AC3E}">
-        <p14:creationId xmlns:p14="http://schemas.microsoft.com/office/powerpoint/2010/main" val="2442323819"/>
+        <p14:creationId xmlns:p14="http://schemas.microsoft.com/office/powerpoint/2010/main" val="1661767375"/>
       </p:ext>
     </p:extLst>
   </p:cSld>
   <p:clrMapOvr>
     <a:masterClrMapping/>
   </p:clrMapOvr>
-  <mc:AlternateContent xmlns:mc="http://schemas.openxmlformats.org/markup-compatibility/2006">
-    <mc:Choice xmlns:p14="http://schemas.microsoft.com/office/powerpoint/2010/main" Requires="p14">
+  <mc:AlternateContent xmlns:mc="http://schemas.openxmlformats.org/markup-compatibility/2006" xmlns:p14="http://schemas.microsoft.com/office/powerpoint/2010/main">
+    <mc:Choice Requires="p14">
       <p:transition spd="med" p14:dur="700" advClick="0">
         <p:fade/>
       </p:transition>
     </mc:Choice>
-    <mc:Fallback>
+    <mc:Fallback xmlns="">
       <p:transition xmlns:p14="http://schemas.microsoft.com/office/powerpoint/2010/main" spd="med" advClick="0">
         <p:fade/>
       </p:transition>
@@ -24312,7 +24500,7 @@
           <a:graphicData uri="http://schemas.openxmlformats.org/presentationml/2006/ole">
             <mc:AlternateContent xmlns:mc="http://schemas.openxmlformats.org/markup-compatibility/2006">
               <mc:Choice xmlns:v="urn:schemas-microsoft-com:vml" Requires="v">
-                <p:oleObj spid="_x0000_s1115" name="Equation" r:id="rId4" imgW="1295400" imgH="228600" progId="Equation.DSMT4">
+                <p:oleObj spid="_x0000_s1122" name="Equation" r:id="rId4" imgW="1295400" imgH="228600" progId="Equation.DSMT4">
                   <p:embed/>
                 </p:oleObj>
               </mc:Choice>
@@ -24480,217 +24668,6 @@
         </p:nvSpPr>
         <p:spPr>
           <a:xfrm>
-            <a:off x="249243" y="1847840"/>
-            <a:ext cx="8985240" cy="3416320"/>
-          </a:xfrm>
-          <a:prstGeom prst="rect">
-            <a:avLst/>
-          </a:prstGeom>
-          <a:noFill/>
-        </p:spPr>
-        <p:txBody>
-          <a:bodyPr wrap="square" rtlCol="0">
-            <a:spAutoFit/>
-          </a:bodyPr>
-          <a:lstStyle/>
-          <a:p>
-            <a:pPr algn="l"/>
-            <a:r>
-              <a:rPr lang="en-US" sz="5400" dirty="0" smtClean="0">
-                <a:solidFill>
-                  <a:srgbClr val="000000"/>
-                </a:solidFill>
-                <a:latin typeface="Comic Sans MS" pitchFamily="66" charset="0"/>
-              </a:rPr>
-              <a:t>Because two formulas are</a:t>
-            </a:r>
-          </a:p>
-          <a:p>
-            <a:pPr algn="l"/>
-            <a:r>
-              <a:rPr lang="en-US" sz="5400" dirty="0" smtClean="0">
-                <a:solidFill>
-                  <a:srgbClr val="000000"/>
-                </a:solidFill>
-                <a:latin typeface="Comic Sans MS" pitchFamily="66" charset="0"/>
-              </a:rPr>
-              <a:t>equivalent </a:t>
-            </a:r>
-            <a:r>
-              <a:rPr lang="en-US" sz="5400" dirty="0" err="1" smtClean="0">
-                <a:solidFill>
-                  <a:srgbClr val="000000"/>
-                </a:solidFill>
-                <a:latin typeface="Comic Sans MS" pitchFamily="66" charset="0"/>
-              </a:rPr>
-              <a:t>iff</a:t>
-            </a:r>
-            <a:r>
-              <a:rPr lang="en-US" sz="5400" dirty="0" smtClean="0">
-                <a:solidFill>
-                  <a:srgbClr val="000000"/>
-                </a:solidFill>
-                <a:latin typeface="Comic Sans MS" pitchFamily="66" charset="0"/>
-              </a:rPr>
-              <a:t> have same truth table </a:t>
-            </a:r>
-            <a:r>
-              <a:rPr lang="en-US" sz="5400" dirty="0" err="1" smtClean="0">
-                <a:solidFill>
-                  <a:srgbClr val="000000"/>
-                </a:solidFill>
-                <a:latin typeface="Comic Sans MS" pitchFamily="66" charset="0"/>
-              </a:rPr>
-              <a:t>iff</a:t>
-            </a:r>
-            <a:r>
-              <a:rPr lang="en-US" sz="5400" dirty="0" smtClean="0">
-                <a:solidFill>
-                  <a:srgbClr val="000000"/>
-                </a:solidFill>
-                <a:latin typeface="Comic Sans MS" pitchFamily="66" charset="0"/>
-              </a:rPr>
-              <a:t> have same</a:t>
-            </a:r>
-          </a:p>
-          <a:p>
-            <a:pPr algn="l"/>
-            <a:r>
-              <a:rPr lang="en-US" sz="5400" dirty="0" smtClean="0">
-                <a:solidFill>
-                  <a:srgbClr val="000000"/>
-                </a:solidFill>
-                <a:latin typeface="Comic Sans MS" pitchFamily="66" charset="0"/>
-              </a:rPr>
-              <a:t>sorted Full DNF.</a:t>
-            </a:r>
-            <a:endParaRPr lang="en-US" sz="5400" dirty="0">
-              <a:solidFill>
-                <a:srgbClr val="000000"/>
-              </a:solidFill>
-              <a:latin typeface="Comic Sans MS" pitchFamily="66" charset="0"/>
-            </a:endParaRPr>
-          </a:p>
-        </p:txBody>
-      </p:sp>
-      <p:sp>
-        <p:nvSpPr>
-          <p:cNvPr id="9" name="Title 1"/>
-          <p:cNvSpPr>
-            <a:spLocks noGrp="1"/>
-          </p:cNvSpPr>
-          <p:nvPr>
-            <p:ph type="title"/>
-          </p:nvPr>
-        </p:nvSpPr>
-        <p:spPr>
-          <a:xfrm>
-            <a:off x="1651000" y="363538"/>
-            <a:ext cx="6794500" cy="1003300"/>
-          </a:xfrm>
-        </p:spPr>
-        <p:txBody>
-          <a:bodyPr/>
-          <a:lstStyle/>
-          <a:p>
-            <a:r>
-              <a:rPr lang="en-US" sz="4000" dirty="0" smtClean="0"/>
-              <a:t>Algebra for Equivalence</a:t>
-            </a:r>
-            <a:endParaRPr lang="en-US" sz="4000" dirty="0"/>
-          </a:p>
-        </p:txBody>
-      </p:sp>
-      <p:sp>
-        <p:nvSpPr>
-          <p:cNvPr id="4" name="Slide Number Placeholder 2"/>
-          <p:cNvSpPr>
-            <a:spLocks noGrp="1"/>
-          </p:cNvSpPr>
-          <p:nvPr>
-            <p:ph type="sldNum" sz="quarter" idx="10"/>
-          </p:nvPr>
-        </p:nvSpPr>
-        <p:spPr>
-          <a:xfrm>
-            <a:off x="7333815" y="6553200"/>
-            <a:ext cx="1810186" cy="276999"/>
-          </a:xfrm>
-        </p:spPr>
-        <p:txBody>
-          <a:bodyPr/>
-          <a:lstStyle/>
-          <a:p>
-            <a:r>
-              <a:rPr lang="en-US" dirty="0" smtClean="0"/>
-              <a:t>propositional algebra.</a:t>
-            </a:r>
-            <a:fld id="{3251DA95-B240-47FE-901D-B78FC8E8E532}" type="slidenum">
-              <a:rPr lang="en-US" smtClean="0"/>
-              <a:pPr/>
-              <a:t>50</a:t>
-            </a:fld>
-            <a:endParaRPr lang="en-US" dirty="0"/>
-          </a:p>
-        </p:txBody>
-      </p:sp>
-    </p:spTree>
-    <p:extLst>
-      <p:ext uri="{BB962C8B-B14F-4D97-AF65-F5344CB8AC3E}">
-        <p14:creationId xmlns:p14="http://schemas.microsoft.com/office/powerpoint/2010/main" val="1661767375"/>
-      </p:ext>
-    </p:extLst>
-  </p:cSld>
-  <p:clrMapOvr>
-    <a:masterClrMapping/>
-  </p:clrMapOvr>
-  <mc:AlternateContent xmlns:mc="http://schemas.openxmlformats.org/markup-compatibility/2006" xmlns:p14="http://schemas.microsoft.com/office/powerpoint/2010/main">
-    <mc:Choice Requires="p14">
-      <p:transition spd="med" p14:dur="700" advClick="0">
-        <p:fade/>
-      </p:transition>
-    </mc:Choice>
-    <mc:Fallback xmlns="">
-      <p:transition xmlns:p14="http://schemas.microsoft.com/office/powerpoint/2010/main" spd="med" advClick="0">
-        <p:fade/>
-      </p:transition>
-    </mc:Fallback>
-  </mc:AlternateContent>
-  <p:timing>
-    <p:tnLst>
-      <p:par>
-        <p:cTn xmlns:p14="http://schemas.microsoft.com/office/powerpoint/2010/main" id="1" dur="indefinite" restart="never" nodeType="tmRoot"/>
-      </p:par>
-    </p:tnLst>
-  </p:timing>
-</p:sld>
-</file>
-
-<file path=ppt/slides/slide51.xml><?xml version="1.0" encoding="utf-8"?>
-<p:sld xmlns:a="http://schemas.openxmlformats.org/drawingml/2006/main" xmlns:r="http://schemas.openxmlformats.org/officeDocument/2006/relationships" xmlns:p="http://schemas.openxmlformats.org/presentationml/2006/main">
-  <p:cSld>
-    <p:spTree>
-      <p:nvGrpSpPr>
-        <p:cNvPr id="1" name=""/>
-        <p:cNvGrpSpPr/>
-        <p:nvPr/>
-      </p:nvGrpSpPr>
-      <p:grpSpPr>
-        <a:xfrm>
-          <a:off x="0" y="0"/>
-          <a:ext cx="0" cy="0"/>
-          <a:chOff x="0" y="0"/>
-          <a:chExt cx="0" cy="0"/>
-        </a:xfrm>
-      </p:grpSpPr>
-      <p:sp>
-        <p:nvSpPr>
-          <p:cNvPr id="5" name="TextBox 4"/>
-          <p:cNvSpPr txBox="1"/>
-          <p:nvPr/>
-        </p:nvSpPr>
-        <p:spPr>
-          <a:xfrm>
             <a:off x="627063" y="1308100"/>
             <a:ext cx="7970837" cy="2585323"/>
           </a:xfrm>
@@ -24763,7 +24740,7 @@
             <a:fld id="{3251DA95-B240-47FE-901D-B78FC8E8E532}" type="slidenum">
               <a:rPr lang="en-US" smtClean="0"/>
               <a:pPr/>
-              <a:t>51</a:t>
+              <a:t>50</a:t>
             </a:fld>
             <a:endParaRPr lang="en-US" dirty="0"/>
           </a:p>
@@ -24899,7 +24876,7 @@
 </p:sld>
 </file>
 
-<file path=ppt/slides/slide52.xml><?xml version="1.0" encoding="utf-8"?>
+<file path=ppt/slides/slide51.xml><?xml version="1.0" encoding="utf-8"?>
 <p:sld xmlns:a="http://schemas.openxmlformats.org/drawingml/2006/main" xmlns:r="http://schemas.openxmlformats.org/officeDocument/2006/relationships" xmlns:p="http://schemas.openxmlformats.org/presentationml/2006/main">
   <p:cSld>
     <p:spTree>
@@ -24948,6 +24925,18 @@
             <a:r>
               <a:rPr lang="en-US" sz="5400" dirty="0" smtClean="0">
                 <a:solidFill>
+                  <a:srgbClr val="0000FF"/>
+                </a:solidFill>
+                <a:latin typeface="Comic Sans MS" pitchFamily="66" charset="0"/>
+              </a:rPr>
+              <a:t>canonical</a:t>
+            </a:r>
+          </a:p>
+          <a:p>
+            <a:pPr algn="l"/>
+            <a:r>
+              <a:rPr lang="en-US" sz="5400" dirty="0" smtClean="0">
+                <a:solidFill>
                   <a:schemeClr val="accent1">
                     <a:lumMod val="50000"/>
                   </a:schemeClr>
@@ -25031,7 +25020,7 @@
             <a:fld id="{3251DA95-B240-47FE-901D-B78FC8E8E532}" type="slidenum">
               <a:rPr lang="en-US" smtClean="0"/>
               <a:pPr/>
-              <a:t>52</a:t>
+              <a:t>51</a:t>
             </a:fld>
             <a:endParaRPr lang="en-US" dirty="0"/>
           </a:p>
@@ -25068,7 +25057,7 @@
     </p:spTree>
     <p:extLst>
       <p:ext uri="{BB962C8B-B14F-4D97-AF65-F5344CB8AC3E}">
-        <p14:creationId xmlns:p14="http://schemas.microsoft.com/office/powerpoint/2010/main" val="2742694273"/>
+        <p14:creationId xmlns:p14="http://schemas.microsoft.com/office/powerpoint/2010/main" val="147799225"/>
       </p:ext>
     </p:extLst>
   </p:cSld>
@@ -25097,7 +25086,7 @@
 </p:sld>
 </file>
 
-<file path=ppt/slides/slide53.xml><?xml version="1.0" encoding="utf-8"?>
+<file path=ppt/slides/slide52.xml><?xml version="1.0" encoding="utf-8"?>
 <p:sld xmlns:a="http://schemas.openxmlformats.org/drawingml/2006/main" xmlns:r="http://schemas.openxmlformats.org/officeDocument/2006/relationships" xmlns:p="http://schemas.openxmlformats.org/presentationml/2006/main">
   <p:cSld>
     <p:spTree>
@@ -25221,7 +25210,7 @@
             <a:fld id="{3251DA95-B240-47FE-901D-B78FC8E8E532}" type="slidenum">
               <a:rPr lang="en-US" smtClean="0"/>
               <a:pPr/>
-              <a:t>53</a:t>
+              <a:t>52</a:t>
             </a:fld>
             <a:endParaRPr lang="en-US" dirty="0"/>
           </a:p>
@@ -25455,7 +25444,7 @@
           <a:graphicData uri="http://schemas.openxmlformats.org/presentationml/2006/ole">
             <mc:AlternateContent xmlns:mc="http://schemas.openxmlformats.org/markup-compatibility/2006">
               <mc:Choice xmlns:v="urn:schemas-microsoft-com:vml" Requires="v">
-                <p:oleObj spid="_x0000_s422998" name="Equation" r:id="rId4" imgW="1498600" imgH="457200" progId="Equation.DSMT4">
+                <p:oleObj spid="_x0000_s423005" name="Equation" r:id="rId4" imgW="1498600" imgH="457200" progId="Equation.DSMT4">
                   <p:embed/>
                 </p:oleObj>
               </mc:Choice>
@@ -25701,7 +25690,7 @@
           <a:graphicData uri="http://schemas.openxmlformats.org/presentationml/2006/ole">
             <mc:AlternateContent xmlns:mc="http://schemas.openxmlformats.org/markup-compatibility/2006">
               <mc:Choice xmlns:v="urn:schemas-microsoft-com:vml" Requires="v">
-                <p:oleObj spid="_x0000_s421974" name="Equation" r:id="rId4" imgW="1600200" imgH="457200" progId="Equation.DSMT4">
+                <p:oleObj spid="_x0000_s421981" name="Equation" r:id="rId4" imgW="1600200" imgH="457200" progId="Equation.DSMT4">
                   <p:embed/>
                 </p:oleObj>
               </mc:Choice>
@@ -25957,7 +25946,7 @@
 </file>
 
 <file path=ppt/slides/slide8.xml><?xml version="1.0" encoding="utf-8"?>
-<p:sld xmlns:a="http://schemas.openxmlformats.org/drawingml/2006/main" xmlns:r="http://schemas.openxmlformats.org/officeDocument/2006/relationships" xmlns:p="http://schemas.openxmlformats.org/presentationml/2006/main" show="0">
+<p:sld xmlns:a="http://schemas.openxmlformats.org/drawingml/2006/main" xmlns:r="http://schemas.openxmlformats.org/officeDocument/2006/relationships" xmlns:p="http://schemas.openxmlformats.org/presentationml/2006/main">
   <p:cSld>
     <p:spTree>
       <p:nvGrpSpPr>
@@ -25996,19 +25985,7 @@
             <a:pPr algn="ctr"/>
             <a:r>
               <a:rPr lang="en-US" sz="6600" b="0" dirty="0" smtClean="0"/>
-              <a:t>converting to</a:t>
-            </a:r>
-            <a:r>
-              <a:rPr lang="en-US" sz="6600" b="0" dirty="0" smtClean="0"/>
-              <a:t> a sum </a:t>
-            </a:r>
-            <a:r>
-              <a:rPr lang="en-US" sz="6600" b="0" dirty="0" smtClean="0"/>
-              <a:t>of </a:t>
-            </a:r>
-            <a:r>
-              <a:rPr lang="en-US" sz="6600" b="0" dirty="0" smtClean="0"/>
-              <a:t>products</a:t>
+              <a:t>converting to a sum of products</a:t>
             </a:r>
             <a:endParaRPr lang="en-US" sz="6600" b="0" dirty="0"/>
           </a:p>
@@ -26056,7 +26033,7 @@
         <p:spPr>
           <a:xfrm>
             <a:off x="1890937" y="384507"/>
-            <a:ext cx="3011461" cy="923330"/>
+            <a:ext cx="2804524" cy="923330"/>
           </a:xfrm>
           <a:prstGeom prst="rect">
             <a:avLst/>
@@ -26077,7 +26054,7 @@
                 </a:solidFill>
                 <a:latin typeface="Comic Sans MS" pitchFamily="66" charset="0"/>
               </a:rPr>
-              <a:t>example:</a:t>
+              <a:t>example</a:t>
             </a:r>
           </a:p>
         </p:txBody>
@@ -26219,7 +26196,7 @@
           <a:graphicData uri="http://schemas.openxmlformats.org/presentationml/2006/ole">
             <mc:AlternateContent xmlns:mc="http://schemas.openxmlformats.org/markup-compatibility/2006">
               <mc:Choice xmlns:v="urn:schemas-microsoft-com:vml" Requires="v">
-                <p:oleObj spid="_x0000_s435275" name="Equation" r:id="rId4" imgW="2108200" imgH="228600" progId="Equation.DSMT4">
+                <p:oleObj spid="_x0000_s435282" name="Equation" r:id="rId4" imgW="2108200" imgH="228600" progId="Equation.DSMT4">
                   <p:embed/>
                 </p:oleObj>
               </mc:Choice>
@@ -26286,12 +26263,6 @@
               </a:rPr>
               <a:t>example</a:t>
             </a:r>
-            <a:endParaRPr lang="en-US" sz="5400" dirty="0" smtClean="0">
-              <a:solidFill>
-                <a:srgbClr val="C40025"/>
-              </a:solidFill>
-              <a:latin typeface="Comic Sans MS" pitchFamily="66" charset="0"/>
-            </a:endParaRPr>
           </a:p>
         </p:txBody>
       </p:sp>

</xml_diff>

<commit_message>
comment typo FP_jections_nofunc; add True/false to prpostn_algebra.pptx
</commit_message>
<xml_diff>
--- a/spring18/slidesS18/prpostn_algebra.pptx
+++ b/spring18/slidesS18/prpostn_algebra.pptx
@@ -6,10 +6,10 @@
     <p:sldMasterId id="2147483651" r:id="rId2"/>
   </p:sldMasterIdLst>
   <p:notesMasterIdLst>
-    <p:notesMasterId r:id="rId55"/>
+    <p:notesMasterId r:id="rId56"/>
   </p:notesMasterIdLst>
   <p:handoutMasterIdLst>
-    <p:handoutMasterId r:id="rId56"/>
+    <p:handoutMasterId r:id="rId57"/>
   </p:handoutMasterIdLst>
   <p:sldIdLst>
     <p:sldId id="392" r:id="rId3"/>
@@ -40,35 +40,36 @@
     <p:sldId id="520" r:id="rId28"/>
     <p:sldId id="542" r:id="rId29"/>
     <p:sldId id="561" r:id="rId30"/>
-    <p:sldId id="499" r:id="rId31"/>
-    <p:sldId id="543" r:id="rId32"/>
-    <p:sldId id="556" r:id="rId33"/>
-    <p:sldId id="522" r:id="rId34"/>
-    <p:sldId id="525" r:id="rId35"/>
-    <p:sldId id="547" r:id="rId36"/>
-    <p:sldId id="548" r:id="rId37"/>
-    <p:sldId id="550" r:id="rId38"/>
-    <p:sldId id="535" r:id="rId39"/>
-    <p:sldId id="551" r:id="rId40"/>
-    <p:sldId id="558" r:id="rId41"/>
-    <p:sldId id="560" r:id="rId42"/>
-    <p:sldId id="553" r:id="rId43"/>
-    <p:sldId id="568" r:id="rId44"/>
-    <p:sldId id="566" r:id="rId45"/>
-    <p:sldId id="572" r:id="rId46"/>
-    <p:sldId id="573" r:id="rId47"/>
-    <p:sldId id="531" r:id="rId48"/>
-    <p:sldId id="536" r:id="rId49"/>
-    <p:sldId id="537" r:id="rId50"/>
-    <p:sldId id="538" r:id="rId51"/>
-    <p:sldId id="503" r:id="rId52"/>
-    <p:sldId id="575" r:id="rId53"/>
-    <p:sldId id="504" r:id="rId54"/>
+    <p:sldId id="577" r:id="rId31"/>
+    <p:sldId id="499" r:id="rId32"/>
+    <p:sldId id="543" r:id="rId33"/>
+    <p:sldId id="556" r:id="rId34"/>
+    <p:sldId id="522" r:id="rId35"/>
+    <p:sldId id="525" r:id="rId36"/>
+    <p:sldId id="547" r:id="rId37"/>
+    <p:sldId id="548" r:id="rId38"/>
+    <p:sldId id="550" r:id="rId39"/>
+    <p:sldId id="535" r:id="rId40"/>
+    <p:sldId id="551" r:id="rId41"/>
+    <p:sldId id="558" r:id="rId42"/>
+    <p:sldId id="560" r:id="rId43"/>
+    <p:sldId id="553" r:id="rId44"/>
+    <p:sldId id="568" r:id="rId45"/>
+    <p:sldId id="566" r:id="rId46"/>
+    <p:sldId id="572" r:id="rId47"/>
+    <p:sldId id="573" r:id="rId48"/>
+    <p:sldId id="531" r:id="rId49"/>
+    <p:sldId id="536" r:id="rId50"/>
+    <p:sldId id="537" r:id="rId51"/>
+    <p:sldId id="538" r:id="rId52"/>
+    <p:sldId id="503" r:id="rId53"/>
+    <p:sldId id="575" r:id="rId54"/>
+    <p:sldId id="504" r:id="rId55"/>
   </p:sldIdLst>
   <p:sldSz cx="9144000" cy="6858000" type="screen4x3"/>
   <p:notesSz cx="9601200" cy="7315200"/>
   <p:custDataLst>
-    <p:tags r:id="rId58"/>
+    <p:tags r:id="rId59"/>
   </p:custDataLst>
   <p:defaultTextStyle>
     <a:defPPr>
@@ -197,7 +198,7 @@
   </p:defaultTextStyle>
   <p:extLst>
     <p:ext uri="{EFAFB233-063F-42B5-8137-9DF3F51BA10A}">
-      <p15:sldGuideLst xmlns="" xmlns:p15="http://schemas.microsoft.com/office/powerpoint/2012/main">
+      <p15:sldGuideLst xmlns:p15="http://schemas.microsoft.com/office/powerpoint/2012/main" xmlns="">
         <p15:guide id="1" orient="horz" pos="2160">
           <p15:clr>
             <a:srgbClr val="A4A3A4"/>
@@ -211,7 +212,7 @@
       </p15:sldGuideLst>
     </p:ext>
     <p:ext uri="{2D200454-40CA-4A62-9FC3-DE9A4176ACB9}">
-      <p15:notesGuideLst xmlns="" xmlns:p15="http://schemas.microsoft.com/office/powerpoint/2012/main">
+      <p15:notesGuideLst xmlns:p15="http://schemas.microsoft.com/office/powerpoint/2012/main" xmlns="">
         <p15:guide id="1" orient="horz" pos="2304">
           <p15:clr>
             <a:srgbClr val="A4A3A4"/>
@@ -4665,6 +4666,88 @@
               <a:rPr lang="en-US" smtClean="0"/>
               <a:pPr/>
               <a:t>52</a:t>
+            </a:fld>
+            <a:endParaRPr lang="en-US"/>
+          </a:p>
+        </p:txBody>
+      </p:sp>
+    </p:spTree>
+  </p:cSld>
+  <p:clrMapOvr>
+    <a:masterClrMapping/>
+  </p:clrMapOvr>
+</p:notes>
+</file>
+
+<file path=ppt/notesSlides/notesSlide51.xml><?xml version="1.0" encoding="utf-8"?>
+<p:notes xmlns:a="http://schemas.openxmlformats.org/drawingml/2006/main" xmlns:r="http://schemas.openxmlformats.org/officeDocument/2006/relationships" xmlns:p="http://schemas.openxmlformats.org/presentationml/2006/main">
+  <p:cSld>
+    <p:spTree>
+      <p:nvGrpSpPr>
+        <p:cNvPr id="1" name=""/>
+        <p:cNvGrpSpPr/>
+        <p:nvPr/>
+      </p:nvGrpSpPr>
+      <p:grpSpPr>
+        <a:xfrm>
+          <a:off x="0" y="0"/>
+          <a:ext cx="0" cy="0"/>
+          <a:chOff x="0" y="0"/>
+          <a:chExt cx="0" cy="0"/>
+        </a:xfrm>
+      </p:grpSpPr>
+      <p:sp>
+        <p:nvSpPr>
+          <p:cNvPr id="2" name="Slide Image Placeholder 1"/>
+          <p:cNvSpPr>
+            <a:spLocks noGrp="1" noRot="1" noChangeAspect="1"/>
+          </p:cNvSpPr>
+          <p:nvPr>
+            <p:ph type="sldImg"/>
+          </p:nvPr>
+        </p:nvSpPr>
+        <p:spPr/>
+      </p:sp>
+      <p:sp>
+        <p:nvSpPr>
+          <p:cNvPr id="3" name="Notes Placeholder 2"/>
+          <p:cNvSpPr>
+            <a:spLocks noGrp="1"/>
+          </p:cNvSpPr>
+          <p:nvPr>
+            <p:ph type="body" idx="1"/>
+          </p:nvPr>
+        </p:nvSpPr>
+        <p:spPr/>
+        <p:txBody>
+          <a:bodyPr>
+            <a:normAutofit/>
+          </a:bodyPr>
+          <a:lstStyle/>
+          <a:p>
+            <a:endParaRPr lang="en-US"/>
+          </a:p>
+        </p:txBody>
+      </p:sp>
+      <p:sp>
+        <p:nvSpPr>
+          <p:cNvPr id="4" name="Slide Number Placeholder 3"/>
+          <p:cNvSpPr>
+            <a:spLocks noGrp="1"/>
+          </p:cNvSpPr>
+          <p:nvPr>
+            <p:ph type="sldNum" sz="quarter" idx="10"/>
+          </p:nvPr>
+        </p:nvSpPr>
+        <p:spPr/>
+        <p:txBody>
+          <a:bodyPr/>
+          <a:lstStyle/>
+          <a:p>
+            <a:fld id="{A02B9F3F-3042-489F-AF35-1A733968F079}" type="slidenum">
+              <a:rPr lang="en-US" smtClean="0"/>
+              <a:pPr/>
+              <a:t>53</a:t>
             </a:fld>
             <a:endParaRPr lang="en-US"/>
           </a:p>
@@ -9185,7 +9268,7 @@
           <a:graphicData uri="http://schemas.openxmlformats.org/presentationml/2006/ole">
             <mc:AlternateContent xmlns:mc="http://schemas.openxmlformats.org/markup-compatibility/2006">
               <mc:Choice xmlns:v="urn:schemas-microsoft-com:vml" Requires="v">
-                <p:oleObj spid="_x0000_s435297" name="Equation" r:id="rId4" imgW="2108200" imgH="228600" progId="Equation.DSMT4">
+                <p:oleObj spid="_x0000_s435301" name="Equation" r:id="rId4" imgW="2108200" imgH="228600" progId="Equation.DSMT4">
                   <p:embed/>
                 </p:oleObj>
               </mc:Choice>
@@ -9558,7 +9641,7 @@
           <a:graphicData uri="http://schemas.openxmlformats.org/presentationml/2006/ole">
             <mc:AlternateContent xmlns:mc="http://schemas.openxmlformats.org/markup-compatibility/2006">
               <mc:Choice xmlns:v="urn:schemas-microsoft-com:vml" Requires="v">
-                <p:oleObj spid="_x0000_s439394" name="Equation" r:id="rId4" imgW="2146300" imgH="228600" progId="Equation.DSMT4">
+                <p:oleObj spid="_x0000_s439398" name="Equation" r:id="rId4" imgW="2146300" imgH="228600" progId="Equation.DSMT4">
                   <p:embed/>
                 </p:oleObj>
               </mc:Choice>
@@ -9874,7 +9957,7 @@
           <a:graphicData uri="http://schemas.openxmlformats.org/presentationml/2006/ole">
             <mc:AlternateContent xmlns:mc="http://schemas.openxmlformats.org/markup-compatibility/2006">
               <mc:Choice xmlns:v="urn:schemas-microsoft-com:vml" Requires="v">
-                <p:oleObj spid="_x0000_s434352" name="Equation" r:id="rId4" imgW="2146300" imgH="228600" progId="Equation.DSMT4">
+                <p:oleObj spid="_x0000_s434359" name="Equation" r:id="rId4" imgW="2146300" imgH="228600" progId="Equation.DSMT4">
                   <p:embed/>
                 </p:oleObj>
               </mc:Choice>
@@ -9931,7 +10014,7 @@
           <a:graphicData uri="http://schemas.openxmlformats.org/presentationml/2006/ole">
             <mc:AlternateContent xmlns:mc="http://schemas.openxmlformats.org/markup-compatibility/2006">
               <mc:Choice xmlns:v="urn:schemas-microsoft-com:vml" Requires="v">
-                <p:oleObj spid="_x0000_s434353" name="Equation" r:id="rId6" imgW="2514600" imgH="228600" progId="Equation.DSMT4">
+                <p:oleObj spid="_x0000_s434360" name="Equation" r:id="rId6" imgW="2514600" imgH="228600" progId="Equation.DSMT4">
                   <p:embed/>
                 </p:oleObj>
               </mc:Choice>
@@ -10112,7 +10195,7 @@
           <a:graphicData uri="http://schemas.openxmlformats.org/presentationml/2006/ole">
             <mc:AlternateContent xmlns:mc="http://schemas.openxmlformats.org/markup-compatibility/2006">
               <mc:Choice xmlns:v="urn:schemas-microsoft-com:vml" Requires="v">
-                <p:oleObj spid="_x0000_s436350" name="Equation" r:id="rId4" imgW="2514600" imgH="228600" progId="Equation.DSMT4">
+                <p:oleObj spid="_x0000_s436354" name="Equation" r:id="rId4" imgW="2514600" imgH="228600" progId="Equation.DSMT4">
                   <p:embed/>
                 </p:oleObj>
               </mc:Choice>
@@ -10347,7 +10430,7 @@
           <a:graphicData uri="http://schemas.openxmlformats.org/presentationml/2006/ole">
             <mc:AlternateContent xmlns:mc="http://schemas.openxmlformats.org/markup-compatibility/2006">
               <mc:Choice xmlns:v="urn:schemas-microsoft-com:vml" Requires="v">
-                <p:oleObj spid="_x0000_s437445" name="Equation" r:id="rId4" imgW="2514600" imgH="228600" progId="Equation.DSMT4">
+                <p:oleObj spid="_x0000_s437452" name="Equation" r:id="rId4" imgW="2514600" imgH="228600" progId="Equation.DSMT4">
                   <p:embed/>
                 </p:oleObj>
               </mc:Choice>
@@ -10404,7 +10487,7 @@
           <a:graphicData uri="http://schemas.openxmlformats.org/presentationml/2006/ole">
             <mc:AlternateContent xmlns:mc="http://schemas.openxmlformats.org/markup-compatibility/2006">
               <mc:Choice xmlns:v="urn:schemas-microsoft-com:vml" Requires="v">
-                <p:oleObj spid="_x0000_s437446" name="Equation" r:id="rId6" imgW="1866900" imgH="228600" progId="Equation.DSMT4">
+                <p:oleObj spid="_x0000_s437453" name="Equation" r:id="rId6" imgW="1866900" imgH="228600" progId="Equation.DSMT4">
                   <p:embed/>
                 </p:oleObj>
               </mc:Choice>
@@ -10585,7 +10668,7 @@
           <a:graphicData uri="http://schemas.openxmlformats.org/presentationml/2006/ole">
             <mc:AlternateContent xmlns:mc="http://schemas.openxmlformats.org/markup-compatibility/2006">
               <mc:Choice xmlns:v="urn:schemas-microsoft-com:vml" Requires="v">
-                <p:oleObj spid="_x0000_s479346" name="Equation" r:id="rId4" imgW="1866900" imgH="228600" progId="Equation.DSMT4">
+                <p:oleObj spid="_x0000_s479350" name="Equation" r:id="rId4" imgW="1866900" imgH="228600" progId="Equation.DSMT4">
                   <p:embed/>
                 </p:oleObj>
               </mc:Choice>
@@ -10822,7 +10905,7 @@
           <a:graphicData uri="http://schemas.openxmlformats.org/presentationml/2006/ole">
             <mc:AlternateContent xmlns:mc="http://schemas.openxmlformats.org/markup-compatibility/2006">
               <mc:Choice xmlns:v="urn:schemas-microsoft-com:vml" Requires="v">
-                <p:oleObj spid="_x0000_s440545" name="Equation" r:id="rId4" imgW="1866900" imgH="228600" progId="Equation.DSMT4">
+                <p:oleObj spid="_x0000_s440552" name="Equation" r:id="rId4" imgW="1866900" imgH="228600" progId="Equation.DSMT4">
                   <p:embed/>
                 </p:oleObj>
               </mc:Choice>
@@ -10879,7 +10962,7 @@
           <a:graphicData uri="http://schemas.openxmlformats.org/presentationml/2006/ole">
             <mc:AlternateContent xmlns:mc="http://schemas.openxmlformats.org/markup-compatibility/2006">
               <mc:Choice xmlns:v="urn:schemas-microsoft-com:vml" Requires="v">
-                <p:oleObj spid="_x0000_s440546" name="Equation" r:id="rId6" imgW="1689100" imgH="254000" progId="Equation.DSMT4">
+                <p:oleObj spid="_x0000_s440553" name="Equation" r:id="rId6" imgW="1689100" imgH="254000" progId="Equation.DSMT4">
                   <p:embed/>
                 </p:oleObj>
               </mc:Choice>
@@ -11139,7 +11222,7 @@
           <a:graphicData uri="http://schemas.openxmlformats.org/presentationml/2006/ole">
             <mc:AlternateContent xmlns:mc="http://schemas.openxmlformats.org/markup-compatibility/2006">
               <mc:Choice xmlns:v="urn:schemas-microsoft-com:vml" Requires="v">
-                <p:oleObj spid="_x0000_s573487" name="Equation" r:id="rId4" imgW="1511300" imgH="254000" progId="Equation.DSMT4">
+                <p:oleObj spid="_x0000_s573491" name="Equation" r:id="rId4" imgW="1511300" imgH="254000" progId="Equation.DSMT4">
                   <p:embed/>
                 </p:oleObj>
               </mc:Choice>
@@ -11467,7 +11550,7 @@
           <a:graphicData uri="http://schemas.openxmlformats.org/presentationml/2006/ole">
             <mc:AlternateContent xmlns:mc="http://schemas.openxmlformats.org/markup-compatibility/2006">
               <mc:Choice xmlns:v="urn:schemas-microsoft-com:vml" Requires="v">
-                <p:oleObj spid="_x0000_s571436" name="Equation" r:id="rId4" imgW="1866900" imgH="457200" progId="Equation.DSMT4">
+                <p:oleObj spid="_x0000_s571440" name="Equation" r:id="rId4" imgW="1866900" imgH="457200" progId="Equation.DSMT4">
                   <p:embed/>
                 </p:oleObj>
               </mc:Choice>
@@ -11751,7 +11834,7 @@
           <a:graphicData uri="http://schemas.openxmlformats.org/presentationml/2006/ole">
             <mc:AlternateContent xmlns:mc="http://schemas.openxmlformats.org/markup-compatibility/2006">
               <mc:Choice xmlns:v="urn:schemas-microsoft-com:vml" Requires="v">
-                <p:oleObj spid="_x0000_s572460" name="Equation" r:id="rId4" imgW="1790700" imgH="457200" progId="Equation.DSMT4">
+                <p:oleObj spid="_x0000_s572464" name="Equation" r:id="rId4" imgW="1790700" imgH="457200" progId="Equation.DSMT4">
                   <p:embed/>
                 </p:oleObj>
               </mc:Choice>
@@ -12482,7 +12565,7 @@
           <a:graphicData uri="http://schemas.openxmlformats.org/presentationml/2006/ole">
             <mc:AlternateContent xmlns:mc="http://schemas.openxmlformats.org/markup-compatibility/2006">
               <mc:Choice xmlns:v="urn:schemas-microsoft-com:vml" Requires="v">
-                <p:oleObj spid="_x0000_s433331" name="Equation" r:id="rId4" imgW="1511300" imgH="254000" progId="Equation.DSMT4">
+                <p:oleObj spid="_x0000_s433335" name="Equation" r:id="rId4" imgW="1511300" imgH="254000" progId="Equation.DSMT4">
                   <p:embed/>
                 </p:oleObj>
               </mc:Choice>
@@ -12702,7 +12785,7 @@
           <a:graphicData uri="http://schemas.openxmlformats.org/presentationml/2006/ole">
             <mc:AlternateContent xmlns:mc="http://schemas.openxmlformats.org/markup-compatibility/2006">
               <mc:Choice xmlns:v="urn:schemas-microsoft-com:vml" Requires="v">
-                <p:oleObj spid="_x0000_s441592" name="Equation" r:id="rId4" imgW="1371600" imgH="482600" progId="Equation.DSMT4">
+                <p:oleObj spid="_x0000_s441599" name="Equation" r:id="rId4" imgW="1371600" imgH="482600" progId="Equation.DSMT4">
                   <p:embed/>
                 </p:oleObj>
               </mc:Choice>
@@ -12820,7 +12903,7 @@
           <a:graphicData uri="http://schemas.openxmlformats.org/presentationml/2006/ole">
             <mc:AlternateContent xmlns:mc="http://schemas.openxmlformats.org/markup-compatibility/2006">
               <mc:Choice xmlns:v="urn:schemas-microsoft-com:vml" Requires="v">
-                <p:oleObj spid="_x0000_s441593" name="Equation" r:id="rId6" imgW="1511300" imgH="254000" progId="Equation.DSMT4">
+                <p:oleObj spid="_x0000_s441600" name="Equation" r:id="rId6" imgW="1511300" imgH="254000" progId="Equation.DSMT4">
                   <p:embed/>
                 </p:oleObj>
               </mc:Choice>
@@ -12926,7 +13009,7 @@
           <a:graphicData uri="http://schemas.openxmlformats.org/presentationml/2006/ole">
             <mc:AlternateContent xmlns:mc="http://schemas.openxmlformats.org/markup-compatibility/2006">
               <mc:Choice xmlns:v="urn:schemas-microsoft-com:vml" Requires="v">
-                <p:oleObj spid="_x0000_s603178" name="Equation" r:id="rId4" imgW="1371600" imgH="482600" progId="Equation.DSMT4">
+                <p:oleObj spid="_x0000_s603182" name="Equation" r:id="rId4" imgW="1371600" imgH="482600" progId="Equation.DSMT4">
                   <p:embed/>
                 </p:oleObj>
               </mc:Choice>
@@ -13156,7 +13239,7 @@
           <a:graphicData uri="http://schemas.openxmlformats.org/presentationml/2006/ole">
             <mc:AlternateContent xmlns:mc="http://schemas.openxmlformats.org/markup-compatibility/2006">
               <mc:Choice xmlns:v="urn:schemas-microsoft-com:vml" Requires="v">
-                <p:oleObj spid="_x0000_s444575" name="Equation" r:id="rId4" imgW="1371600" imgH="482600" progId="Equation.DSMT4">
+                <p:oleObj spid="_x0000_s444582" name="Equation" r:id="rId4" imgW="1371600" imgH="482600" progId="Equation.DSMT4">
                   <p:embed/>
                 </p:oleObj>
               </mc:Choice>
@@ -13326,7 +13409,7 @@
             <a:graphicData uri="http://schemas.openxmlformats.org/presentationml/2006/ole">
               <mc:AlternateContent xmlns:mc="http://schemas.openxmlformats.org/markup-compatibility/2006">
                 <mc:Choice xmlns:v="urn:schemas-microsoft-com:vml" Requires="v">
-                  <p:oleObj spid="_x0000_s444576" name="Equation" r:id="rId6" imgW="139700" imgH="215900" progId="Equation.DSMT4">
+                  <p:oleObj spid="_x0000_s444583" name="Equation" r:id="rId6" imgW="139700" imgH="215900" progId="Equation.DSMT4">
                     <p:embed/>
                   </p:oleObj>
                 </mc:Choice>
@@ -13433,7 +13516,7 @@
           <a:graphicData uri="http://schemas.openxmlformats.org/presentationml/2006/ole">
             <mc:AlternateContent xmlns:mc="http://schemas.openxmlformats.org/markup-compatibility/2006">
               <mc:Choice xmlns:v="urn:schemas-microsoft-com:vml" Requires="v">
-                <p:oleObj spid="_x0000_s442535" name="Equation" r:id="rId4" imgW="1803400" imgH="482600" progId="Equation.DSMT4">
+                <p:oleObj spid="_x0000_s442542" name="Equation" r:id="rId4" imgW="1803400" imgH="482600" progId="Equation.DSMT4">
                   <p:embed/>
                 </p:oleObj>
               </mc:Choice>
@@ -13551,7 +13634,7 @@
           <a:graphicData uri="http://schemas.openxmlformats.org/presentationml/2006/ole">
             <mc:AlternateContent xmlns:mc="http://schemas.openxmlformats.org/markup-compatibility/2006">
               <mc:Choice xmlns:v="urn:schemas-microsoft-com:vml" Requires="v">
-                <p:oleObj spid="_x0000_s442536" name="Equation" r:id="rId6" imgW="1371600" imgH="482600" progId="Equation.DSMT4">
+                <p:oleObj spid="_x0000_s442543" name="Equation" r:id="rId6" imgW="1371600" imgH="482600" progId="Equation.DSMT4">
                   <p:embed/>
                 </p:oleObj>
               </mc:Choice>
@@ -13657,7 +13740,7 @@
           <a:graphicData uri="http://schemas.openxmlformats.org/presentationml/2006/ole">
             <mc:AlternateContent xmlns:mc="http://schemas.openxmlformats.org/markup-compatibility/2006">
               <mc:Choice xmlns:v="urn:schemas-microsoft-com:vml" Requires="v">
-                <p:oleObj spid="_x0000_s446647" name="Equation" r:id="rId4" imgW="1803400" imgH="482600" progId="Equation.DSMT4">
+                <p:oleObj spid="_x0000_s446654" name="Equation" r:id="rId4" imgW="1803400" imgH="482600" progId="Equation.DSMT4">
                   <p:embed/>
                 </p:oleObj>
               </mc:Choice>
@@ -13827,7 +13910,7 @@
             <a:graphicData uri="http://schemas.openxmlformats.org/presentationml/2006/ole">
               <mc:AlternateContent xmlns:mc="http://schemas.openxmlformats.org/markup-compatibility/2006">
                 <mc:Choice xmlns:v="urn:schemas-microsoft-com:vml" Requires="v">
-                  <p:oleObj spid="_x0000_s446648" name="Equation" r:id="rId6" imgW="177800" imgH="241300" progId="Equation.DSMT4">
+                  <p:oleObj spid="_x0000_s446655" name="Equation" r:id="rId6" imgW="177800" imgH="241300" progId="Equation.DSMT4">
                     <p:embed/>
                   </p:oleObj>
                 </mc:Choice>
@@ -13925,7 +14008,7 @@
           <a:graphicData uri="http://schemas.openxmlformats.org/presentationml/2006/ole">
             <mc:AlternateContent xmlns:mc="http://schemas.openxmlformats.org/markup-compatibility/2006">
               <mc:Choice xmlns:v="urn:schemas-microsoft-com:vml" Requires="v">
-                <p:oleObj spid="_x0000_s445631" name="Equation" r:id="rId4" imgW="1854200" imgH="482600" progId="Equation.DSMT4">
+                <p:oleObj spid="_x0000_s445638" name="Equation" r:id="rId4" imgW="1854200" imgH="482600" progId="Equation.DSMT4">
                   <p:embed/>
                 </p:oleObj>
               </mc:Choice>
@@ -13982,7 +14065,7 @@
           <a:graphicData uri="http://schemas.openxmlformats.org/presentationml/2006/ole">
             <mc:AlternateContent xmlns:mc="http://schemas.openxmlformats.org/markup-compatibility/2006">
               <mc:Choice xmlns:v="urn:schemas-microsoft-com:vml" Requires="v">
-                <p:oleObj spid="_x0000_s445632" name="Equation" r:id="rId6" imgW="1803400" imgH="482600" progId="Equation.DSMT4">
+                <p:oleObj spid="_x0000_s445639" name="Equation" r:id="rId6" imgW="1803400" imgH="482600" progId="Equation.DSMT4">
                   <p:embed/>
                 </p:oleObj>
               </mc:Choice>
@@ -14140,7 +14223,7 @@
           <a:graphicData uri="http://schemas.openxmlformats.org/presentationml/2006/ole">
             <mc:AlternateContent xmlns:mc="http://schemas.openxmlformats.org/markup-compatibility/2006">
               <mc:Choice xmlns:v="urn:schemas-microsoft-com:vml" Requires="v">
-                <p:oleObj spid="_x0000_s480370" name="Equation" r:id="rId4" imgW="1854200" imgH="482600" progId="Equation.DSMT4">
+                <p:oleObj spid="_x0000_s480374" name="Equation" r:id="rId4" imgW="1854200" imgH="482600" progId="Equation.DSMT4">
                   <p:embed/>
                 </p:oleObj>
               </mc:Choice>
@@ -14664,25 +14747,25 @@
           <p:nvPr>
             <p:extLst>
               <p:ext uri="{D42A27DB-BD31-4B8C-83A1-F6EECF244321}">
-                <p14:modId xmlns:p14="http://schemas.microsoft.com/office/powerpoint/2010/main" val="3987421582"/>
+                <p14:modId xmlns:p14="http://schemas.microsoft.com/office/powerpoint/2010/main" val="4193638568"/>
               </p:ext>
             </p:extLst>
           </p:nvPr>
         </p:nvGraphicFramePr>
         <p:xfrm>
-          <a:off x="1598613" y="2527579"/>
-          <a:ext cx="5981700" cy="1157288"/>
+          <a:off x="1336675" y="3457831"/>
+          <a:ext cx="5402263" cy="1093788"/>
         </p:xfrm>
         <a:graphic>
           <a:graphicData uri="http://schemas.openxmlformats.org/presentationml/2006/ole">
             <mc:AlternateContent xmlns:mc="http://schemas.openxmlformats.org/markup-compatibility/2006">
               <mc:Choice xmlns:v="urn:schemas-microsoft-com:vml" Requires="v">
-                <p:oleObj spid="_x0000_s554139" name="Equation" r:id="rId4" imgW="1181100" imgH="228600" progId="Equation.DSMT4">
+                <p:oleObj spid="_x0000_s554152" name="Equation" r:id="rId4" imgW="1066800" imgH="215900" progId="Equation.DSMT4">
                   <p:embed/>
                 </p:oleObj>
               </mc:Choice>
               <mc:Fallback>
-                <p:oleObj name="Equation" r:id="rId4" imgW="1181100" imgH="228600" progId="Equation.DSMT4">
+                <p:oleObj name="Equation" r:id="rId4" imgW="1066800" imgH="215900" progId="Equation.DSMT4">
                   <p:embed/>
                   <p:pic>
                     <p:nvPicPr>
@@ -14698,8 +14781,8 @@
                     </p:blipFill>
                     <p:spPr>
                       <a:xfrm>
-                        <a:off x="1598613" y="2527579"/>
-                        <a:ext cx="5981700" cy="1157288"/>
+                        <a:off x="1336675" y="3457831"/>
+                        <a:ext cx="5402263" cy="1093788"/>
                       </a:xfrm>
                       <a:prstGeom prst="rect">
                         <a:avLst/>
@@ -14721,25 +14804,25 @@
           <p:nvPr>
             <p:extLst>
               <p:ext uri="{D42A27DB-BD31-4B8C-83A1-F6EECF244321}">
-                <p14:modId xmlns:p14="http://schemas.microsoft.com/office/powerpoint/2010/main" val="3326256711"/>
+                <p14:modId xmlns:p14="http://schemas.microsoft.com/office/powerpoint/2010/main" val="1955692992"/>
               </p:ext>
             </p:extLst>
           </p:nvPr>
         </p:nvGraphicFramePr>
         <p:xfrm>
-          <a:off x="1618457" y="1511579"/>
-          <a:ext cx="5916612" cy="1157288"/>
+          <a:off x="1330325" y="1543050"/>
+          <a:ext cx="5337175" cy="1093788"/>
         </p:xfrm>
         <a:graphic>
           <a:graphicData uri="http://schemas.openxmlformats.org/presentationml/2006/ole">
             <mc:AlternateContent xmlns:mc="http://schemas.openxmlformats.org/markup-compatibility/2006">
               <mc:Choice xmlns:v="urn:schemas-microsoft-com:vml" Requires="v">
-                <p:oleObj spid="_x0000_s554140" name="Equation" r:id="rId6" imgW="1168400" imgH="228600" progId="Equation.DSMT4">
+                <p:oleObj spid="_x0000_s554153" name="Equation" r:id="rId6" imgW="1054100" imgH="215900" progId="Equation.DSMT4">
                   <p:embed/>
                 </p:oleObj>
               </mc:Choice>
               <mc:Fallback>
-                <p:oleObj name="Equation" r:id="rId6" imgW="1168400" imgH="228600" progId="Equation.DSMT4">
+                <p:oleObj name="Equation" r:id="rId6" imgW="1054100" imgH="215900" progId="Equation.DSMT4">
                   <p:embed/>
                   <p:pic>
                     <p:nvPicPr>
@@ -14755,8 +14838,8 @@
                     </p:blipFill>
                     <p:spPr>
                       <a:xfrm>
-                        <a:off x="1618457" y="1511579"/>
-                        <a:ext cx="5916612" cy="1157288"/>
+                        <a:off x="1330325" y="1543050"/>
+                        <a:ext cx="5337175" cy="1093788"/>
                       </a:xfrm>
                       <a:prstGeom prst="rect">
                         <a:avLst/>
@@ -14778,25 +14861,25 @@
           <p:nvPr>
             <p:extLst>
               <p:ext uri="{D42A27DB-BD31-4B8C-83A1-F6EECF244321}">
-                <p14:modId xmlns:p14="http://schemas.microsoft.com/office/powerpoint/2010/main" val="817186724"/>
+                <p14:modId xmlns:p14="http://schemas.microsoft.com/office/powerpoint/2010/main" val="2507628218"/>
               </p:ext>
             </p:extLst>
           </p:nvPr>
         </p:nvGraphicFramePr>
         <p:xfrm>
-          <a:off x="677722" y="3536645"/>
-          <a:ext cx="7653337" cy="1285875"/>
+          <a:off x="1146175" y="4395660"/>
+          <a:ext cx="6688138" cy="1285875"/>
         </p:xfrm>
         <a:graphic>
           <a:graphicData uri="http://schemas.openxmlformats.org/presentationml/2006/ole">
             <mc:AlternateContent xmlns:mc="http://schemas.openxmlformats.org/markup-compatibility/2006">
               <mc:Choice xmlns:v="urn:schemas-microsoft-com:vml" Requires="v">
-                <p:oleObj spid="_x0000_s554141" name="Equation" r:id="rId8" imgW="1511300" imgH="254000" progId="Equation.DSMT4">
+                <p:oleObj spid="_x0000_s554154" name="Equation" r:id="rId8" imgW="1320800" imgH="254000" progId="Equation.DSMT4">
                   <p:embed/>
                 </p:oleObj>
               </mc:Choice>
               <mc:Fallback>
-                <p:oleObj name="Equation" r:id="rId8" imgW="1511300" imgH="254000" progId="Equation.DSMT4">
+                <p:oleObj name="Equation" r:id="rId8" imgW="1320800" imgH="254000" progId="Equation.DSMT4">
                   <p:embed/>
                   <p:pic>
                     <p:nvPicPr>
@@ -14812,8 +14895,8 @@
                     </p:blipFill>
                     <p:spPr>
                       <a:xfrm>
-                        <a:off x="677722" y="3536645"/>
-                        <a:ext cx="7653337" cy="1285875"/>
+                        <a:off x="1146175" y="4395660"/>
+                        <a:ext cx="6688138" cy="1285875"/>
                       </a:xfrm>
                       <a:prstGeom prst="rect">
                         <a:avLst/>
@@ -14835,25 +14918,25 @@
           <p:nvPr>
             <p:extLst>
               <p:ext uri="{D42A27DB-BD31-4B8C-83A1-F6EECF244321}">
-                <p14:modId xmlns:p14="http://schemas.microsoft.com/office/powerpoint/2010/main" val="2002478265"/>
+                <p14:modId xmlns:p14="http://schemas.microsoft.com/office/powerpoint/2010/main" val="3159095767"/>
               </p:ext>
             </p:extLst>
           </p:nvPr>
         </p:nvGraphicFramePr>
         <p:xfrm>
-          <a:off x="555484" y="4751082"/>
-          <a:ext cx="7718425" cy="1285875"/>
+          <a:off x="1333500" y="2327275"/>
+          <a:ext cx="6369050" cy="1285875"/>
         </p:xfrm>
         <a:graphic>
           <a:graphicData uri="http://schemas.openxmlformats.org/presentationml/2006/ole">
             <mc:AlternateContent xmlns:mc="http://schemas.openxmlformats.org/markup-compatibility/2006">
               <mc:Choice xmlns:v="urn:schemas-microsoft-com:vml" Requires="v">
-                <p:oleObj spid="_x0000_s554142" name="Equation" r:id="rId10" imgW="1524000" imgH="254000" progId="Equation.DSMT4">
+                <p:oleObj spid="_x0000_s554155" name="Equation" r:id="rId10" imgW="1257300" imgH="254000" progId="Equation.DSMT4">
                   <p:embed/>
                 </p:oleObj>
               </mc:Choice>
               <mc:Fallback>
-                <p:oleObj name="Equation" r:id="rId10" imgW="1524000" imgH="254000" progId="Equation.DSMT4">
+                <p:oleObj name="Equation" r:id="rId10" imgW="1257300" imgH="254000" progId="Equation.DSMT4">
                   <p:embed/>
                   <p:pic>
                     <p:nvPicPr>
@@ -14869,8 +14952,8 @@
                     </p:blipFill>
                     <p:spPr>
                       <a:xfrm>
-                        <a:off x="555484" y="4751082"/>
-                        <a:ext cx="7718425" cy="1285875"/>
+                        <a:off x="1333500" y="2327275"/>
+                        <a:ext cx="6369050" cy="1285875"/>
                       </a:xfrm>
                       <a:prstGeom prst="rect">
                         <a:avLst/>
@@ -15140,34 +15223,111 @@
           <a:chExt cx="0" cy="0"/>
         </a:xfrm>
       </p:grpSpPr>
+      <p:sp>
+        <p:nvSpPr>
+          <p:cNvPr id="5" name="TextBox 4"/>
+          <p:cNvSpPr txBox="1"/>
+          <p:nvPr/>
+        </p:nvSpPr>
+        <p:spPr>
+          <a:xfrm>
+            <a:off x="1724483" y="381001"/>
+            <a:ext cx="6619417" cy="923330"/>
+          </a:xfrm>
+          <a:prstGeom prst="rect">
+            <a:avLst/>
+          </a:prstGeom>
+          <a:noFill/>
+        </p:spPr>
+        <p:txBody>
+          <a:bodyPr wrap="square" rtlCol="0">
+            <a:spAutoFit/>
+          </a:bodyPr>
+          <a:lstStyle/>
+          <a:p>
+            <a:pPr algn="l"/>
+            <a:r>
+              <a:rPr lang="en-US" sz="5400" dirty="0" smtClean="0">
+                <a:solidFill>
+                  <a:srgbClr val="FF03E3"/>
+                </a:solidFill>
+                <a:latin typeface="Comic Sans MS" pitchFamily="66" charset="0"/>
+              </a:rPr>
+              <a:t>Simplification </a:t>
+            </a:r>
+            <a:r>
+              <a:rPr lang="en-US" sz="5400" dirty="0" smtClean="0">
+                <a:latin typeface="Comic Sans MS" pitchFamily="66" charset="0"/>
+              </a:rPr>
+              <a:t>rules</a:t>
+            </a:r>
+            <a:endParaRPr lang="en-US" sz="5400" dirty="0">
+              <a:latin typeface="Comic Sans MS" pitchFamily="66" charset="0"/>
+            </a:endParaRPr>
+          </a:p>
+        </p:txBody>
+      </p:sp>
+      <p:sp>
+        <p:nvSpPr>
+          <p:cNvPr id="4" name="Slide Number Placeholder 2"/>
+          <p:cNvSpPr>
+            <a:spLocks noGrp="1"/>
+          </p:cNvSpPr>
+          <p:nvPr>
+            <p:ph type="sldNum" sz="quarter" idx="10"/>
+          </p:nvPr>
+        </p:nvSpPr>
+        <p:spPr>
+          <a:xfrm>
+            <a:off x="7333815" y="6553200"/>
+            <a:ext cx="1810186" cy="276999"/>
+          </a:xfrm>
+        </p:spPr>
+        <p:txBody>
+          <a:bodyPr/>
+          <a:lstStyle/>
+          <a:p>
+            <a:r>
+              <a:rPr lang="en-US" dirty="0" smtClean="0"/>
+              <a:t>propositional algebra.</a:t>
+            </a:r>
+            <a:fld id="{3251DA95-B240-47FE-901D-B78FC8E8E532}" type="slidenum">
+              <a:rPr lang="en-US" smtClean="0"/>
+              <a:pPr/>
+              <a:t>29</a:t>
+            </a:fld>
+            <a:endParaRPr lang="en-US" dirty="0"/>
+          </a:p>
+        </p:txBody>
+      </p:sp>
       <p:graphicFrame>
         <p:nvGraphicFramePr>
-          <p:cNvPr id="24" name="Object 23"/>
+          <p:cNvPr id="7" name="Object 6"/>
           <p:cNvGraphicFramePr>
             <a:graphicFrameLocks noChangeAspect="1"/>
           </p:cNvGraphicFramePr>
           <p:nvPr>
             <p:extLst>
               <p:ext uri="{D42A27DB-BD31-4B8C-83A1-F6EECF244321}">
-                <p14:modId xmlns:p14="http://schemas.microsoft.com/office/powerpoint/2010/main" val="4041046133"/>
+                <p14:modId xmlns:p14="http://schemas.microsoft.com/office/powerpoint/2010/main" val="3864095893"/>
               </p:ext>
             </p:extLst>
           </p:nvPr>
         </p:nvGraphicFramePr>
         <p:xfrm>
-          <a:off x="1397794" y="1282700"/>
-          <a:ext cx="6484937" cy="1689100"/>
+          <a:off x="2028012" y="2527300"/>
+          <a:ext cx="5275262" cy="1157288"/>
         </p:xfrm>
         <a:graphic>
           <a:graphicData uri="http://schemas.openxmlformats.org/presentationml/2006/ole">
             <mc:AlternateContent xmlns:mc="http://schemas.openxmlformats.org/markup-compatibility/2006">
               <mc:Choice xmlns:v="urn:schemas-microsoft-com:vml" Requires="v">
-                <p:oleObj spid="_x0000_s426111" name="Equation" r:id="rId4" imgW="1854200" imgH="482600" progId="Equation.DSMT4">
+                <p:oleObj spid="_x0000_s640009" name="Equation" r:id="rId4" imgW="1041400" imgH="228600" progId="Equation.DSMT4">
                   <p:embed/>
                 </p:oleObj>
               </mc:Choice>
               <mc:Fallback>
-                <p:oleObj name="Equation" r:id="rId4" imgW="1854200" imgH="482600" progId="Equation.DSMT4">
+                <p:oleObj name="Equation" r:id="rId4" imgW="1041400" imgH="228600" progId="Equation.DSMT4">
                   <p:embed/>
                   <p:pic>
                     <p:nvPicPr>
@@ -15183,8 +15343,8 @@
                     </p:blipFill>
                     <p:spPr>
                       <a:xfrm>
-                        <a:off x="1397794" y="1282700"/>
-                        <a:ext cx="6484937" cy="1689100"/>
+                        <a:off x="2028012" y="2527300"/>
+                        <a:ext cx="5275262" cy="1157288"/>
                       </a:xfrm>
                       <a:prstGeom prst="rect">
                         <a:avLst/>
@@ -15197,180 +15357,181 @@
           </a:graphicData>
         </a:graphic>
       </p:graphicFrame>
-      <p:sp>
-        <p:nvSpPr>
-          <p:cNvPr id="9" name="Title 1"/>
-          <p:cNvSpPr>
-            <a:spLocks noGrp="1"/>
-          </p:cNvSpPr>
-          <p:nvPr>
-            <p:ph type="title"/>
-          </p:nvPr>
-        </p:nvSpPr>
-        <p:spPr>
-          <a:xfrm>
-            <a:off x="1651000" y="363538"/>
-            <a:ext cx="6794500" cy="1003300"/>
-          </a:xfrm>
-        </p:spPr>
-        <p:txBody>
-          <a:bodyPr/>
-          <a:lstStyle/>
-          <a:p>
-            <a:r>
-              <a:rPr lang="en-US" sz="4000" dirty="0" smtClean="0">
-                <a:solidFill>
-                  <a:srgbClr val="C40025"/>
-                </a:solidFill>
-              </a:rPr>
-              <a:t>example</a:t>
-            </a:r>
-            <a:endParaRPr lang="en-US" sz="4000" dirty="0">
-              <a:solidFill>
-                <a:srgbClr val="C40025"/>
-              </a:solidFill>
-            </a:endParaRPr>
-          </a:p>
-        </p:txBody>
-      </p:sp>
-      <p:sp>
-        <p:nvSpPr>
-          <p:cNvPr id="4" name="Slide Number Placeholder 2"/>
-          <p:cNvSpPr>
-            <a:spLocks noGrp="1"/>
-          </p:cNvSpPr>
-          <p:nvPr>
-            <p:ph type="sldNum" sz="quarter" idx="10"/>
-          </p:nvPr>
-        </p:nvSpPr>
-        <p:spPr>
-          <a:xfrm>
-            <a:off x="7333815" y="6553200"/>
-            <a:ext cx="1810186" cy="276999"/>
-          </a:xfrm>
-        </p:spPr>
-        <p:txBody>
-          <a:bodyPr/>
-          <a:lstStyle/>
-          <a:p>
-            <a:r>
-              <a:rPr lang="en-US" dirty="0" smtClean="0"/>
-              <a:t>propositional algebra.</a:t>
-            </a:r>
-            <a:fld id="{3251DA95-B240-47FE-901D-B78FC8E8E532}" type="slidenum">
-              <a:rPr lang="en-US" smtClean="0"/>
-              <a:pPr/>
-              <a:t>29</a:t>
-            </a:fld>
-            <a:endParaRPr lang="en-US" dirty="0"/>
-          </a:p>
-        </p:txBody>
-      </p:sp>
-      <p:sp>
-        <p:nvSpPr>
-          <p:cNvPr id="6" name="TextBox 5"/>
-          <p:cNvSpPr txBox="1"/>
-          <p:nvPr/>
-        </p:nvSpPr>
-        <p:spPr>
-          <a:xfrm>
-            <a:off x="5372100" y="3067903"/>
-            <a:ext cx="2565726" cy="830997"/>
-          </a:xfrm>
-          <a:prstGeom prst="rect">
-            <a:avLst/>
-          </a:prstGeom>
-          <a:noFill/>
-        </p:spPr>
-        <p:txBody>
-          <a:bodyPr wrap="none" rtlCol="0">
-            <a:spAutoFit/>
-          </a:bodyPr>
-          <a:lstStyle/>
-          <a:p>
-            <a:pPr algn="l"/>
-            <a:r>
-              <a:rPr lang="en-US" sz="4800" dirty="0" smtClean="0">
-                <a:solidFill>
-                  <a:srgbClr val="FF03E3"/>
-                </a:solidFill>
-                <a:latin typeface="Comic Sans MS" pitchFamily="66" charset="0"/>
-              </a:rPr>
-              <a:t>Simplify </a:t>
-            </a:r>
-            <a:endParaRPr lang="en-US" sz="4800" dirty="0" smtClean="0">
-              <a:latin typeface="Comic Sans MS" pitchFamily="66" charset="0"/>
-            </a:endParaRPr>
-          </a:p>
-        </p:txBody>
-      </p:sp>
-      <p:sp>
-        <p:nvSpPr>
-          <p:cNvPr id="7" name="Rounded Rectangle 6"/>
-          <p:cNvSpPr/>
-          <p:nvPr/>
-        </p:nvSpPr>
-        <p:spPr bwMode="auto">
-          <a:xfrm>
-            <a:off x="1211263" y="1231900"/>
-            <a:ext cx="6980237" cy="1866900"/>
-          </a:xfrm>
-          <a:prstGeom prst="roundRect">
-            <a:avLst/>
-          </a:prstGeom>
-          <a:noFill/>
-          <a:ln w="41275" cap="flat" cmpd="sng" algn="ctr">
-            <a:solidFill>
-              <a:srgbClr val="FF03E3"/>
-            </a:solidFill>
-            <a:prstDash val="sysDash"/>
-            <a:round/>
-            <a:headEnd type="none" w="med" len="med"/>
-            <a:tailEnd type="none" w="med" len="med"/>
-          </a:ln>
-          <a:effectLst/>
-        </p:spPr>
-        <p:txBody>
-          <a:bodyPr vert="horz" wrap="none" lIns="91440" tIns="45720" rIns="91440" bIns="45720" numCol="1" rtlCol="0" anchor="ctr" anchorCtr="0" compatLnSpc="1">
-            <a:prstTxWarp prst="textNoShape">
-              <a:avLst/>
-            </a:prstTxWarp>
-          </a:bodyPr>
-          <a:lstStyle/>
-          <a:p>
-            <a:pPr marL="0" marR="0" indent="0" algn="ctr" defTabSz="914400" rtl="0" eaLnBrk="1" fontAlgn="base" latinLnBrk="0" hangingPunct="1">
-              <a:lnSpc>
-                <a:spcPct val="100000"/>
-              </a:lnSpc>
-              <a:spcBef>
-                <a:spcPct val="0"/>
-              </a:spcBef>
-              <a:spcAft>
-                <a:spcPct val="0"/>
-              </a:spcAft>
-              <a:buClrTx/>
-              <a:buSzTx/>
-              <a:buFontTx/>
-              <a:buNone/>
-              <a:tabLst/>
-            </a:pPr>
-            <a:endParaRPr kumimoji="0" lang="en-US" sz="3200" b="0" i="0" u="none" strike="noStrike" cap="none" normalizeH="0" baseline="0" smtClean="0">
-              <a:ln>
-                <a:noFill/>
-              </a:ln>
-              <a:solidFill>
-                <a:schemeClr val="tx1"/>
-              </a:solidFill>
-              <a:effectLst/>
-              <a:latin typeface="Times New Roman" pitchFamily="18" charset="0"/>
-            </a:endParaRPr>
-          </a:p>
-        </p:txBody>
-      </p:sp>
+      <p:graphicFrame>
+        <p:nvGraphicFramePr>
+          <p:cNvPr id="8" name="Object 7"/>
+          <p:cNvGraphicFramePr>
+            <a:graphicFrameLocks noChangeAspect="1"/>
+          </p:cNvGraphicFramePr>
+          <p:nvPr>
+            <p:extLst>
+              <p:ext uri="{D42A27DB-BD31-4B8C-83A1-F6EECF244321}">
+                <p14:modId xmlns:p14="http://schemas.microsoft.com/office/powerpoint/2010/main" val="3830802057"/>
+              </p:ext>
+            </p:extLst>
+          </p:nvPr>
+        </p:nvGraphicFramePr>
+        <p:xfrm>
+          <a:off x="2036763" y="1511300"/>
+          <a:ext cx="5081587" cy="1157288"/>
+        </p:xfrm>
+        <a:graphic>
+          <a:graphicData uri="http://schemas.openxmlformats.org/presentationml/2006/ole">
+            <mc:AlternateContent xmlns:mc="http://schemas.openxmlformats.org/markup-compatibility/2006">
+              <mc:Choice xmlns:v="urn:schemas-microsoft-com:vml" Requires="v">
+                <p:oleObj spid="_x0000_s640010" name="Equation" r:id="rId6" imgW="1003300" imgH="228600" progId="Equation.DSMT4">
+                  <p:embed/>
+                </p:oleObj>
+              </mc:Choice>
+              <mc:Fallback>
+                <p:oleObj name="Equation" r:id="rId6" imgW="1003300" imgH="228600" progId="Equation.DSMT4">
+                  <p:embed/>
+                  <p:pic>
+                    <p:nvPicPr>
+                      <p:cNvPr id="0" name=""/>
+                      <p:cNvPicPr/>
+                      <p:nvPr/>
+                    </p:nvPicPr>
+                    <p:blipFill>
+                      <a:blip r:embed="rId7"/>
+                      <a:stretch>
+                        <a:fillRect/>
+                      </a:stretch>
+                    </p:blipFill>
+                    <p:spPr>
+                      <a:xfrm>
+                        <a:off x="2036763" y="1511300"/>
+                        <a:ext cx="5081587" cy="1157288"/>
+                      </a:xfrm>
+                      <a:prstGeom prst="rect">
+                        <a:avLst/>
+                      </a:prstGeom>
+                    </p:spPr>
+                  </p:pic>
+                </p:oleObj>
+              </mc:Fallback>
+            </mc:AlternateContent>
+          </a:graphicData>
+        </a:graphic>
+      </p:graphicFrame>
+      <p:graphicFrame>
+        <p:nvGraphicFramePr>
+          <p:cNvPr id="9" name="Object 8"/>
+          <p:cNvGraphicFramePr>
+            <a:graphicFrameLocks noChangeAspect="1"/>
+          </p:cNvGraphicFramePr>
+          <p:nvPr>
+            <p:extLst>
+              <p:ext uri="{D42A27DB-BD31-4B8C-83A1-F6EECF244321}">
+                <p14:modId xmlns:p14="http://schemas.microsoft.com/office/powerpoint/2010/main" val="1355924033"/>
+              </p:ext>
+            </p:extLst>
+          </p:nvPr>
+        </p:nvGraphicFramePr>
+        <p:xfrm>
+          <a:off x="2638475" y="3685100"/>
+          <a:ext cx="4373563" cy="1092200"/>
+        </p:xfrm>
+        <a:graphic>
+          <a:graphicData uri="http://schemas.openxmlformats.org/presentationml/2006/ole">
+            <mc:AlternateContent xmlns:mc="http://schemas.openxmlformats.org/markup-compatibility/2006">
+              <mc:Choice xmlns:v="urn:schemas-microsoft-com:vml" Requires="v">
+                <p:oleObj spid="_x0000_s640011" name="Equation" r:id="rId8" imgW="863600" imgH="215900" progId="Equation.DSMT4">
+                  <p:embed/>
+                </p:oleObj>
+              </mc:Choice>
+              <mc:Fallback>
+                <p:oleObj name="Equation" r:id="rId8" imgW="863600" imgH="215900" progId="Equation.DSMT4">
+                  <p:embed/>
+                  <p:pic>
+                    <p:nvPicPr>
+                      <p:cNvPr id="0" name=""/>
+                      <p:cNvPicPr/>
+                      <p:nvPr/>
+                    </p:nvPicPr>
+                    <p:blipFill>
+                      <a:blip r:embed="rId9"/>
+                      <a:stretch>
+                        <a:fillRect/>
+                      </a:stretch>
+                    </p:blipFill>
+                    <p:spPr>
+                      <a:xfrm>
+                        <a:off x="2638475" y="3685100"/>
+                        <a:ext cx="4373563" cy="1092200"/>
+                      </a:xfrm>
+                      <a:prstGeom prst="rect">
+                        <a:avLst/>
+                      </a:prstGeom>
+                    </p:spPr>
+                  </p:pic>
+                </p:oleObj>
+              </mc:Fallback>
+            </mc:AlternateContent>
+          </a:graphicData>
+        </a:graphic>
+      </p:graphicFrame>
+      <p:graphicFrame>
+        <p:nvGraphicFramePr>
+          <p:cNvPr id="10" name="Object 9"/>
+          <p:cNvGraphicFramePr>
+            <a:graphicFrameLocks noChangeAspect="1"/>
+          </p:cNvGraphicFramePr>
+          <p:nvPr>
+            <p:extLst>
+              <p:ext uri="{D42A27DB-BD31-4B8C-83A1-F6EECF244321}">
+                <p14:modId xmlns:p14="http://schemas.microsoft.com/office/powerpoint/2010/main" val="1785928744"/>
+              </p:ext>
+            </p:extLst>
+          </p:nvPr>
+        </p:nvGraphicFramePr>
+        <p:xfrm>
+          <a:off x="2387650" y="4846638"/>
+          <a:ext cx="4695825" cy="1093787"/>
+        </p:xfrm>
+        <a:graphic>
+          <a:graphicData uri="http://schemas.openxmlformats.org/presentationml/2006/ole">
+            <mc:AlternateContent xmlns:mc="http://schemas.openxmlformats.org/markup-compatibility/2006">
+              <mc:Choice xmlns:v="urn:schemas-microsoft-com:vml" Requires="v">
+                <p:oleObj spid="_x0000_s640012" name="Equation" r:id="rId10" imgW="927100" imgH="215900" progId="Equation.DSMT4">
+                  <p:embed/>
+                </p:oleObj>
+              </mc:Choice>
+              <mc:Fallback>
+                <p:oleObj name="Equation" r:id="rId10" imgW="927100" imgH="215900" progId="Equation.DSMT4">
+                  <p:embed/>
+                  <p:pic>
+                    <p:nvPicPr>
+                      <p:cNvPr id="0" name=""/>
+                      <p:cNvPicPr/>
+                      <p:nvPr/>
+                    </p:nvPicPr>
+                    <p:blipFill>
+                      <a:blip r:embed="rId11"/>
+                      <a:stretch>
+                        <a:fillRect/>
+                      </a:stretch>
+                    </p:blipFill>
+                    <p:spPr>
+                      <a:xfrm>
+                        <a:off x="2387650" y="4846638"/>
+                        <a:ext cx="4695825" cy="1093787"/>
+                      </a:xfrm>
+                      <a:prstGeom prst="rect">
+                        <a:avLst/>
+                      </a:prstGeom>
+                    </p:spPr>
+                  </p:pic>
+                </p:oleObj>
+              </mc:Fallback>
+            </mc:AlternateContent>
+          </a:graphicData>
+        </a:graphic>
+      </p:graphicFrame>
     </p:spTree>
     <p:extLst>
       <p:ext uri="{BB962C8B-B14F-4D97-AF65-F5344CB8AC3E}">
-        <p14:creationId xmlns:p14="http://schemas.microsoft.com/office/powerpoint/2010/main" val="2033548101"/>
+        <p14:creationId xmlns:p14="http://schemas.microsoft.com/office/powerpoint/2010/main" val="3318430383"/>
       </p:ext>
     </p:extLst>
   </p:cSld>
@@ -15378,7 +15539,7 @@
     <a:masterClrMapping/>
   </p:clrMapOvr>
   <p:transition xmlns:p14="http://schemas.microsoft.com/office/powerpoint/2010/main" spd="slow" advClick="0">
-    <p:fade/>
+    <p:fade thruBlk="1"/>
   </p:transition>
   <p:timing>
     <p:tnLst>
@@ -15401,7 +15562,7 @@
                             </p:stCondLst>
                             <p:childTnLst>
                               <p:par>
-                                <p:cTn id="5" presetID="1" presetClass="exit" presetSubtype="0" fill="hold" grpId="0" nodeType="clickEffect">
+                                <p:cTn id="5" presetID="22" presetClass="entr" presetSubtype="8" fill="hold" nodeType="clickEffect">
                                   <p:stCondLst>
                                     <p:cond delay="0"/>
                                   </p:stCondLst>
@@ -15414,34 +15575,7 @@
                                           </p:stCondLst>
                                         </p:cTn>
                                         <p:tgtEl>
-                                          <p:spTgt spid="7"/>
-                                        </p:tgtEl>
-                                        <p:attrNameLst>
-                                          <p:attrName>style.visibility</p:attrName>
-                                        </p:attrNameLst>
-                                      </p:cBhvr>
-                                      <p:to>
-                                        <p:strVal val="hidden"/>
-                                      </p:to>
-                                    </p:set>
-                                  </p:childTnLst>
-                                </p:cTn>
-                              </p:par>
-                              <p:par>
-                                <p:cTn id="7" presetID="10" presetClass="entr" presetSubtype="0" fill="hold" grpId="0" nodeType="withEffect">
-                                  <p:stCondLst>
-                                    <p:cond delay="0"/>
-                                  </p:stCondLst>
-                                  <p:childTnLst>
-                                    <p:set>
-                                      <p:cBhvr>
-                                        <p:cTn id="8" dur="1" fill="hold">
-                                          <p:stCondLst>
-                                            <p:cond delay="0"/>
-                                          </p:stCondLst>
-                                        </p:cTn>
-                                        <p:tgtEl>
-                                          <p:spTgt spid="6"/>
+                                          <p:spTgt spid="8"/>
                                         </p:tgtEl>
                                         <p:attrNameLst>
                                           <p:attrName>style.visibility</p:attrName>
@@ -15451,11 +15585,152 @@
                                         <p:strVal val="visible"/>
                                       </p:to>
                                     </p:set>
-                                    <p:animEffect transition="in" filter="fade">
+                                    <p:animEffect transition="in" filter="wipe(left)">
                                       <p:cBhvr>
-                                        <p:cTn id="9" dur="500"/>
+                                        <p:cTn id="7" dur="1000"/>
                                         <p:tgtEl>
-                                          <p:spTgt spid="6"/>
+                                          <p:spTgt spid="8"/>
+                                        </p:tgtEl>
+                                      </p:cBhvr>
+                                    </p:animEffect>
+                                  </p:childTnLst>
+                                </p:cTn>
+                              </p:par>
+                              <p:par>
+                                <p:cTn id="8" presetID="22" presetClass="entr" presetSubtype="8" fill="hold" nodeType="withEffect">
+                                  <p:stCondLst>
+                                    <p:cond delay="0"/>
+                                  </p:stCondLst>
+                                  <p:childTnLst>
+                                    <p:set>
+                                      <p:cBhvr>
+                                        <p:cTn id="9" dur="1" fill="hold">
+                                          <p:stCondLst>
+                                            <p:cond delay="0"/>
+                                          </p:stCondLst>
+                                        </p:cTn>
+                                        <p:tgtEl>
+                                          <p:spTgt spid="7"/>
+                                        </p:tgtEl>
+                                        <p:attrNameLst>
+                                          <p:attrName>style.visibility</p:attrName>
+                                        </p:attrNameLst>
+                                      </p:cBhvr>
+                                      <p:to>
+                                        <p:strVal val="visible"/>
+                                      </p:to>
+                                    </p:set>
+                                    <p:animEffect transition="in" filter="wipe(left)">
+                                      <p:cBhvr>
+                                        <p:cTn id="10" dur="1000"/>
+                                        <p:tgtEl>
+                                          <p:spTgt spid="7"/>
+                                        </p:tgtEl>
+                                      </p:cBhvr>
+                                    </p:animEffect>
+                                  </p:childTnLst>
+                                </p:cTn>
+                              </p:par>
+                            </p:childTnLst>
+                          </p:cTn>
+                        </p:par>
+                      </p:childTnLst>
+                    </p:cTn>
+                  </p:par>
+                  <p:par>
+                    <p:cTn id="11" fill="hold">
+                      <p:stCondLst>
+                        <p:cond delay="indefinite"/>
+                      </p:stCondLst>
+                      <p:childTnLst>
+                        <p:par>
+                          <p:cTn id="12" fill="hold">
+                            <p:stCondLst>
+                              <p:cond delay="0"/>
+                            </p:stCondLst>
+                            <p:childTnLst>
+                              <p:par>
+                                <p:cTn id="13" presetID="22" presetClass="entr" presetSubtype="8" fill="hold" nodeType="clickEffect">
+                                  <p:stCondLst>
+                                    <p:cond delay="0"/>
+                                  </p:stCondLst>
+                                  <p:childTnLst>
+                                    <p:set>
+                                      <p:cBhvr>
+                                        <p:cTn id="14" dur="1" fill="hold">
+                                          <p:stCondLst>
+                                            <p:cond delay="0"/>
+                                          </p:stCondLst>
+                                        </p:cTn>
+                                        <p:tgtEl>
+                                          <p:spTgt spid="9"/>
+                                        </p:tgtEl>
+                                        <p:attrNameLst>
+                                          <p:attrName>style.visibility</p:attrName>
+                                        </p:attrNameLst>
+                                      </p:cBhvr>
+                                      <p:to>
+                                        <p:strVal val="visible"/>
+                                      </p:to>
+                                    </p:set>
+                                    <p:animEffect transition="in" filter="wipe(left)">
+                                      <p:cBhvr>
+                                        <p:cTn id="15" dur="1000"/>
+                                        <p:tgtEl>
+                                          <p:spTgt spid="9"/>
+                                        </p:tgtEl>
+                                      </p:cBhvr>
+                                    </p:animEffect>
+                                  </p:childTnLst>
+                                </p:cTn>
+                              </p:par>
+                            </p:childTnLst>
+                          </p:cTn>
+                        </p:par>
+                      </p:childTnLst>
+                    </p:cTn>
+                  </p:par>
+                  <p:par>
+                    <p:cTn id="16" fill="hold">
+                      <p:stCondLst>
+                        <p:cond delay="indefinite"/>
+                      </p:stCondLst>
+                      <p:childTnLst>
+                        <p:par>
+                          <p:cTn id="17" fill="hold">
+                            <p:stCondLst>
+                              <p:cond delay="0"/>
+                            </p:stCondLst>
+                            <p:childTnLst>
+                              <p:par>
+                                <p:cTn id="18" presetID="22" presetClass="entr" presetSubtype="8" fill="hold" nodeType="clickEffect">
+                                  <p:stCondLst>
+                                    <p:cond delay="0"/>
+                                  </p:stCondLst>
+                                  <p:childTnLst>
+                                    <p:set>
+                                      <p:cBhvr>
+                                        <p:cTn id="19" dur="1" fill="hold">
+                                          <p:stCondLst>
+                                            <p:cond delay="0"/>
+                                          </p:stCondLst>
+                                        </p:cTn>
+                                        <p:tgtEl>
+                                          <p:spTgt spid="10"/>
+                                        </p:tgtEl>
+                                        <p:attrNameLst>
+                                          <p:attrName>style.visibility</p:attrName>
+                                        </p:attrNameLst>
+                                      </p:cBhvr>
+                                      <p:to>
+                                        <p:strVal val="visible"/>
+                                      </p:to>
+                                    </p:set>
+                                    <p:animEffect transition="in" filter="wipe(left)">
+                                      <p:cBhvr>
+                                        <p:cTn id="20" dur="1000"/>
+                                        <p:tgtEl>
+                                          <p:spTgt spid="10"/>
                                         </p:tgtEl>
                                       </p:cBhvr>
                                     </p:animEffect>
@@ -15489,10 +15764,6 @@
         </p:cTn>
       </p:par>
     </p:tnLst>
-    <p:bldLst>
-      <p:bldP spid="6" grpId="0"/>
-      <p:bldP spid="7" grpId="0" animBg="1"/>
-    </p:bldLst>
   </p:timing>
 </p:sld>
 </file>
@@ -15597,29 +15868,8 @@
               <a:rPr lang="en-US" sz="4800" dirty="0" smtClean="0">
                 <a:latin typeface="Comic Sans MS" pitchFamily="66" charset="0"/>
               </a:rPr>
-              <a:t>Come up with enough equivalence rules to convert any formula to an equivalent </a:t>
-            </a:r>
-            <a:r>
-              <a:rPr lang="en-US" sz="4800" dirty="0" smtClean="0">
-                <a:latin typeface="Comic Sans MS" pitchFamily="66" charset="0"/>
-              </a:rPr>
-              <a:t>canonical </a:t>
-            </a:r>
-            <a:r>
-              <a:rPr lang="en-US" sz="4800" dirty="0" smtClean="0">
-                <a:latin typeface="Comic Sans MS" pitchFamily="66" charset="0"/>
-              </a:rPr>
-              <a:t>DNF</a:t>
-            </a:r>
-            <a:r>
-              <a:rPr lang="en-US" sz="4800" dirty="0" smtClean="0">
-                <a:latin typeface="Comic Sans MS" pitchFamily="66" charset="0"/>
-              </a:rPr>
-              <a:t>.</a:t>
-            </a:r>
-            <a:endParaRPr lang="en-US" sz="4800" dirty="0" smtClean="0">
-              <a:latin typeface="Comic Sans MS" pitchFamily="66" charset="0"/>
-            </a:endParaRPr>
+              <a:t>Come up with enough equivalence rules to convert any formula to an equivalent canonical DNF.</a:t>
+            </a:r>
           </a:p>
         </p:txBody>
       </p:sp>
@@ -15765,7 +16015,7 @@
           <p:nvPr>
             <p:extLst>
               <p:ext uri="{D42A27DB-BD31-4B8C-83A1-F6EECF244321}">
-                <p14:modId xmlns:p14="http://schemas.microsoft.com/office/powerpoint/2010/main" val="4046428985"/>
+                <p14:modId xmlns:p14="http://schemas.microsoft.com/office/powerpoint/2010/main" val="4041046133"/>
               </p:ext>
             </p:extLst>
           </p:nvPr>
@@ -15778,7 +16028,7 @@
           <a:graphicData uri="http://schemas.openxmlformats.org/presentationml/2006/ole">
             <mc:AlternateContent xmlns:mc="http://schemas.openxmlformats.org/markup-compatibility/2006">
               <mc:Choice xmlns:v="urn:schemas-microsoft-com:vml" Requires="v">
-                <p:oleObj spid="_x0000_s481365" name="Equation" r:id="rId4" imgW="1854200" imgH="482600" progId="Equation.DSMT4">
+                <p:oleObj spid="_x0000_s426115" name="Equation" r:id="rId4" imgW="1854200" imgH="482600" progId="Equation.DSMT4">
                   <p:embed/>
                 </p:oleObj>
               </mc:Choice>
@@ -15815,7 +16065,7 @@
       </p:graphicFrame>
       <p:sp>
         <p:nvSpPr>
-          <p:cNvPr id="7" name="Title 1"/>
+          <p:cNvPr id="9" name="Title 1"/>
           <p:cNvSpPr>
             <a:spLocks noGrp="1"/>
           </p:cNvSpPr>
@@ -15877,6 +16127,380 @@
               <a:rPr lang="en-US" smtClean="0"/>
               <a:pPr/>
               <a:t>30</a:t>
+            </a:fld>
+            <a:endParaRPr lang="en-US" dirty="0"/>
+          </a:p>
+        </p:txBody>
+      </p:sp>
+      <p:sp>
+        <p:nvSpPr>
+          <p:cNvPr id="6" name="TextBox 5"/>
+          <p:cNvSpPr txBox="1"/>
+          <p:nvPr/>
+        </p:nvSpPr>
+        <p:spPr>
+          <a:xfrm>
+            <a:off x="5372100" y="3067903"/>
+            <a:ext cx="2565726" cy="830997"/>
+          </a:xfrm>
+          <a:prstGeom prst="rect">
+            <a:avLst/>
+          </a:prstGeom>
+          <a:noFill/>
+        </p:spPr>
+        <p:txBody>
+          <a:bodyPr wrap="none" rtlCol="0">
+            <a:spAutoFit/>
+          </a:bodyPr>
+          <a:lstStyle/>
+          <a:p>
+            <a:pPr algn="l"/>
+            <a:r>
+              <a:rPr lang="en-US" sz="4800" dirty="0" smtClean="0">
+                <a:solidFill>
+                  <a:srgbClr val="FF03E3"/>
+                </a:solidFill>
+                <a:latin typeface="Comic Sans MS" pitchFamily="66" charset="0"/>
+              </a:rPr>
+              <a:t>Simplify </a:t>
+            </a:r>
+            <a:endParaRPr lang="en-US" sz="4800" dirty="0" smtClean="0">
+              <a:latin typeface="Comic Sans MS" pitchFamily="66" charset="0"/>
+            </a:endParaRPr>
+          </a:p>
+        </p:txBody>
+      </p:sp>
+      <p:sp>
+        <p:nvSpPr>
+          <p:cNvPr id="7" name="Rounded Rectangle 6"/>
+          <p:cNvSpPr/>
+          <p:nvPr/>
+        </p:nvSpPr>
+        <p:spPr bwMode="auto">
+          <a:xfrm>
+            <a:off x="1211263" y="1231900"/>
+            <a:ext cx="6980237" cy="1866900"/>
+          </a:xfrm>
+          <a:prstGeom prst="roundRect">
+            <a:avLst/>
+          </a:prstGeom>
+          <a:noFill/>
+          <a:ln w="41275" cap="flat" cmpd="sng" algn="ctr">
+            <a:solidFill>
+              <a:srgbClr val="FF03E3"/>
+            </a:solidFill>
+            <a:prstDash val="sysDash"/>
+            <a:round/>
+            <a:headEnd type="none" w="med" len="med"/>
+            <a:tailEnd type="none" w="med" len="med"/>
+          </a:ln>
+          <a:effectLst/>
+        </p:spPr>
+        <p:txBody>
+          <a:bodyPr vert="horz" wrap="none" lIns="91440" tIns="45720" rIns="91440" bIns="45720" numCol="1" rtlCol="0" anchor="ctr" anchorCtr="0" compatLnSpc="1">
+            <a:prstTxWarp prst="textNoShape">
+              <a:avLst/>
+            </a:prstTxWarp>
+          </a:bodyPr>
+          <a:lstStyle/>
+          <a:p>
+            <a:pPr marL="0" marR="0" indent="0" algn="ctr" defTabSz="914400" rtl="0" eaLnBrk="1" fontAlgn="base" latinLnBrk="0" hangingPunct="1">
+              <a:lnSpc>
+                <a:spcPct val="100000"/>
+              </a:lnSpc>
+              <a:spcBef>
+                <a:spcPct val="0"/>
+              </a:spcBef>
+              <a:spcAft>
+                <a:spcPct val="0"/>
+              </a:spcAft>
+              <a:buClrTx/>
+              <a:buSzTx/>
+              <a:buFontTx/>
+              <a:buNone/>
+              <a:tabLst/>
+            </a:pPr>
+            <a:endParaRPr kumimoji="0" lang="en-US" sz="3200" b="0" i="0" u="none" strike="noStrike" cap="none" normalizeH="0" baseline="0" smtClean="0">
+              <a:ln>
+                <a:noFill/>
+              </a:ln>
+              <a:solidFill>
+                <a:schemeClr val="tx1"/>
+              </a:solidFill>
+              <a:effectLst/>
+              <a:latin typeface="Times New Roman" pitchFamily="18" charset="0"/>
+            </a:endParaRPr>
+          </a:p>
+        </p:txBody>
+      </p:sp>
+    </p:spTree>
+    <p:extLst>
+      <p:ext uri="{BB962C8B-B14F-4D97-AF65-F5344CB8AC3E}">
+        <p14:creationId xmlns:p14="http://schemas.microsoft.com/office/powerpoint/2010/main" val="2033548101"/>
+      </p:ext>
+    </p:extLst>
+  </p:cSld>
+  <p:clrMapOvr>
+    <a:masterClrMapping/>
+  </p:clrMapOvr>
+  <p:transition xmlns:p14="http://schemas.microsoft.com/office/powerpoint/2010/main" spd="slow" advClick="0">
+    <p:fade/>
+  </p:transition>
+  <p:timing>
+    <p:tnLst>
+      <p:par>
+        <p:cTn xmlns:p14="http://schemas.microsoft.com/office/powerpoint/2010/main" id="1" dur="indefinite" restart="never" nodeType="tmRoot">
+          <p:childTnLst>
+            <p:seq concurrent="1" nextAc="seek">
+              <p:cTn id="2" dur="indefinite" nodeType="mainSeq">
+                <p:childTnLst>
+                  <p:par>
+                    <p:cTn id="3" fill="hold">
+                      <p:stCondLst>
+                        <p:cond delay="indefinite"/>
+                      </p:stCondLst>
+                      <p:childTnLst>
+                        <p:par>
+                          <p:cTn id="4" fill="hold">
+                            <p:stCondLst>
+                              <p:cond delay="0"/>
+                            </p:stCondLst>
+                            <p:childTnLst>
+                              <p:par>
+                                <p:cTn id="5" presetID="1" presetClass="exit" presetSubtype="0" fill="hold" grpId="0" nodeType="clickEffect">
+                                  <p:stCondLst>
+                                    <p:cond delay="0"/>
+                                  </p:stCondLst>
+                                  <p:childTnLst>
+                                    <p:set>
+                                      <p:cBhvr>
+                                        <p:cTn id="6" dur="1" fill="hold">
+                                          <p:stCondLst>
+                                            <p:cond delay="0"/>
+                                          </p:stCondLst>
+                                        </p:cTn>
+                                        <p:tgtEl>
+                                          <p:spTgt spid="7"/>
+                                        </p:tgtEl>
+                                        <p:attrNameLst>
+                                          <p:attrName>style.visibility</p:attrName>
+                                        </p:attrNameLst>
+                                      </p:cBhvr>
+                                      <p:to>
+                                        <p:strVal val="hidden"/>
+                                      </p:to>
+                                    </p:set>
+                                  </p:childTnLst>
+                                </p:cTn>
+                              </p:par>
+                              <p:par>
+                                <p:cTn id="7" presetID="10" presetClass="entr" presetSubtype="0" fill="hold" grpId="0" nodeType="withEffect">
+                                  <p:stCondLst>
+                                    <p:cond delay="0"/>
+                                  </p:stCondLst>
+                                  <p:childTnLst>
+                                    <p:set>
+                                      <p:cBhvr>
+                                        <p:cTn id="8" dur="1" fill="hold">
+                                          <p:stCondLst>
+                                            <p:cond delay="0"/>
+                                          </p:stCondLst>
+                                        </p:cTn>
+                                        <p:tgtEl>
+                                          <p:spTgt spid="6"/>
+                                        </p:tgtEl>
+                                        <p:attrNameLst>
+                                          <p:attrName>style.visibility</p:attrName>
+                                        </p:attrNameLst>
+                                      </p:cBhvr>
+                                      <p:to>
+                                        <p:strVal val="visible"/>
+                                      </p:to>
+                                    </p:set>
+                                    <p:animEffect transition="in" filter="fade">
+                                      <p:cBhvr>
+                                        <p:cTn id="9" dur="500"/>
+                                        <p:tgtEl>
+                                          <p:spTgt spid="6"/>
+                                        </p:tgtEl>
+                                      </p:cBhvr>
+                                    </p:animEffect>
+                                  </p:childTnLst>
+                                </p:cTn>
+                              </p:par>
+                            </p:childTnLst>
+                          </p:cTn>
+                        </p:par>
+                      </p:childTnLst>
+                    </p:cTn>
+                  </p:par>
+                </p:childTnLst>
+              </p:cTn>
+              <p:prevCondLst>
+                <p:cond evt="onPrev" delay="0">
+                  <p:tgtEl>
+                    <p:sldTgt/>
+                  </p:tgtEl>
+                </p:cond>
+              </p:prevCondLst>
+              <p:nextCondLst>
+                <p:cond evt="onNext" delay="0">
+                  <p:tgtEl>
+                    <p:sldTgt/>
+                  </p:tgtEl>
+                </p:cond>
+              </p:nextCondLst>
+            </p:seq>
+          </p:childTnLst>
+        </p:cTn>
+      </p:par>
+    </p:tnLst>
+    <p:bldLst>
+      <p:bldP spid="6" grpId="0"/>
+      <p:bldP spid="7" grpId="0" animBg="1"/>
+    </p:bldLst>
+  </p:timing>
+</p:sld>
+</file>
+
+<file path=ppt/slides/slide31.xml><?xml version="1.0" encoding="utf-8"?>
+<p:sld xmlns:a="http://schemas.openxmlformats.org/drawingml/2006/main" xmlns:r="http://schemas.openxmlformats.org/officeDocument/2006/relationships" xmlns:p="http://schemas.openxmlformats.org/presentationml/2006/main">
+  <p:cSld>
+    <p:spTree>
+      <p:nvGrpSpPr>
+        <p:cNvPr id="1" name=""/>
+        <p:cNvGrpSpPr/>
+        <p:nvPr/>
+      </p:nvGrpSpPr>
+      <p:grpSpPr>
+        <a:xfrm>
+          <a:off x="0" y="0"/>
+          <a:ext cx="0" cy="0"/>
+          <a:chOff x="0" y="0"/>
+          <a:chExt cx="0" cy="0"/>
+        </a:xfrm>
+      </p:grpSpPr>
+      <p:graphicFrame>
+        <p:nvGraphicFramePr>
+          <p:cNvPr id="24" name="Object 23"/>
+          <p:cNvGraphicFramePr>
+            <a:graphicFrameLocks noChangeAspect="1"/>
+          </p:cNvGraphicFramePr>
+          <p:nvPr>
+            <p:extLst>
+              <p:ext uri="{D42A27DB-BD31-4B8C-83A1-F6EECF244321}">
+                <p14:modId xmlns:p14="http://schemas.microsoft.com/office/powerpoint/2010/main" val="4046428985"/>
+              </p:ext>
+            </p:extLst>
+          </p:nvPr>
+        </p:nvGraphicFramePr>
+        <p:xfrm>
+          <a:off x="1397794" y="1282700"/>
+          <a:ext cx="6484937" cy="1689100"/>
+        </p:xfrm>
+        <a:graphic>
+          <a:graphicData uri="http://schemas.openxmlformats.org/presentationml/2006/ole">
+            <mc:AlternateContent xmlns:mc="http://schemas.openxmlformats.org/markup-compatibility/2006">
+              <mc:Choice xmlns:v="urn:schemas-microsoft-com:vml" Requires="v">
+                <p:oleObj spid="_x0000_s481369" name="Equation" r:id="rId4" imgW="1854200" imgH="482600" progId="Equation.DSMT4">
+                  <p:embed/>
+                </p:oleObj>
+              </mc:Choice>
+              <mc:Fallback>
+                <p:oleObj name="Equation" r:id="rId4" imgW="1854200" imgH="482600" progId="Equation.DSMT4">
+                  <p:embed/>
+                  <p:pic>
+                    <p:nvPicPr>
+                      <p:cNvPr id="0" name=""/>
+                      <p:cNvPicPr/>
+                      <p:nvPr/>
+                    </p:nvPicPr>
+                    <p:blipFill>
+                      <a:blip r:embed="rId5"/>
+                      <a:stretch>
+                        <a:fillRect/>
+                      </a:stretch>
+                    </p:blipFill>
+                    <p:spPr>
+                      <a:xfrm>
+                        <a:off x="1397794" y="1282700"/>
+                        <a:ext cx="6484937" cy="1689100"/>
+                      </a:xfrm>
+                      <a:prstGeom prst="rect">
+                        <a:avLst/>
+                      </a:prstGeom>
+                    </p:spPr>
+                  </p:pic>
+                </p:oleObj>
+              </mc:Fallback>
+            </mc:AlternateContent>
+          </a:graphicData>
+        </a:graphic>
+      </p:graphicFrame>
+      <p:sp>
+        <p:nvSpPr>
+          <p:cNvPr id="7" name="Title 1"/>
+          <p:cNvSpPr>
+            <a:spLocks noGrp="1"/>
+          </p:cNvSpPr>
+          <p:nvPr>
+            <p:ph type="title"/>
+          </p:nvPr>
+        </p:nvSpPr>
+        <p:spPr>
+          <a:xfrm>
+            <a:off x="1651000" y="363538"/>
+            <a:ext cx="6794500" cy="1003300"/>
+          </a:xfrm>
+        </p:spPr>
+        <p:txBody>
+          <a:bodyPr/>
+          <a:lstStyle/>
+          <a:p>
+            <a:r>
+              <a:rPr lang="en-US" sz="4000" dirty="0" smtClean="0">
+                <a:solidFill>
+                  <a:srgbClr val="C40025"/>
+                </a:solidFill>
+              </a:rPr>
+              <a:t>example</a:t>
+            </a:r>
+            <a:endParaRPr lang="en-US" sz="4000" dirty="0">
+              <a:solidFill>
+                <a:srgbClr val="C40025"/>
+              </a:solidFill>
+            </a:endParaRPr>
+          </a:p>
+        </p:txBody>
+      </p:sp>
+      <p:sp>
+        <p:nvSpPr>
+          <p:cNvPr id="4" name="Slide Number Placeholder 2"/>
+          <p:cNvSpPr>
+            <a:spLocks noGrp="1"/>
+          </p:cNvSpPr>
+          <p:nvPr>
+            <p:ph type="sldNum" sz="quarter" idx="10"/>
+          </p:nvPr>
+        </p:nvSpPr>
+        <p:spPr>
+          <a:xfrm>
+            <a:off x="7333815" y="6553200"/>
+            <a:ext cx="1810186" cy="276999"/>
+          </a:xfrm>
+        </p:spPr>
+        <p:txBody>
+          <a:bodyPr/>
+          <a:lstStyle/>
+          <a:p>
+            <a:r>
+              <a:rPr lang="en-US" dirty="0" smtClean="0"/>
+              <a:t>propositional algebra.</a:t>
+            </a:r>
+            <a:fld id="{3251DA95-B240-47FE-901D-B78FC8E8E532}" type="slidenum">
+              <a:rPr lang="en-US" smtClean="0"/>
+              <a:pPr/>
+              <a:t>31</a:t>
             </a:fld>
             <a:endParaRPr lang="en-US" dirty="0"/>
           </a:p>
@@ -15952,7 +16576,7 @@
 </p:sld>
 </file>
 
-<file path=ppt/slides/slide31.xml><?xml version="1.0" encoding="utf-8"?>
+<file path=ppt/slides/slide32.xml><?xml version="1.0" encoding="utf-8"?>
 <p:sld xmlns:a="http://schemas.openxmlformats.org/drawingml/2006/main" xmlns:r="http://schemas.openxmlformats.org/officeDocument/2006/relationships" xmlns:p="http://schemas.openxmlformats.org/presentationml/2006/main">
   <p:cSld>
     <p:spTree>
@@ -15991,7 +16615,7 @@
           <a:graphicData uri="http://schemas.openxmlformats.org/presentationml/2006/ole">
             <mc:AlternateContent xmlns:mc="http://schemas.openxmlformats.org/markup-compatibility/2006">
               <mc:Choice xmlns:v="urn:schemas-microsoft-com:vml" Requires="v">
-                <p:oleObj spid="_x0000_s528452" name="Equation" r:id="rId4" imgW="1803400" imgH="482600" progId="Equation.DSMT4">
+                <p:oleObj spid="_x0000_s528456" name="Equation" r:id="rId4" imgW="1803400" imgH="482600" progId="Equation.DSMT4">
                   <p:embed/>
                 </p:oleObj>
               </mc:Choice>
@@ -16089,7 +16713,7 @@
             <a:fld id="{3251DA95-B240-47FE-901D-B78FC8E8E532}" type="slidenum">
               <a:rPr lang="en-US" smtClean="0"/>
               <a:pPr/>
-              <a:t>31</a:t>
+              <a:t>32</a:t>
             </a:fld>
             <a:endParaRPr lang="en-US" dirty="0"/>
           </a:p>
@@ -16118,7 +16742,7 @@
 </p:sld>
 </file>
 
-<file path=ppt/slides/slide32.xml><?xml version="1.0" encoding="utf-8"?>
+<file path=ppt/slides/slide33.xml><?xml version="1.0" encoding="utf-8"?>
 <p:sld xmlns:a="http://schemas.openxmlformats.org/drawingml/2006/main" xmlns:r="http://schemas.openxmlformats.org/officeDocument/2006/relationships" xmlns:p="http://schemas.openxmlformats.org/presentationml/2006/main">
   <p:cSld>
     <p:spTree>
@@ -16162,7 +16786,7 @@
             <a:fld id="{3251DA95-B240-47FE-901D-B78FC8E8E532}" type="slidenum">
               <a:rPr lang="en-US" smtClean="0"/>
               <a:pPr/>
-              <a:t>32</a:t>
+              <a:t>33</a:t>
             </a:fld>
             <a:endParaRPr lang="en-US" dirty="0"/>
           </a:p>
@@ -16190,7 +16814,7 @@
           <a:graphicData uri="http://schemas.openxmlformats.org/presentationml/2006/ole">
             <mc:AlternateContent xmlns:mc="http://schemas.openxmlformats.org/markup-compatibility/2006">
               <mc:Choice xmlns:v="urn:schemas-microsoft-com:vml" Requires="v">
-                <p:oleObj spid="_x0000_s447585" name="Equation" r:id="rId4" imgW="2514600" imgH="254000" progId="Equation.DSMT4">
+                <p:oleObj spid="_x0000_s447589" name="Equation" r:id="rId4" imgW="2514600" imgH="254000" progId="Equation.DSMT4">
                   <p:embed/>
                 </p:oleObj>
               </mc:Choice>
@@ -16478,7 +17102,7 @@
 </p:sld>
 </file>
 
-<file path=ppt/slides/slide33.xml><?xml version="1.0" encoding="utf-8"?>
+<file path=ppt/slides/slide34.xml><?xml version="1.0" encoding="utf-8"?>
 <p:sld xmlns:a="http://schemas.openxmlformats.org/drawingml/2006/main" xmlns:r="http://schemas.openxmlformats.org/officeDocument/2006/relationships" xmlns:p="http://schemas.openxmlformats.org/presentationml/2006/main">
   <p:cSld>
     <p:spTree>
@@ -16567,7 +17191,7 @@
             <a:fld id="{3251DA95-B240-47FE-901D-B78FC8E8E532}" type="slidenum">
               <a:rPr lang="en-US" smtClean="0"/>
               <a:pPr/>
-              <a:t>33</a:t>
+              <a:t>34</a:t>
             </a:fld>
             <a:endParaRPr lang="en-US" dirty="0"/>
           </a:p>
@@ -16595,7 +17219,7 @@
           <a:graphicData uri="http://schemas.openxmlformats.org/presentationml/2006/ole">
             <mc:AlternateContent xmlns:mc="http://schemas.openxmlformats.org/markup-compatibility/2006">
               <mc:Choice xmlns:v="urn:schemas-microsoft-com:vml" Requires="v">
-                <p:oleObj spid="_x0000_s449709" name="Equation" r:id="rId4" imgW="698500" imgH="254000" progId="Equation.DSMT4">
+                <p:oleObj spid="_x0000_s449716" name="Equation" r:id="rId4" imgW="698500" imgH="254000" progId="Equation.DSMT4">
                   <p:embed/>
                 </p:oleObj>
               </mc:Choice>
@@ -16652,7 +17276,7 @@
           <a:graphicData uri="http://schemas.openxmlformats.org/presentationml/2006/ole">
             <mc:AlternateContent xmlns:mc="http://schemas.openxmlformats.org/markup-compatibility/2006">
               <mc:Choice xmlns:v="urn:schemas-microsoft-com:vml" Requires="v">
-                <p:oleObj spid="_x0000_s449710" name="Equation" r:id="rId6" imgW="1651000" imgH="254000" progId="Equation.DSMT4">
+                <p:oleObj spid="_x0000_s449717" name="Equation" r:id="rId6" imgW="1651000" imgH="254000" progId="Equation.DSMT4">
                   <p:embed/>
                 </p:oleObj>
               </mc:Choice>
@@ -16946,7 +17570,7 @@
 </p:sld>
 </file>
 
-<file path=ppt/slides/slide34.xml><?xml version="1.0" encoding="utf-8"?>
+<file path=ppt/slides/slide35.xml><?xml version="1.0" encoding="utf-8"?>
 <p:sld xmlns:a="http://schemas.openxmlformats.org/drawingml/2006/main" xmlns:r="http://schemas.openxmlformats.org/officeDocument/2006/relationships" xmlns:p="http://schemas.openxmlformats.org/presentationml/2006/main">
   <p:cSld>
     <p:spTree>
@@ -17035,7 +17659,7 @@
             <a:fld id="{3251DA95-B240-47FE-901D-B78FC8E8E532}" type="slidenum">
               <a:rPr lang="en-US" smtClean="0"/>
               <a:pPr/>
-              <a:t>34</a:t>
+              <a:t>35</a:t>
             </a:fld>
             <a:endParaRPr lang="en-US" dirty="0"/>
           </a:p>
@@ -17063,7 +17687,7 @@
           <a:graphicData uri="http://schemas.openxmlformats.org/presentationml/2006/ole">
             <mc:AlternateContent xmlns:mc="http://schemas.openxmlformats.org/markup-compatibility/2006">
               <mc:Choice xmlns:v="urn:schemas-microsoft-com:vml" Requires="v">
-                <p:oleObj spid="_x0000_s507076" name="Equation" r:id="rId4" imgW="698500" imgH="254000" progId="Equation.DSMT4">
+                <p:oleObj spid="_x0000_s507086" name="Equation" r:id="rId4" imgW="698500" imgH="254000" progId="Equation.DSMT4">
                   <p:embed/>
                 </p:oleObj>
               </mc:Choice>
@@ -17120,7 +17744,7 @@
           <a:graphicData uri="http://schemas.openxmlformats.org/presentationml/2006/ole">
             <mc:AlternateContent xmlns:mc="http://schemas.openxmlformats.org/markup-compatibility/2006">
               <mc:Choice xmlns:v="urn:schemas-microsoft-com:vml" Requires="v">
-                <p:oleObj spid="_x0000_s507077" name="Equation" r:id="rId6" imgW="1651000" imgH="254000" progId="Equation.DSMT4">
+                <p:oleObj spid="_x0000_s507087" name="Equation" r:id="rId6" imgW="1651000" imgH="254000" progId="Equation.DSMT4">
                   <p:embed/>
                 </p:oleObj>
               </mc:Choice>
@@ -17177,7 +17801,7 @@
           <a:graphicData uri="http://schemas.openxmlformats.org/presentationml/2006/ole">
             <mc:AlternateContent xmlns:mc="http://schemas.openxmlformats.org/markup-compatibility/2006">
               <mc:Choice xmlns:v="urn:schemas-microsoft-com:vml" Requires="v">
-                <p:oleObj spid="_x0000_s507078" name="Equation" r:id="rId8" imgW="1333500" imgH="482600" progId="Equation.DSMT4">
+                <p:oleObj spid="_x0000_s507088" name="Equation" r:id="rId8" imgW="1333500" imgH="482600" progId="Equation.DSMT4">
                   <p:embed/>
                 </p:oleObj>
               </mc:Choice>
@@ -17358,7 +17982,7 @@
 </p:sld>
 </file>
 
-<file path=ppt/slides/slide35.xml><?xml version="1.0" encoding="utf-8"?>
+<file path=ppt/slides/slide36.xml><?xml version="1.0" encoding="utf-8"?>
 <p:sld xmlns:a="http://schemas.openxmlformats.org/drawingml/2006/main" xmlns:r="http://schemas.openxmlformats.org/officeDocument/2006/relationships" xmlns:p="http://schemas.openxmlformats.org/presentationml/2006/main">
   <p:cSld>
     <p:spTree>
@@ -17447,7 +18071,7 @@
             <a:fld id="{3251DA95-B240-47FE-901D-B78FC8E8E532}" type="slidenum">
               <a:rPr lang="en-US" smtClean="0"/>
               <a:pPr/>
-              <a:t>35</a:t>
+              <a:t>36</a:t>
             </a:fld>
             <a:endParaRPr lang="en-US" dirty="0"/>
           </a:p>
@@ -17475,7 +18099,7 @@
           <a:graphicData uri="http://schemas.openxmlformats.org/presentationml/2006/ole">
             <mc:AlternateContent xmlns:mc="http://schemas.openxmlformats.org/markup-compatibility/2006">
               <mc:Choice xmlns:v="urn:schemas-microsoft-com:vml" Requires="v">
-                <p:oleObj spid="_x0000_s508058" name="Equation" r:id="rId4" imgW="698500" imgH="254000" progId="Equation.DSMT4">
+                <p:oleObj spid="_x0000_s508065" name="Equation" r:id="rId4" imgW="698500" imgH="254000" progId="Equation.DSMT4">
                   <p:embed/>
                 </p:oleObj>
               </mc:Choice>
@@ -17532,7 +18156,7 @@
           <a:graphicData uri="http://schemas.openxmlformats.org/presentationml/2006/ole">
             <mc:AlternateContent xmlns:mc="http://schemas.openxmlformats.org/markup-compatibility/2006">
               <mc:Choice xmlns:v="urn:schemas-microsoft-com:vml" Requires="v">
-                <p:oleObj spid="_x0000_s508059" name="Equation" r:id="rId6" imgW="1333500" imgH="482600" progId="Equation.DSMT4">
+                <p:oleObj spid="_x0000_s508066" name="Equation" r:id="rId6" imgW="1333500" imgH="482600" progId="Equation.DSMT4">
                   <p:embed/>
                 </p:oleObj>
               </mc:Choice>
@@ -17893,7 +18517,7 @@
 </p:sld>
 </file>
 
-<file path=ppt/slides/slide36.xml><?xml version="1.0" encoding="utf-8"?>
+<file path=ppt/slides/slide37.xml><?xml version="1.0" encoding="utf-8"?>
 <p:sld xmlns:a="http://schemas.openxmlformats.org/drawingml/2006/main" xmlns:r="http://schemas.openxmlformats.org/officeDocument/2006/relationships" xmlns:p="http://schemas.openxmlformats.org/presentationml/2006/main">
   <p:cSld>
     <p:spTree>
@@ -17987,7 +18611,7 @@
             <a:fld id="{3251DA95-B240-47FE-901D-B78FC8E8E532}" type="slidenum">
               <a:rPr lang="en-US" smtClean="0"/>
               <a:pPr/>
-              <a:t>36</a:t>
+              <a:t>37</a:t>
             </a:fld>
             <a:endParaRPr lang="en-US" dirty="0"/>
           </a:p>
@@ -18015,7 +18639,7 @@
           <a:graphicData uri="http://schemas.openxmlformats.org/presentationml/2006/ole">
             <mc:AlternateContent xmlns:mc="http://schemas.openxmlformats.org/markup-compatibility/2006">
               <mc:Choice xmlns:v="urn:schemas-microsoft-com:vml" Requires="v">
-                <p:oleObj spid="_x0000_s522357" name="Equation" r:id="rId4" imgW="1600200" imgH="215900" progId="Equation.DSMT4">
+                <p:oleObj spid="_x0000_s522364" name="Equation" r:id="rId4" imgW="1600200" imgH="215900" progId="Equation.DSMT4">
                   <p:embed/>
                 </p:oleObj>
               </mc:Choice>
@@ -18072,7 +18696,7 @@
           <a:graphicData uri="http://schemas.openxmlformats.org/presentationml/2006/ole">
             <mc:AlternateContent xmlns:mc="http://schemas.openxmlformats.org/markup-compatibility/2006">
               <mc:Choice xmlns:v="urn:schemas-microsoft-com:vml" Requires="v">
-                <p:oleObj spid="_x0000_s522358" name="Equation" r:id="rId6" imgW="1397000" imgH="457200" progId="Equation.DSMT4">
+                <p:oleObj spid="_x0000_s522365" name="Equation" r:id="rId6" imgW="1397000" imgH="457200" progId="Equation.DSMT4">
                   <p:embed/>
                 </p:oleObj>
               </mc:Choice>
@@ -18409,7 +19033,7 @@
 </p:sld>
 </file>
 
-<file path=ppt/slides/slide37.xml><?xml version="1.0" encoding="utf-8"?>
+<file path=ppt/slides/slide38.xml><?xml version="1.0" encoding="utf-8"?>
 <p:sld xmlns:a="http://schemas.openxmlformats.org/drawingml/2006/main" xmlns:r="http://schemas.openxmlformats.org/officeDocument/2006/relationships" xmlns:p="http://schemas.openxmlformats.org/presentationml/2006/main">
   <p:cSld>
     <p:spTree>
@@ -18489,7 +19113,7 @@
             <a:fld id="{3251DA95-B240-47FE-901D-B78FC8E8E532}" type="slidenum">
               <a:rPr lang="en-US" smtClean="0"/>
               <a:pPr/>
-              <a:t>37</a:t>
+              <a:t>38</a:t>
             </a:fld>
             <a:endParaRPr lang="en-US" dirty="0"/>
           </a:p>
@@ -18517,7 +19141,7 @@
           <a:graphicData uri="http://schemas.openxmlformats.org/presentationml/2006/ole">
             <mc:AlternateContent xmlns:mc="http://schemas.openxmlformats.org/markup-compatibility/2006">
               <mc:Choice xmlns:v="urn:schemas-microsoft-com:vml" Requires="v">
-                <p:oleObj spid="_x0000_s461921" name="Equation" r:id="rId4" imgW="1333500" imgH="482600" progId="Equation.DSMT4">
+                <p:oleObj spid="_x0000_s461925" name="Equation" r:id="rId4" imgW="1333500" imgH="482600" progId="Equation.DSMT4">
                   <p:embed/>
                 </p:oleObj>
               </mc:Choice>
@@ -18647,7 +19271,7 @@
 </p:sld>
 </file>
 
-<file path=ppt/slides/slide38.xml><?xml version="1.0" encoding="utf-8"?>
+<file path=ppt/slides/slide39.xml><?xml version="1.0" encoding="utf-8"?>
 <p:sld xmlns:a="http://schemas.openxmlformats.org/drawingml/2006/main" xmlns:r="http://schemas.openxmlformats.org/officeDocument/2006/relationships" xmlns:p="http://schemas.openxmlformats.org/presentationml/2006/main">
   <p:cSld>
     <p:spTree>
@@ -18727,7 +19351,7 @@
             <a:fld id="{3251DA95-B240-47FE-901D-B78FC8E8E532}" type="slidenum">
               <a:rPr lang="en-US" smtClean="0"/>
               <a:pPr/>
-              <a:t>38</a:t>
+              <a:t>39</a:t>
             </a:fld>
             <a:endParaRPr lang="en-US" dirty="0"/>
           </a:p>
@@ -18755,7 +19379,7 @@
           <a:graphicData uri="http://schemas.openxmlformats.org/presentationml/2006/ole">
             <mc:AlternateContent xmlns:mc="http://schemas.openxmlformats.org/markup-compatibility/2006">
               <mc:Choice xmlns:v="urn:schemas-microsoft-com:vml" Requires="v">
-                <p:oleObj spid="_x0000_s523351" name="Equation" r:id="rId4" imgW="1333500" imgH="482600" progId="Equation.DSMT4">
+                <p:oleObj spid="_x0000_s523355" name="Equation" r:id="rId4" imgW="1333500" imgH="482600" progId="Equation.DSMT4">
                   <p:embed/>
                 </p:oleObj>
               </mc:Choice>
@@ -18939,7 +19563,7 @@
 </p:sld>
 </file>
 
-<file path=ppt/slides/slide39.xml><?xml version="1.0" encoding="utf-8"?>
+<file path=ppt/slides/slide4.xml><?xml version="1.0" encoding="utf-8"?>
 <p:sld xmlns:a="http://schemas.openxmlformats.org/drawingml/2006/main" xmlns:r="http://schemas.openxmlformats.org/officeDocument/2006/relationships" xmlns:p="http://schemas.openxmlformats.org/presentationml/2006/main">
   <p:cSld>
     <p:spTree>
@@ -18958,6 +19582,161 @@
       </p:grpSpPr>
       <p:sp>
         <p:nvSpPr>
+          <p:cNvPr id="2" name="Title 1"/>
+          <p:cNvSpPr>
+            <a:spLocks noGrp="1"/>
+          </p:cNvSpPr>
+          <p:nvPr>
+            <p:ph type="title"/>
+          </p:nvPr>
+        </p:nvSpPr>
+        <p:spPr/>
+        <p:txBody>
+          <a:bodyPr/>
+          <a:lstStyle/>
+          <a:p>
+            <a:r>
+              <a:rPr lang="en-US" sz="4000" dirty="0" smtClean="0"/>
+              <a:t>Strategy: Convert to DNF</a:t>
+            </a:r>
+            <a:endParaRPr lang="en-US" sz="4000" dirty="0"/>
+          </a:p>
+        </p:txBody>
+      </p:sp>
+      <p:sp>
+        <p:nvSpPr>
+          <p:cNvPr id="3" name="Slide Number Placeholder 2"/>
+          <p:cNvSpPr>
+            <a:spLocks noGrp="1"/>
+          </p:cNvSpPr>
+          <p:nvPr>
+            <p:ph type="sldNum" sz="quarter" idx="10"/>
+          </p:nvPr>
+        </p:nvSpPr>
+        <p:spPr/>
+        <p:txBody>
+          <a:bodyPr/>
+          <a:lstStyle/>
+          <a:p>
+            <a:pPr>
+              <a:defRPr/>
+            </a:pPr>
+            <a:r>
+              <a:rPr lang="en-US" smtClean="0"/>
+              <a:t>propositional algebra.</a:t>
+            </a:r>
+            <a:fld id="{DB6F0ED6-FEF5-4C9C-B1CC-29B47EC66FAA}" type="slidenum">
+              <a:rPr lang="en-US" smtClean="0"/>
+              <a:pPr>
+                <a:defRPr/>
+              </a:pPr>
+              <a:t>4</a:t>
+            </a:fld>
+            <a:endParaRPr lang="en-US" dirty="0"/>
+          </a:p>
+        </p:txBody>
+      </p:sp>
+      <p:sp>
+        <p:nvSpPr>
+          <p:cNvPr id="4" name="TextBox 3"/>
+          <p:cNvSpPr txBox="1"/>
+          <p:nvPr/>
+        </p:nvSpPr>
+        <p:spPr>
+          <a:xfrm>
+            <a:off x="302368" y="1346200"/>
+            <a:ext cx="8574932" cy="4524315"/>
+          </a:xfrm>
+          <a:prstGeom prst="rect">
+            <a:avLst/>
+          </a:prstGeom>
+          <a:noFill/>
+        </p:spPr>
+        <p:txBody>
+          <a:bodyPr wrap="square" rtlCol="0">
+            <a:spAutoFit/>
+          </a:bodyPr>
+          <a:lstStyle/>
+          <a:p>
+            <a:pPr algn="l"/>
+            <a:r>
+              <a:rPr lang="en-US" sz="4800" dirty="0" smtClean="0">
+                <a:latin typeface="Comic Sans MS" pitchFamily="66" charset="0"/>
+              </a:rPr>
+              <a:t>Come up with enough equivalence rules to convert any formula to an equivalent canonical DNF.  Two formulas are </a:t>
+            </a:r>
+            <a:r>
+              <a:rPr lang="en-US" sz="4800" dirty="0" err="1" smtClean="0">
+                <a:latin typeface="Comic Sans MS" pitchFamily="66" charset="0"/>
+              </a:rPr>
+              <a:t>equiv</a:t>
+            </a:r>
+            <a:r>
+              <a:rPr lang="en-US" sz="4800" dirty="0">
+                <a:latin typeface="Comic Sans MS" pitchFamily="66" charset="0"/>
+              </a:rPr>
+              <a:t> </a:t>
+            </a:r>
+            <a:r>
+              <a:rPr lang="en-US" sz="4800" dirty="0" smtClean="0">
+                <a:latin typeface="Comic Sans MS" pitchFamily="66" charset="0"/>
+              </a:rPr>
+              <a:t>when convert to same canonical DNF.</a:t>
+            </a:r>
+          </a:p>
+        </p:txBody>
+      </p:sp>
+    </p:spTree>
+    <p:extLst>
+      <p:ext uri="{BB962C8B-B14F-4D97-AF65-F5344CB8AC3E}">
+        <p14:creationId xmlns:p14="http://schemas.microsoft.com/office/powerpoint/2010/main" val="279241386"/>
+      </p:ext>
+    </p:extLst>
+  </p:cSld>
+  <p:clrMapOvr>
+    <a:masterClrMapping/>
+  </p:clrMapOvr>
+  <mc:AlternateContent xmlns:mc="http://schemas.openxmlformats.org/markup-compatibility/2006" xmlns:p14="http://schemas.microsoft.com/office/powerpoint/2010/main">
+    <mc:Choice Requires="p14">
+      <p:transition spd="med" p14:dur="700" advClick="0">
+        <p:fade/>
+      </p:transition>
+    </mc:Choice>
+    <mc:Fallback xmlns="">
+      <p:transition xmlns:p14="http://schemas.microsoft.com/office/powerpoint/2010/main" spd="med" advClick="0">
+        <p:fade/>
+      </p:transition>
+    </mc:Fallback>
+  </mc:AlternateContent>
+  <p:timing>
+    <p:tnLst>
+      <p:par>
+        <p:cTn xmlns:p14="http://schemas.microsoft.com/office/powerpoint/2010/main" id="1" dur="indefinite" restart="never" nodeType="tmRoot"/>
+      </p:par>
+    </p:tnLst>
+  </p:timing>
+</p:sld>
+</file>
+
+<file path=ppt/slides/slide40.xml><?xml version="1.0" encoding="utf-8"?>
+<p:sld xmlns:a="http://schemas.openxmlformats.org/drawingml/2006/main" xmlns:r="http://schemas.openxmlformats.org/officeDocument/2006/relationships" xmlns:p="http://schemas.openxmlformats.org/presentationml/2006/main">
+  <p:cSld>
+    <p:spTree>
+      <p:nvGrpSpPr>
+        <p:cNvPr id="1" name=""/>
+        <p:cNvGrpSpPr/>
+        <p:nvPr/>
+      </p:nvGrpSpPr>
+      <p:grpSpPr>
+        <a:xfrm>
+          <a:off x="0" y="0"/>
+          <a:ext cx="0" cy="0"/>
+          <a:chOff x="0" y="0"/>
+          <a:chExt cx="0" cy="0"/>
+        </a:xfrm>
+      </p:grpSpPr>
+      <p:sp>
+        <p:nvSpPr>
           <p:cNvPr id="8" name="Title 1"/>
           <p:cNvSpPr>
             <a:spLocks noGrp="1"/>
@@ -19019,7 +19798,7 @@
             <a:fld id="{3251DA95-B240-47FE-901D-B78FC8E8E532}" type="slidenum">
               <a:rPr lang="en-US" smtClean="0"/>
               <a:pPr/>
-              <a:t>39</a:t>
+              <a:t>40</a:t>
             </a:fld>
             <a:endParaRPr lang="en-US" dirty="0"/>
           </a:p>
@@ -19047,7 +19826,7 @@
           <a:graphicData uri="http://schemas.openxmlformats.org/presentationml/2006/ole">
             <mc:AlternateContent xmlns:mc="http://schemas.openxmlformats.org/markup-compatibility/2006">
               <mc:Choice xmlns:v="urn:schemas-microsoft-com:vml" Requires="v">
-                <p:oleObj spid="_x0000_s542782" name="Equation" r:id="rId4" imgW="1333500" imgH="482600" progId="Equation.DSMT4">
+                <p:oleObj spid="_x0000_s542786" name="Equation" r:id="rId4" imgW="1333500" imgH="482600" progId="Equation.DSMT4">
                   <p:embed/>
                 </p:oleObj>
               </mc:Choice>
@@ -19114,7 +19893,7 @@
 </p:sld>
 </file>
 
-<file path=ppt/slides/slide4.xml><?xml version="1.0" encoding="utf-8"?>
+<file path=ppt/slides/slide41.xml><?xml version="1.0" encoding="utf-8"?>
 <p:sld xmlns:a="http://schemas.openxmlformats.org/drawingml/2006/main" xmlns:r="http://schemas.openxmlformats.org/officeDocument/2006/relationships" xmlns:p="http://schemas.openxmlformats.org/presentationml/2006/main">
   <p:cSld>
     <p:spTree>
@@ -19133,185 +19912,6 @@
       </p:grpSpPr>
       <p:sp>
         <p:nvSpPr>
-          <p:cNvPr id="2" name="Title 1"/>
-          <p:cNvSpPr>
-            <a:spLocks noGrp="1"/>
-          </p:cNvSpPr>
-          <p:nvPr>
-            <p:ph type="title"/>
-          </p:nvPr>
-        </p:nvSpPr>
-        <p:spPr/>
-        <p:txBody>
-          <a:bodyPr/>
-          <a:lstStyle/>
-          <a:p>
-            <a:r>
-              <a:rPr lang="en-US" sz="4000" dirty="0" smtClean="0"/>
-              <a:t>Strategy: Convert to DNF</a:t>
-            </a:r>
-            <a:endParaRPr lang="en-US" sz="4000" dirty="0"/>
-          </a:p>
-        </p:txBody>
-      </p:sp>
-      <p:sp>
-        <p:nvSpPr>
-          <p:cNvPr id="3" name="Slide Number Placeholder 2"/>
-          <p:cNvSpPr>
-            <a:spLocks noGrp="1"/>
-          </p:cNvSpPr>
-          <p:nvPr>
-            <p:ph type="sldNum" sz="quarter" idx="10"/>
-          </p:nvPr>
-        </p:nvSpPr>
-        <p:spPr/>
-        <p:txBody>
-          <a:bodyPr/>
-          <a:lstStyle/>
-          <a:p>
-            <a:pPr>
-              <a:defRPr/>
-            </a:pPr>
-            <a:r>
-              <a:rPr lang="en-US" smtClean="0"/>
-              <a:t>propositional algebra.</a:t>
-            </a:r>
-            <a:fld id="{DB6F0ED6-FEF5-4C9C-B1CC-29B47EC66FAA}" type="slidenum">
-              <a:rPr lang="en-US" smtClean="0"/>
-              <a:pPr>
-                <a:defRPr/>
-              </a:pPr>
-              <a:t>4</a:t>
-            </a:fld>
-            <a:endParaRPr lang="en-US" dirty="0"/>
-          </a:p>
-        </p:txBody>
-      </p:sp>
-      <p:sp>
-        <p:nvSpPr>
-          <p:cNvPr id="4" name="TextBox 3"/>
-          <p:cNvSpPr txBox="1"/>
-          <p:nvPr/>
-        </p:nvSpPr>
-        <p:spPr>
-          <a:xfrm>
-            <a:off x="302368" y="1346200"/>
-            <a:ext cx="8574932" cy="4524315"/>
-          </a:xfrm>
-          <a:prstGeom prst="rect">
-            <a:avLst/>
-          </a:prstGeom>
-          <a:noFill/>
-        </p:spPr>
-        <p:txBody>
-          <a:bodyPr wrap="square" rtlCol="0">
-            <a:spAutoFit/>
-          </a:bodyPr>
-          <a:lstStyle/>
-          <a:p>
-            <a:pPr algn="l"/>
-            <a:r>
-              <a:rPr lang="en-US" sz="4800" dirty="0" smtClean="0">
-                <a:latin typeface="Comic Sans MS" pitchFamily="66" charset="0"/>
-              </a:rPr>
-              <a:t>Come up with enough equivalence rules to convert any formula to an equivalent </a:t>
-            </a:r>
-            <a:r>
-              <a:rPr lang="en-US" sz="4800" dirty="0" smtClean="0">
-                <a:latin typeface="Comic Sans MS" pitchFamily="66" charset="0"/>
-              </a:rPr>
-              <a:t>canonical DNF.  Two </a:t>
-            </a:r>
-            <a:r>
-              <a:rPr lang="en-US" sz="4800" dirty="0" smtClean="0">
-                <a:latin typeface="Comic Sans MS" pitchFamily="66" charset="0"/>
-              </a:rPr>
-              <a:t>formulas are </a:t>
-            </a:r>
-            <a:r>
-              <a:rPr lang="en-US" sz="4800" dirty="0" err="1" smtClean="0">
-                <a:latin typeface="Comic Sans MS" pitchFamily="66" charset="0"/>
-              </a:rPr>
-              <a:t>equiv</a:t>
-            </a:r>
-            <a:r>
-              <a:rPr lang="en-US" sz="4800" dirty="0">
-                <a:latin typeface="Comic Sans MS" pitchFamily="66" charset="0"/>
-              </a:rPr>
-              <a:t> </a:t>
-            </a:r>
-            <a:r>
-              <a:rPr lang="en-US" sz="4800" dirty="0" smtClean="0">
-                <a:latin typeface="Comic Sans MS" pitchFamily="66" charset="0"/>
-              </a:rPr>
-              <a:t>when convert to </a:t>
-            </a:r>
-            <a:r>
-              <a:rPr lang="en-US" sz="4800" dirty="0" smtClean="0">
-                <a:latin typeface="Comic Sans MS" pitchFamily="66" charset="0"/>
-              </a:rPr>
-              <a:t>same canonical </a:t>
-            </a:r>
-            <a:r>
-              <a:rPr lang="en-US" sz="4800" dirty="0" smtClean="0">
-                <a:latin typeface="Comic Sans MS" pitchFamily="66" charset="0"/>
-              </a:rPr>
-              <a:t>DNF.</a:t>
-            </a:r>
-          </a:p>
-        </p:txBody>
-      </p:sp>
-    </p:spTree>
-    <p:extLst>
-      <p:ext uri="{BB962C8B-B14F-4D97-AF65-F5344CB8AC3E}">
-        <p14:creationId xmlns:p14="http://schemas.microsoft.com/office/powerpoint/2010/main" val="279241386"/>
-      </p:ext>
-    </p:extLst>
-  </p:cSld>
-  <p:clrMapOvr>
-    <a:masterClrMapping/>
-  </p:clrMapOvr>
-  <mc:AlternateContent xmlns:mc="http://schemas.openxmlformats.org/markup-compatibility/2006" xmlns:p14="http://schemas.microsoft.com/office/powerpoint/2010/main">
-    <mc:Choice Requires="p14">
-      <p:transition spd="med" p14:dur="700" advClick="0">
-        <p:fade/>
-      </p:transition>
-    </mc:Choice>
-    <mc:Fallback xmlns="">
-      <p:transition xmlns:p14="http://schemas.microsoft.com/office/powerpoint/2010/main" spd="med" advClick="0">
-        <p:fade/>
-      </p:transition>
-    </mc:Fallback>
-  </mc:AlternateContent>
-  <p:timing>
-    <p:tnLst>
-      <p:par>
-        <p:cTn xmlns:p14="http://schemas.microsoft.com/office/powerpoint/2010/main" id="1" dur="indefinite" restart="never" nodeType="tmRoot"/>
-      </p:par>
-    </p:tnLst>
-  </p:timing>
-</p:sld>
-</file>
-
-<file path=ppt/slides/slide40.xml><?xml version="1.0" encoding="utf-8"?>
-<p:sld xmlns:a="http://schemas.openxmlformats.org/drawingml/2006/main" xmlns:r="http://schemas.openxmlformats.org/officeDocument/2006/relationships" xmlns:p="http://schemas.openxmlformats.org/presentationml/2006/main">
-  <p:cSld>
-    <p:spTree>
-      <p:nvGrpSpPr>
-        <p:cNvPr id="1" name=""/>
-        <p:cNvGrpSpPr/>
-        <p:nvPr/>
-      </p:nvGrpSpPr>
-      <p:grpSpPr>
-        <a:xfrm>
-          <a:off x="0" y="0"/>
-          <a:ext cx="0" cy="0"/>
-          <a:chOff x="0" y="0"/>
-          <a:chExt cx="0" cy="0"/>
-        </a:xfrm>
-      </p:grpSpPr>
-      <p:sp>
-        <p:nvSpPr>
           <p:cNvPr id="9" name="Title 4"/>
           <p:cNvSpPr>
             <a:spLocks noGrp="1"/>
@@ -19377,7 +19977,7 @@
             <a:fld id="{3251DA95-B240-47FE-901D-B78FC8E8E532}" type="slidenum">
               <a:rPr lang="en-US" smtClean="0"/>
               <a:pPr/>
-              <a:t>40</a:t>
+              <a:t>41</a:t>
             </a:fld>
             <a:endParaRPr lang="en-US" dirty="0"/>
           </a:p>
@@ -19405,7 +20005,7 @@
           <a:graphicData uri="http://schemas.openxmlformats.org/presentationml/2006/ole">
             <mc:AlternateContent xmlns:mc="http://schemas.openxmlformats.org/markup-compatibility/2006">
               <mc:Choice xmlns:v="urn:schemas-microsoft-com:vml" Requires="v">
-                <p:oleObj spid="_x0000_s544873" name="Equation" r:id="rId4" imgW="1333500" imgH="482600" progId="Equation.DSMT4">
+                <p:oleObj spid="_x0000_s544880" name="Equation" r:id="rId4" imgW="1333500" imgH="482600" progId="Equation.DSMT4">
                   <p:embed/>
                 </p:oleObj>
               </mc:Choice>
@@ -19525,7 +20125,7 @@
           <a:graphicData uri="http://schemas.openxmlformats.org/presentationml/2006/ole">
             <mc:AlternateContent xmlns:mc="http://schemas.openxmlformats.org/markup-compatibility/2006">
               <mc:Choice xmlns:v="urn:schemas-microsoft-com:vml" Requires="v">
-                <p:oleObj spid="_x0000_s544874" name="Equation" r:id="rId6" imgW="698500" imgH="254000" progId="Equation.DSMT4">
+                <p:oleObj spid="_x0000_s544881" name="Equation" r:id="rId6" imgW="698500" imgH="254000" progId="Equation.DSMT4">
                   <p:embed/>
                 </p:oleObj>
               </mc:Choice>
@@ -19754,7 +20354,7 @@
 </p:sld>
 </file>
 
-<file path=ppt/slides/slide41.xml><?xml version="1.0" encoding="utf-8"?>
+<file path=ppt/slides/slide42.xml><?xml version="1.0" encoding="utf-8"?>
 <p:sld xmlns:a="http://schemas.openxmlformats.org/drawingml/2006/main" xmlns:r="http://schemas.openxmlformats.org/officeDocument/2006/relationships" xmlns:p="http://schemas.openxmlformats.org/presentationml/2006/main">
   <p:cSld>
     <p:spTree>
@@ -19834,7 +20434,7 @@
             <a:fld id="{3251DA95-B240-47FE-901D-B78FC8E8E532}" type="slidenum">
               <a:rPr lang="en-US" smtClean="0"/>
               <a:pPr/>
-              <a:t>41</a:t>
+              <a:t>42</a:t>
             </a:fld>
             <a:endParaRPr lang="en-US" dirty="0"/>
           </a:p>
@@ -19978,7 +20578,7 @@
           <a:graphicData uri="http://schemas.openxmlformats.org/presentationml/2006/ole">
             <mc:AlternateContent xmlns:mc="http://schemas.openxmlformats.org/markup-compatibility/2006">
               <mc:Choice xmlns:v="urn:schemas-microsoft-com:vml" Requires="v">
-                <p:oleObj spid="_x0000_s525495" name="Equation" r:id="rId4" imgW="1333500" imgH="482600" progId="Equation.DSMT4">
+                <p:oleObj spid="_x0000_s525505" name="Equation" r:id="rId4" imgW="1333500" imgH="482600" progId="Equation.DSMT4">
                   <p:embed/>
                 </p:oleObj>
               </mc:Choice>
@@ -20070,7 +20670,7 @@
           <a:graphicData uri="http://schemas.openxmlformats.org/presentationml/2006/ole">
             <mc:AlternateContent xmlns:mc="http://schemas.openxmlformats.org/markup-compatibility/2006">
               <mc:Choice xmlns:v="urn:schemas-microsoft-com:vml" Requires="v">
-                <p:oleObj spid="_x0000_s525496" name="Equation" r:id="rId6" imgW="1333500" imgH="482600" progId="Equation.DSMT4">
+                <p:oleObj spid="_x0000_s525506" name="Equation" r:id="rId6" imgW="1333500" imgH="482600" progId="Equation.DSMT4">
                   <p:embed/>
                 </p:oleObj>
               </mc:Choice>
@@ -20127,7 +20727,7 @@
           <a:graphicData uri="http://schemas.openxmlformats.org/presentationml/2006/ole">
             <mc:AlternateContent xmlns:mc="http://schemas.openxmlformats.org/markup-compatibility/2006">
               <mc:Choice xmlns:v="urn:schemas-microsoft-com:vml" Requires="v">
-                <p:oleObj spid="_x0000_s525497" name="Equation" r:id="rId8" imgW="1371600" imgH="482600" progId="Equation.DSMT4">
+                <p:oleObj spid="_x0000_s525507" name="Equation" r:id="rId8" imgW="1371600" imgH="482600" progId="Equation.DSMT4">
                   <p:embed/>
                 </p:oleObj>
               </mc:Choice>
@@ -20662,7 +21262,7 @@
 </p:sld>
 </file>
 
-<file path=ppt/slides/slide42.xml><?xml version="1.0" encoding="utf-8"?>
+<file path=ppt/slides/slide43.xml><?xml version="1.0" encoding="utf-8"?>
 <p:sld xmlns:a="http://schemas.openxmlformats.org/drawingml/2006/main" xmlns:r="http://schemas.openxmlformats.org/officeDocument/2006/relationships" xmlns:p="http://schemas.openxmlformats.org/presentationml/2006/main">
   <p:cSld>
     <p:spTree>
@@ -20701,7 +21301,7 @@
           <a:graphicData uri="http://schemas.openxmlformats.org/presentationml/2006/ole">
             <mc:AlternateContent xmlns:mc="http://schemas.openxmlformats.org/markup-compatibility/2006">
               <mc:Choice xmlns:v="urn:schemas-microsoft-com:vml" Requires="v">
-                <p:oleObj spid="_x0000_s632907" name="Equation" r:id="rId4" imgW="1371600" imgH="482600" progId="Equation.DSMT4">
+                <p:oleObj spid="_x0000_s632917" name="Equation" r:id="rId4" imgW="1371600" imgH="482600" progId="Equation.DSMT4">
                   <p:embed/>
                 </p:oleObj>
               </mc:Choice>
@@ -20799,7 +21399,7 @@
             <a:fld id="{3251DA95-B240-47FE-901D-B78FC8E8E532}" type="slidenum">
               <a:rPr lang="en-US" smtClean="0"/>
               <a:pPr/>
-              <a:t>42</a:t>
+              <a:t>43</a:t>
             </a:fld>
             <a:endParaRPr lang="en-US" dirty="0"/>
           </a:p>
@@ -20827,7 +21427,7 @@
           <a:graphicData uri="http://schemas.openxmlformats.org/presentationml/2006/ole">
             <mc:AlternateContent xmlns:mc="http://schemas.openxmlformats.org/markup-compatibility/2006">
               <mc:Choice xmlns:v="urn:schemas-microsoft-com:vml" Requires="v">
-                <p:oleObj spid="_x0000_s632908" name="Equation" r:id="rId6" imgW="1333500" imgH="482600" progId="Equation.DSMT4">
+                <p:oleObj spid="_x0000_s632918" name="Equation" r:id="rId6" imgW="1333500" imgH="482600" progId="Equation.DSMT4">
                   <p:embed/>
                 </p:oleObj>
               </mc:Choice>
@@ -20919,7 +21519,7 @@
           <a:graphicData uri="http://schemas.openxmlformats.org/presentationml/2006/ole">
             <mc:AlternateContent xmlns:mc="http://schemas.openxmlformats.org/markup-compatibility/2006">
               <mc:Choice xmlns:v="urn:schemas-microsoft-com:vml" Requires="v">
-                <p:oleObj spid="_x0000_s632909" name="Equation" r:id="rId8" imgW="1333500" imgH="482600" progId="Equation.DSMT4">
+                <p:oleObj spid="_x0000_s632919" name="Equation" r:id="rId8" imgW="1333500" imgH="482600" progId="Equation.DSMT4">
                   <p:embed/>
                 </p:oleObj>
               </mc:Choice>
@@ -21062,7 +21662,7 @@
 </p:sld>
 </file>
 
-<file path=ppt/slides/slide43.xml><?xml version="1.0" encoding="utf-8"?>
+<file path=ppt/slides/slide44.xml><?xml version="1.0" encoding="utf-8"?>
 <p:sld xmlns:a="http://schemas.openxmlformats.org/drawingml/2006/main" xmlns:r="http://schemas.openxmlformats.org/officeDocument/2006/relationships" xmlns:p="http://schemas.openxmlformats.org/presentationml/2006/main">
   <p:cSld>
     <p:spTree>
@@ -21101,7 +21701,7 @@
           <a:graphicData uri="http://schemas.openxmlformats.org/presentationml/2006/ole">
             <mc:AlternateContent xmlns:mc="http://schemas.openxmlformats.org/markup-compatibility/2006">
               <mc:Choice xmlns:v="urn:schemas-microsoft-com:vml" Requires="v">
-                <p:oleObj spid="_x0000_s628837" name="Equation" r:id="rId4" imgW="1371600" imgH="482600" progId="Equation.DSMT4">
+                <p:oleObj spid="_x0000_s628847" name="Equation" r:id="rId4" imgW="1371600" imgH="482600" progId="Equation.DSMT4">
                   <p:embed/>
                 </p:oleObj>
               </mc:Choice>
@@ -21199,7 +21799,7 @@
             <a:fld id="{3251DA95-B240-47FE-901D-B78FC8E8E532}" type="slidenum">
               <a:rPr lang="en-US" smtClean="0"/>
               <a:pPr/>
-              <a:t>43</a:t>
+              <a:t>44</a:t>
             </a:fld>
             <a:endParaRPr lang="en-US" dirty="0"/>
           </a:p>
@@ -21227,7 +21827,7 @@
           <a:graphicData uri="http://schemas.openxmlformats.org/presentationml/2006/ole">
             <mc:AlternateContent xmlns:mc="http://schemas.openxmlformats.org/markup-compatibility/2006">
               <mc:Choice xmlns:v="urn:schemas-microsoft-com:vml" Requires="v">
-                <p:oleObj spid="_x0000_s628838" name="Equation" r:id="rId6" imgW="1333500" imgH="482600" progId="Equation.DSMT4">
+                <p:oleObj spid="_x0000_s628848" name="Equation" r:id="rId6" imgW="1333500" imgH="482600" progId="Equation.DSMT4">
                   <p:embed/>
                 </p:oleObj>
               </mc:Choice>
@@ -21319,7 +21919,7 @@
           <a:graphicData uri="http://schemas.openxmlformats.org/presentationml/2006/ole">
             <mc:AlternateContent xmlns:mc="http://schemas.openxmlformats.org/markup-compatibility/2006">
               <mc:Choice xmlns:v="urn:schemas-microsoft-com:vml" Requires="v">
-                <p:oleObj spid="_x0000_s628839" name="Equation" r:id="rId8" imgW="1333500" imgH="482600" progId="Equation.DSMT4">
+                <p:oleObj spid="_x0000_s628849" name="Equation" r:id="rId8" imgW="1333500" imgH="482600" progId="Equation.DSMT4">
                   <p:embed/>
                 </p:oleObj>
               </mc:Choice>
@@ -21704,7 +22304,7 @@
 </p:sld>
 </file>
 
-<file path=ppt/slides/slide44.xml><?xml version="1.0" encoding="utf-8"?>
+<file path=ppt/slides/slide45.xml><?xml version="1.0" encoding="utf-8"?>
 <p:sld xmlns:a="http://schemas.openxmlformats.org/drawingml/2006/main" xmlns:r="http://schemas.openxmlformats.org/officeDocument/2006/relationships" xmlns:p="http://schemas.openxmlformats.org/presentationml/2006/main">
   <p:cSld>
     <p:spTree>
@@ -21784,7 +22384,7 @@
             <a:fld id="{3251DA95-B240-47FE-901D-B78FC8E8E532}" type="slidenum">
               <a:rPr lang="en-US" smtClean="0"/>
               <a:pPr/>
-              <a:t>44</a:t>
+              <a:t>45</a:t>
             </a:fld>
             <a:endParaRPr lang="en-US" dirty="0"/>
           </a:p>
@@ -21812,7 +22412,7 @@
           <a:graphicData uri="http://schemas.openxmlformats.org/presentationml/2006/ole">
             <mc:AlternateContent xmlns:mc="http://schemas.openxmlformats.org/markup-compatibility/2006">
               <mc:Choice xmlns:v="urn:schemas-microsoft-com:vml" Requires="v">
-                <p:oleObj spid="_x0000_s637003" name="Equation" r:id="rId4" imgW="1333500" imgH="482600" progId="Equation.DSMT4">
+                <p:oleObj spid="_x0000_s637013" name="Equation" r:id="rId4" imgW="1333500" imgH="482600" progId="Equation.DSMT4">
                   <p:embed/>
                 </p:oleObj>
               </mc:Choice>
@@ -21904,7 +22504,7 @@
           <a:graphicData uri="http://schemas.openxmlformats.org/presentationml/2006/ole">
             <mc:AlternateContent xmlns:mc="http://schemas.openxmlformats.org/markup-compatibility/2006">
               <mc:Choice xmlns:v="urn:schemas-microsoft-com:vml" Requires="v">
-                <p:oleObj spid="_x0000_s637004" name="Equation" r:id="rId6" imgW="1181100" imgH="508000" progId="Equation.DSMT4">
+                <p:oleObj spid="_x0000_s637014" name="Equation" r:id="rId6" imgW="1181100" imgH="508000" progId="Equation.DSMT4">
                   <p:embed/>
                 </p:oleObj>
               </mc:Choice>
@@ -21961,7 +22561,7 @@
           <a:graphicData uri="http://schemas.openxmlformats.org/presentationml/2006/ole">
             <mc:AlternateContent xmlns:mc="http://schemas.openxmlformats.org/markup-compatibility/2006">
               <mc:Choice xmlns:v="urn:schemas-microsoft-com:vml" Requires="v">
-                <p:oleObj spid="_x0000_s637005" name="Equation" r:id="rId8" imgW="1181100" imgH="254000" progId="Equation.DSMT4">
+                <p:oleObj spid="_x0000_s637015" name="Equation" r:id="rId8" imgW="1181100" imgH="254000" progId="Equation.DSMT4">
                   <p:embed/>
                 </p:oleObj>
               </mc:Choice>
@@ -22245,7 +22845,7 @@
 </p:sld>
 </file>
 
-<file path=ppt/slides/slide45.xml><?xml version="1.0" encoding="utf-8"?>
+<file path=ppt/slides/slide46.xml><?xml version="1.0" encoding="utf-8"?>
 <p:sld xmlns:a="http://schemas.openxmlformats.org/drawingml/2006/main" xmlns:r="http://schemas.openxmlformats.org/officeDocument/2006/relationships" xmlns:p="http://schemas.openxmlformats.org/presentationml/2006/main">
   <p:cSld>
     <p:spTree>
@@ -22289,7 +22889,7 @@
             <a:fld id="{3251DA95-B240-47FE-901D-B78FC8E8E532}" type="slidenum">
               <a:rPr lang="en-US" smtClean="0"/>
               <a:pPr/>
-              <a:t>45</a:t>
+              <a:t>46</a:t>
             </a:fld>
             <a:endParaRPr lang="en-US" dirty="0"/>
           </a:p>
@@ -22317,7 +22917,7 @@
           <a:graphicData uri="http://schemas.openxmlformats.org/presentationml/2006/ole">
             <mc:AlternateContent xmlns:mc="http://schemas.openxmlformats.org/markup-compatibility/2006">
               <mc:Choice xmlns:v="urn:schemas-microsoft-com:vml" Requires="v">
-                <p:oleObj spid="_x0000_s638994" name="Equation" r:id="rId4" imgW="2679700" imgH="482600" progId="Equation.DSMT4">
+                <p:oleObj spid="_x0000_s638998" name="Equation" r:id="rId4" imgW="2679700" imgH="482600" progId="Equation.DSMT4">
                   <p:embed/>
                 </p:oleObj>
               </mc:Choice>
@@ -23081,7 +23681,7 @@
 </p:sld>
 </file>
 
-<file path=ppt/slides/slide46.xml><?xml version="1.0" encoding="utf-8"?>
+<file path=ppt/slides/slide47.xml><?xml version="1.0" encoding="utf-8"?>
 <p:sld xmlns:a="http://schemas.openxmlformats.org/drawingml/2006/main" xmlns:r="http://schemas.openxmlformats.org/officeDocument/2006/relationships" xmlns:p="http://schemas.openxmlformats.org/presentationml/2006/main">
   <p:cSld>
     <p:spTree>
@@ -23293,7 +23893,7 @@
             <a:fld id="{3251DA95-B240-47FE-901D-B78FC8E8E532}" type="slidenum">
               <a:rPr lang="en-US" smtClean="0"/>
               <a:pPr/>
-              <a:t>46</a:t>
+              <a:t>47</a:t>
             </a:fld>
             <a:endParaRPr lang="en-US" dirty="0"/>
           </a:p>
@@ -23449,169 +24049,6 @@
 </p:sld>
 </file>
 
-<file path=ppt/slides/slide47.xml><?xml version="1.0" encoding="utf-8"?>
-<p:sld xmlns:a="http://schemas.openxmlformats.org/drawingml/2006/main" xmlns:r="http://schemas.openxmlformats.org/officeDocument/2006/relationships" xmlns:p="http://schemas.openxmlformats.org/presentationml/2006/main">
-  <p:cSld>
-    <p:spTree>
-      <p:nvGrpSpPr>
-        <p:cNvPr id="1" name=""/>
-        <p:cNvGrpSpPr/>
-        <p:nvPr/>
-      </p:nvGrpSpPr>
-      <p:grpSpPr>
-        <a:xfrm>
-          <a:off x="0" y="0"/>
-          <a:ext cx="0" cy="0"/>
-          <a:chOff x="0" y="0"/>
-          <a:chExt cx="0" cy="0"/>
-        </a:xfrm>
-      </p:grpSpPr>
-      <p:sp>
-        <p:nvSpPr>
-          <p:cNvPr id="5" name="TextBox 4"/>
-          <p:cNvSpPr txBox="1"/>
-          <p:nvPr/>
-        </p:nvSpPr>
-        <p:spPr>
-          <a:xfrm>
-            <a:off x="249243" y="1847840"/>
-            <a:ext cx="8985240" cy="1754327"/>
-          </a:xfrm>
-          <a:prstGeom prst="rect">
-            <a:avLst/>
-          </a:prstGeom>
-          <a:noFill/>
-        </p:spPr>
-        <p:txBody>
-          <a:bodyPr wrap="square" rtlCol="0">
-            <a:spAutoFit/>
-          </a:bodyPr>
-          <a:lstStyle/>
-          <a:p>
-            <a:pPr algn="l"/>
-            <a:r>
-              <a:rPr lang="en-US" sz="5400" dirty="0" smtClean="0">
-                <a:solidFill>
-                  <a:srgbClr val="000000"/>
-                </a:solidFill>
-                <a:latin typeface="Comic Sans MS" pitchFamily="66" charset="0"/>
-              </a:rPr>
-              <a:t>Because two formulas are</a:t>
-            </a:r>
-          </a:p>
-          <a:p>
-            <a:pPr algn="l"/>
-            <a:r>
-              <a:rPr lang="en-US" sz="5400" dirty="0" smtClean="0">
-                <a:solidFill>
-                  <a:srgbClr val="000000"/>
-                </a:solidFill>
-                <a:latin typeface="Comic Sans MS" pitchFamily="66" charset="0"/>
-              </a:rPr>
-              <a:t>equivalent </a:t>
-            </a:r>
-            <a:endParaRPr lang="en-US" sz="5400" dirty="0">
-              <a:solidFill>
-                <a:srgbClr val="000000"/>
-              </a:solidFill>
-              <a:latin typeface="Comic Sans MS" pitchFamily="66" charset="0"/>
-            </a:endParaRPr>
-          </a:p>
-        </p:txBody>
-      </p:sp>
-      <p:sp>
-        <p:nvSpPr>
-          <p:cNvPr id="9" name="Title 1"/>
-          <p:cNvSpPr>
-            <a:spLocks noGrp="1"/>
-          </p:cNvSpPr>
-          <p:nvPr>
-            <p:ph type="title"/>
-          </p:nvPr>
-        </p:nvSpPr>
-        <p:spPr>
-          <a:xfrm>
-            <a:off x="1651000" y="363538"/>
-            <a:ext cx="6794500" cy="1003300"/>
-          </a:xfrm>
-        </p:spPr>
-        <p:txBody>
-          <a:bodyPr/>
-          <a:lstStyle/>
-          <a:p>
-            <a:r>
-              <a:rPr lang="en-US" sz="4000" dirty="0" smtClean="0"/>
-              <a:t>Algebra for Equivalence</a:t>
-            </a:r>
-            <a:endParaRPr lang="en-US" sz="4000" dirty="0"/>
-          </a:p>
-        </p:txBody>
-      </p:sp>
-      <p:sp>
-        <p:nvSpPr>
-          <p:cNvPr id="4" name="Slide Number Placeholder 2"/>
-          <p:cNvSpPr>
-            <a:spLocks noGrp="1"/>
-          </p:cNvSpPr>
-          <p:nvPr>
-            <p:ph type="sldNum" sz="quarter" idx="10"/>
-          </p:nvPr>
-        </p:nvSpPr>
-        <p:spPr>
-          <a:xfrm>
-            <a:off x="7333815" y="6553200"/>
-            <a:ext cx="1810186" cy="276999"/>
-          </a:xfrm>
-        </p:spPr>
-        <p:txBody>
-          <a:bodyPr/>
-          <a:lstStyle/>
-          <a:p>
-            <a:r>
-              <a:rPr lang="en-US" dirty="0" smtClean="0"/>
-              <a:t>propositional algebra.</a:t>
-            </a:r>
-            <a:fld id="{3251DA95-B240-47FE-901D-B78FC8E8E532}" type="slidenum">
-              <a:rPr lang="en-US" smtClean="0"/>
-              <a:pPr/>
-              <a:t>47</a:t>
-            </a:fld>
-            <a:endParaRPr lang="en-US" dirty="0"/>
-          </a:p>
-        </p:txBody>
-      </p:sp>
-    </p:spTree>
-    <p:extLst>
-      <p:ext uri="{BB962C8B-B14F-4D97-AF65-F5344CB8AC3E}">
-        <p14:creationId xmlns:p14="http://schemas.microsoft.com/office/powerpoint/2010/main" val="2003119538"/>
-      </p:ext>
-    </p:extLst>
-  </p:cSld>
-  <p:clrMapOvr>
-    <a:masterClrMapping/>
-  </p:clrMapOvr>
-  <mc:AlternateContent xmlns:mc="http://schemas.openxmlformats.org/markup-compatibility/2006" xmlns:p14="http://schemas.microsoft.com/office/powerpoint/2010/main">
-    <mc:Choice Requires="p14">
-      <p:transition spd="med" p14:dur="700" advClick="0">
-        <p:fade/>
-      </p:transition>
-    </mc:Choice>
-    <mc:Fallback xmlns="">
-      <p:transition xmlns:p14="http://schemas.microsoft.com/office/powerpoint/2010/main" spd="med" advClick="0">
-        <p:fade/>
-      </p:transition>
-    </mc:Fallback>
-  </mc:AlternateContent>
-  <p:timing>
-    <p:tnLst>
-      <p:par>
-        <p:cTn xmlns:p14="http://schemas.microsoft.com/office/powerpoint/2010/main" id="1" dur="indefinite" restart="never" nodeType="tmRoot"/>
-      </p:par>
-    </p:tnLst>
-  </p:timing>
-</p:sld>
-</file>
-
 <file path=ppt/slides/slide48.xml><?xml version="1.0" encoding="utf-8"?>
 <p:sld xmlns:a="http://schemas.openxmlformats.org/drawingml/2006/main" xmlns:r="http://schemas.openxmlformats.org/officeDocument/2006/relationships" xmlns:p="http://schemas.openxmlformats.org/presentationml/2006/main">
   <p:cSld>
@@ -23638,7 +24075,7 @@
         <p:spPr>
           <a:xfrm>
             <a:off x="249243" y="1847840"/>
-            <a:ext cx="8985240" cy="2585323"/>
+            <a:ext cx="8985240" cy="1754327"/>
           </a:xfrm>
           <a:prstGeom prst="rect">
             <a:avLst/>
@@ -23673,24 +24110,6 @@
               </a:rPr>
               <a:t>equivalent </a:t>
             </a:r>
-            <a:r>
-              <a:rPr lang="en-US" sz="5400" dirty="0" err="1" smtClean="0">
-                <a:solidFill>
-                  <a:srgbClr val="000000"/>
-                </a:solidFill>
-                <a:latin typeface="Comic Sans MS" pitchFamily="66" charset="0"/>
-              </a:rPr>
-              <a:t>iff</a:t>
-            </a:r>
-            <a:r>
-              <a:rPr lang="en-US" sz="5400" dirty="0" smtClean="0">
-                <a:solidFill>
-                  <a:srgbClr val="000000"/>
-                </a:solidFill>
-                <a:latin typeface="Comic Sans MS" pitchFamily="66" charset="0"/>
-              </a:rPr>
-              <a:t> have same truth table</a:t>
-            </a:r>
             <a:endParaRPr lang="en-US" sz="5400" dirty="0">
               <a:solidFill>
                 <a:srgbClr val="000000"/>
@@ -23764,7 +24183,7 @@
     </p:spTree>
     <p:extLst>
       <p:ext uri="{BB962C8B-B14F-4D97-AF65-F5344CB8AC3E}">
-        <p14:creationId xmlns:p14="http://schemas.microsoft.com/office/powerpoint/2010/main" val="2442323819"/>
+        <p14:creationId xmlns:p14="http://schemas.microsoft.com/office/powerpoint/2010/main" val="2003119538"/>
       </p:ext>
     </p:extLst>
   </p:cSld>
@@ -23819,7 +24238,7 @@
         <p:spPr>
           <a:xfrm>
             <a:off x="249243" y="1847840"/>
-            <a:ext cx="8985240" cy="3416320"/>
+            <a:ext cx="8985240" cy="2585323"/>
           </a:xfrm>
           <a:prstGeom prst="rect">
             <a:avLst/>
@@ -23870,37 +24289,7 @@
                 </a:solidFill>
                 <a:latin typeface="Comic Sans MS" pitchFamily="66" charset="0"/>
               </a:rPr>
-              <a:t> have same truth table </a:t>
-            </a:r>
-            <a:r>
-              <a:rPr lang="en-US" sz="5400" dirty="0" err="1" smtClean="0">
-                <a:solidFill>
-                  <a:srgbClr val="000000"/>
-                </a:solidFill>
-                <a:latin typeface="Comic Sans MS" pitchFamily="66" charset="0"/>
-              </a:rPr>
-              <a:t>iff</a:t>
-            </a:r>
-            <a:r>
-              <a:rPr lang="en-US" sz="5400" dirty="0" smtClean="0">
-                <a:solidFill>
-                  <a:srgbClr val="000000"/>
-                </a:solidFill>
-                <a:latin typeface="Comic Sans MS" pitchFamily="66" charset="0"/>
-              </a:rPr>
-              <a:t> have same</a:t>
-            </a:r>
-          </a:p>
-          <a:p>
-            <a:pPr algn="l"/>
-            <a:r>
-              <a:rPr lang="en-US" sz="5400" dirty="0" smtClean="0">
-                <a:solidFill>
-                  <a:srgbClr val="000000"/>
-                </a:solidFill>
-                <a:latin typeface="Comic Sans MS" pitchFamily="66" charset="0"/>
-              </a:rPr>
-              <a:t>canonical DNF.</a:t>
+              <a:t> have same truth table</a:t>
             </a:r>
             <a:endParaRPr lang="en-US" sz="5400" dirty="0">
               <a:solidFill>
@@ -23975,7 +24364,7 @@
     </p:spTree>
     <p:extLst>
       <p:ext uri="{BB962C8B-B14F-4D97-AF65-F5344CB8AC3E}">
-        <p14:creationId xmlns:p14="http://schemas.microsoft.com/office/powerpoint/2010/main" val="1661767375"/>
+        <p14:creationId xmlns:p14="http://schemas.microsoft.com/office/powerpoint/2010/main" val="2442323819"/>
       </p:ext>
     </p:extLst>
   </p:cSld>
@@ -24187,7 +24576,7 @@
           <a:graphicData uri="http://schemas.openxmlformats.org/presentationml/2006/ole">
             <mc:AlternateContent xmlns:mc="http://schemas.openxmlformats.org/markup-compatibility/2006">
               <mc:Choice xmlns:v="urn:schemas-microsoft-com:vml" Requires="v">
-                <p:oleObj spid="_x0000_s420131" name="Equation" r:id="rId4" imgW="139700" imgH="215900" progId="Equation.DSMT4">
+                <p:oleObj spid="_x0000_s420141" name="Equation" r:id="rId4" imgW="139700" imgH="215900" progId="Equation.DSMT4">
                   <p:embed/>
                 </p:oleObj>
               </mc:Choice>
@@ -24244,7 +24633,7 @@
           <a:graphicData uri="http://schemas.openxmlformats.org/presentationml/2006/ole">
             <mc:AlternateContent xmlns:mc="http://schemas.openxmlformats.org/markup-compatibility/2006">
               <mc:Choice xmlns:v="urn:schemas-microsoft-com:vml" Requires="v">
-                <p:oleObj spid="_x0000_s420132" name="Equation" r:id="rId6" imgW="2044700" imgH="228600" progId="Equation.DSMT4">
+                <p:oleObj spid="_x0000_s420142" name="Equation" r:id="rId6" imgW="2044700" imgH="228600" progId="Equation.DSMT4">
                   <p:embed/>
                 </p:oleObj>
               </mc:Choice>
@@ -24384,7 +24773,7 @@
           <a:graphicData uri="http://schemas.openxmlformats.org/presentationml/2006/ole">
             <mc:AlternateContent xmlns:mc="http://schemas.openxmlformats.org/markup-compatibility/2006">
               <mc:Choice xmlns:v="urn:schemas-microsoft-com:vml" Requires="v">
-                <p:oleObj spid="_x0000_s420133" name="Equation" r:id="rId8" imgW="2159000" imgH="457200" progId="Equation.DSMT4">
+                <p:oleObj spid="_x0000_s420143" name="Equation" r:id="rId8" imgW="2159000" imgH="457200" progId="Equation.DSMT4">
                   <p:embed/>
                 </p:oleObj>
               </mc:Choice>
@@ -24652,6 +25041,217 @@
         </p:nvSpPr>
         <p:spPr>
           <a:xfrm>
+            <a:off x="249243" y="1847840"/>
+            <a:ext cx="8985240" cy="3416320"/>
+          </a:xfrm>
+          <a:prstGeom prst="rect">
+            <a:avLst/>
+          </a:prstGeom>
+          <a:noFill/>
+        </p:spPr>
+        <p:txBody>
+          <a:bodyPr wrap="square" rtlCol="0">
+            <a:spAutoFit/>
+          </a:bodyPr>
+          <a:lstStyle/>
+          <a:p>
+            <a:pPr algn="l"/>
+            <a:r>
+              <a:rPr lang="en-US" sz="5400" dirty="0" smtClean="0">
+                <a:solidFill>
+                  <a:srgbClr val="000000"/>
+                </a:solidFill>
+                <a:latin typeface="Comic Sans MS" pitchFamily="66" charset="0"/>
+              </a:rPr>
+              <a:t>Because two formulas are</a:t>
+            </a:r>
+          </a:p>
+          <a:p>
+            <a:pPr algn="l"/>
+            <a:r>
+              <a:rPr lang="en-US" sz="5400" dirty="0" smtClean="0">
+                <a:solidFill>
+                  <a:srgbClr val="000000"/>
+                </a:solidFill>
+                <a:latin typeface="Comic Sans MS" pitchFamily="66" charset="0"/>
+              </a:rPr>
+              <a:t>equivalent </a:t>
+            </a:r>
+            <a:r>
+              <a:rPr lang="en-US" sz="5400" dirty="0" err="1" smtClean="0">
+                <a:solidFill>
+                  <a:srgbClr val="000000"/>
+                </a:solidFill>
+                <a:latin typeface="Comic Sans MS" pitchFamily="66" charset="0"/>
+              </a:rPr>
+              <a:t>iff</a:t>
+            </a:r>
+            <a:r>
+              <a:rPr lang="en-US" sz="5400" dirty="0" smtClean="0">
+                <a:solidFill>
+                  <a:srgbClr val="000000"/>
+                </a:solidFill>
+                <a:latin typeface="Comic Sans MS" pitchFamily="66" charset="0"/>
+              </a:rPr>
+              <a:t> have same truth table </a:t>
+            </a:r>
+            <a:r>
+              <a:rPr lang="en-US" sz="5400" dirty="0" err="1" smtClean="0">
+                <a:solidFill>
+                  <a:srgbClr val="000000"/>
+                </a:solidFill>
+                <a:latin typeface="Comic Sans MS" pitchFamily="66" charset="0"/>
+              </a:rPr>
+              <a:t>iff</a:t>
+            </a:r>
+            <a:r>
+              <a:rPr lang="en-US" sz="5400" dirty="0" smtClean="0">
+                <a:solidFill>
+                  <a:srgbClr val="000000"/>
+                </a:solidFill>
+                <a:latin typeface="Comic Sans MS" pitchFamily="66" charset="0"/>
+              </a:rPr>
+              <a:t> have same</a:t>
+            </a:r>
+          </a:p>
+          <a:p>
+            <a:pPr algn="l"/>
+            <a:r>
+              <a:rPr lang="en-US" sz="5400" dirty="0" smtClean="0">
+                <a:solidFill>
+                  <a:srgbClr val="000000"/>
+                </a:solidFill>
+                <a:latin typeface="Comic Sans MS" pitchFamily="66" charset="0"/>
+              </a:rPr>
+              <a:t>canonical DNF.</a:t>
+            </a:r>
+            <a:endParaRPr lang="en-US" sz="5400" dirty="0">
+              <a:solidFill>
+                <a:srgbClr val="000000"/>
+              </a:solidFill>
+              <a:latin typeface="Comic Sans MS" pitchFamily="66" charset="0"/>
+            </a:endParaRPr>
+          </a:p>
+        </p:txBody>
+      </p:sp>
+      <p:sp>
+        <p:nvSpPr>
+          <p:cNvPr id="9" name="Title 1"/>
+          <p:cNvSpPr>
+            <a:spLocks noGrp="1"/>
+          </p:cNvSpPr>
+          <p:nvPr>
+            <p:ph type="title"/>
+          </p:nvPr>
+        </p:nvSpPr>
+        <p:spPr>
+          <a:xfrm>
+            <a:off x="1651000" y="363538"/>
+            <a:ext cx="6794500" cy="1003300"/>
+          </a:xfrm>
+        </p:spPr>
+        <p:txBody>
+          <a:bodyPr/>
+          <a:lstStyle/>
+          <a:p>
+            <a:r>
+              <a:rPr lang="en-US" sz="4000" dirty="0" smtClean="0"/>
+              <a:t>Algebra for Equivalence</a:t>
+            </a:r>
+            <a:endParaRPr lang="en-US" sz="4000" dirty="0"/>
+          </a:p>
+        </p:txBody>
+      </p:sp>
+      <p:sp>
+        <p:nvSpPr>
+          <p:cNvPr id="4" name="Slide Number Placeholder 2"/>
+          <p:cNvSpPr>
+            <a:spLocks noGrp="1"/>
+          </p:cNvSpPr>
+          <p:nvPr>
+            <p:ph type="sldNum" sz="quarter" idx="10"/>
+          </p:nvPr>
+        </p:nvSpPr>
+        <p:spPr>
+          <a:xfrm>
+            <a:off x="7333815" y="6553200"/>
+            <a:ext cx="1810186" cy="276999"/>
+          </a:xfrm>
+        </p:spPr>
+        <p:txBody>
+          <a:bodyPr/>
+          <a:lstStyle/>
+          <a:p>
+            <a:r>
+              <a:rPr lang="en-US" dirty="0" smtClean="0"/>
+              <a:t>propositional algebra.</a:t>
+            </a:r>
+            <a:fld id="{3251DA95-B240-47FE-901D-B78FC8E8E532}" type="slidenum">
+              <a:rPr lang="en-US" smtClean="0"/>
+              <a:pPr/>
+              <a:t>50</a:t>
+            </a:fld>
+            <a:endParaRPr lang="en-US" dirty="0"/>
+          </a:p>
+        </p:txBody>
+      </p:sp>
+    </p:spTree>
+    <p:extLst>
+      <p:ext uri="{BB962C8B-B14F-4D97-AF65-F5344CB8AC3E}">
+        <p14:creationId xmlns:p14="http://schemas.microsoft.com/office/powerpoint/2010/main" val="1661767375"/>
+      </p:ext>
+    </p:extLst>
+  </p:cSld>
+  <p:clrMapOvr>
+    <a:masterClrMapping/>
+  </p:clrMapOvr>
+  <mc:AlternateContent xmlns:mc="http://schemas.openxmlformats.org/markup-compatibility/2006" xmlns:p14="http://schemas.microsoft.com/office/powerpoint/2010/main">
+    <mc:Choice Requires="p14">
+      <p:transition spd="med" p14:dur="700" advClick="0">
+        <p:fade/>
+      </p:transition>
+    </mc:Choice>
+    <mc:Fallback xmlns="">
+      <p:transition xmlns:p14="http://schemas.microsoft.com/office/powerpoint/2010/main" spd="med" advClick="0">
+        <p:fade/>
+      </p:transition>
+    </mc:Fallback>
+  </mc:AlternateContent>
+  <p:timing>
+    <p:tnLst>
+      <p:par>
+        <p:cTn xmlns:p14="http://schemas.microsoft.com/office/powerpoint/2010/main" id="1" dur="indefinite" restart="never" nodeType="tmRoot"/>
+      </p:par>
+    </p:tnLst>
+  </p:timing>
+</p:sld>
+</file>
+
+<file path=ppt/slides/slide51.xml><?xml version="1.0" encoding="utf-8"?>
+<p:sld xmlns:a="http://schemas.openxmlformats.org/drawingml/2006/main" xmlns:r="http://schemas.openxmlformats.org/officeDocument/2006/relationships" xmlns:p="http://schemas.openxmlformats.org/presentationml/2006/main">
+  <p:cSld>
+    <p:spTree>
+      <p:nvGrpSpPr>
+        <p:cNvPr id="1" name=""/>
+        <p:cNvGrpSpPr/>
+        <p:nvPr/>
+      </p:nvGrpSpPr>
+      <p:grpSpPr>
+        <a:xfrm>
+          <a:off x="0" y="0"/>
+          <a:ext cx="0" cy="0"/>
+          <a:chOff x="0" y="0"/>
+          <a:chExt cx="0" cy="0"/>
+        </a:xfrm>
+      </p:grpSpPr>
+      <p:sp>
+        <p:nvSpPr>
+          <p:cNvPr id="5" name="TextBox 4"/>
+          <p:cNvSpPr txBox="1"/>
+          <p:nvPr/>
+        </p:nvSpPr>
+        <p:spPr>
+          <a:xfrm>
             <a:off x="627063" y="1308100"/>
             <a:ext cx="7970837" cy="2585323"/>
           </a:xfrm>
@@ -24752,7 +25352,7 @@
             <a:fld id="{3251DA95-B240-47FE-901D-B78FC8E8E532}" type="slidenum">
               <a:rPr lang="en-US" smtClean="0"/>
               <a:pPr/>
-              <a:t>50</a:t>
+              <a:t>51</a:t>
             </a:fld>
             <a:endParaRPr lang="en-US" dirty="0"/>
           </a:p>
@@ -24860,7 +25460,7 @@
 </p:sld>
 </file>
 
-<file path=ppt/slides/slide51.xml><?xml version="1.0" encoding="utf-8"?>
+<file path=ppt/slides/slide52.xml><?xml version="1.0" encoding="utf-8"?>
 <p:sld xmlns:a="http://schemas.openxmlformats.org/drawingml/2006/main" xmlns:r="http://schemas.openxmlformats.org/officeDocument/2006/relationships" xmlns:p="http://schemas.openxmlformats.org/presentationml/2006/main">
   <p:cSld>
     <p:spTree>
@@ -25032,7 +25632,7 @@
             <a:fld id="{3251DA95-B240-47FE-901D-B78FC8E8E532}" type="slidenum">
               <a:rPr lang="en-US" smtClean="0"/>
               <a:pPr/>
-              <a:t>51</a:t>
+              <a:t>52</a:t>
             </a:fld>
             <a:endParaRPr lang="en-US" dirty="0"/>
           </a:p>
@@ -25070,7 +25670,7 @@
 </p:sld>
 </file>
 
-<file path=ppt/slides/slide52.xml><?xml version="1.0" encoding="utf-8"?>
+<file path=ppt/slides/slide53.xml><?xml version="1.0" encoding="utf-8"?>
 <p:sld xmlns:a="http://schemas.openxmlformats.org/drawingml/2006/main" xmlns:r="http://schemas.openxmlformats.org/officeDocument/2006/relationships" xmlns:p="http://schemas.openxmlformats.org/presentationml/2006/main">
   <p:cSld>
     <p:spTree>
@@ -25222,7 +25822,7 @@
             <a:fld id="{3251DA95-B240-47FE-901D-B78FC8E8E532}" type="slidenum">
               <a:rPr lang="en-US" smtClean="0"/>
               <a:pPr/>
-              <a:t>52</a:t>
+              <a:t>53</a:t>
             </a:fld>
             <a:endParaRPr lang="en-US" dirty="0"/>
           </a:p>
@@ -25401,7 +26001,7 @@
           <a:graphicData uri="http://schemas.openxmlformats.org/presentationml/2006/ole">
             <mc:AlternateContent xmlns:mc="http://schemas.openxmlformats.org/markup-compatibility/2006">
               <mc:Choice xmlns:v="urn:schemas-microsoft-com:vml" Requires="v">
-                <p:oleObj spid="_x0000_s1137" name="Equation" r:id="rId4" imgW="1295400" imgH="228600" progId="Equation.DSMT4">
+                <p:oleObj spid="_x0000_s1141" name="Equation" r:id="rId4" imgW="1295400" imgH="228600" progId="Equation.DSMT4">
                   <p:embed/>
                 </p:oleObj>
               </mc:Choice>
@@ -25712,7 +26312,7 @@
           <a:graphicData uri="http://schemas.openxmlformats.org/presentationml/2006/ole">
             <mc:AlternateContent xmlns:mc="http://schemas.openxmlformats.org/markup-compatibility/2006">
               <mc:Choice xmlns:v="urn:schemas-microsoft-com:vml" Requires="v">
-                <p:oleObj spid="_x0000_s423020" name="Equation" r:id="rId4" imgW="1498600" imgH="457200" progId="Equation.DSMT4">
+                <p:oleObj spid="_x0000_s423024" name="Equation" r:id="rId4" imgW="1498600" imgH="457200" progId="Equation.DSMT4">
                   <p:embed/>
                 </p:oleObj>
               </mc:Choice>
@@ -25958,7 +26558,7 @@
           <a:graphicData uri="http://schemas.openxmlformats.org/presentationml/2006/ole">
             <mc:AlternateContent xmlns:mc="http://schemas.openxmlformats.org/markup-compatibility/2006">
               <mc:Choice xmlns:v="urn:schemas-microsoft-com:vml" Requires="v">
-                <p:oleObj spid="_x0000_s421996" name="Equation" r:id="rId4" imgW="1600200" imgH="457200" progId="Equation.DSMT4">
+                <p:oleObj spid="_x0000_s422000" name="Equation" r:id="rId4" imgW="1600200" imgH="457200" progId="Equation.DSMT4">
                   <p:embed/>
                 </p:oleObj>
               </mc:Choice>

</xml_diff>